<commit_message>
Added some proposed skeleton slides.
</commit_message>
<xml_diff>
--- a/Presentation Slides/Effective Data Visualization for Actuaries.pptx
+++ b/Presentation Slides/Effective Data Visualization for Actuaries.pptx
@@ -8,14 +8,35 @@
     <p:sldMasterId id="2147483701" r:id="rId4"/>
   </p:sldMasterIdLst>
   <p:notesMasterIdLst>
-    <p:notesMasterId r:id="rId10"/>
+    <p:notesMasterId r:id="rId31"/>
   </p:notesMasterIdLst>
   <p:sldIdLst>
-    <p:sldId id="257" r:id="rId5"/>
-    <p:sldId id="256" r:id="rId6"/>
-    <p:sldId id="259" r:id="rId7"/>
-    <p:sldId id="260" r:id="rId8"/>
-    <p:sldId id="261" r:id="rId9"/>
+    <p:sldId id="262" r:id="rId5"/>
+    <p:sldId id="257" r:id="rId6"/>
+    <p:sldId id="268" r:id="rId7"/>
+    <p:sldId id="256" r:id="rId8"/>
+    <p:sldId id="265" r:id="rId9"/>
+    <p:sldId id="264" r:id="rId10"/>
+    <p:sldId id="281" r:id="rId11"/>
+    <p:sldId id="270" r:id="rId12"/>
+    <p:sldId id="271" r:id="rId13"/>
+    <p:sldId id="272" r:id="rId14"/>
+    <p:sldId id="273" r:id="rId15"/>
+    <p:sldId id="274" r:id="rId16"/>
+    <p:sldId id="275" r:id="rId17"/>
+    <p:sldId id="276" r:id="rId18"/>
+    <p:sldId id="277" r:id="rId19"/>
+    <p:sldId id="278" r:id="rId20"/>
+    <p:sldId id="279" r:id="rId21"/>
+    <p:sldId id="280" r:id="rId22"/>
+    <p:sldId id="283" r:id="rId23"/>
+    <p:sldId id="285" r:id="rId24"/>
+    <p:sldId id="284" r:id="rId25"/>
+    <p:sldId id="286" r:id="rId26"/>
+    <p:sldId id="267" r:id="rId27"/>
+    <p:sldId id="259" r:id="rId28"/>
+    <p:sldId id="260" r:id="rId29"/>
+    <p:sldId id="261" r:id="rId30"/>
   </p:sldIdLst>
   <p:sldSz cx="9144000" cy="6858000" type="screen4x3"/>
   <p:notesSz cx="6858000" cy="9144000"/>
@@ -671,7 +692,7 @@
             <a:fld id="{64B16661-4D50-41DC-A83A-1231FD5B8537}" type="slidenum">
               <a:rPr lang="en-US" smtClean="0"/>
               <a:pPr/>
-              <a:t>2</a:t>
+              <a:t>4</a:t>
             </a:fld>
             <a:endParaRPr lang="en-US"/>
           </a:p>
@@ -1515,7 +1536,7 @@
               <a:pPr>
                 <a:defRPr/>
               </a:pPr>
-              <a:t>2/22/2023</a:t>
+              <a:t>2/23/2023</a:t>
             </a:fld>
             <a:endParaRPr lang="en-US"/>
           </a:p>
@@ -1714,7 +1735,7 @@
               <a:pPr>
                 <a:defRPr/>
               </a:pPr>
-              <a:t>2/22/2023</a:t>
+              <a:t>2/23/2023</a:t>
             </a:fld>
             <a:endParaRPr lang="en-US"/>
           </a:p>
@@ -1981,7 +2002,7 @@
               <a:pPr>
                 <a:defRPr/>
               </a:pPr>
-              <a:t>2/22/2023</a:t>
+              <a:t>2/23/2023</a:t>
             </a:fld>
             <a:endParaRPr lang="en-US"/>
           </a:p>
@@ -2288,7 +2309,7 @@
               <a:pPr>
                 <a:defRPr/>
               </a:pPr>
-              <a:t>2/22/2023</a:t>
+              <a:t>2/23/2023</a:t>
             </a:fld>
             <a:endParaRPr lang="en-US"/>
           </a:p>
@@ -2729,7 +2750,7 @@
               <a:pPr>
                 <a:defRPr/>
               </a:pPr>
-              <a:t>2/22/2023</a:t>
+              <a:t>2/23/2023</a:t>
             </a:fld>
             <a:endParaRPr lang="en-US"/>
           </a:p>
@@ -2868,7 +2889,7 @@
               <a:pPr>
                 <a:defRPr/>
               </a:pPr>
-              <a:t>2/22/2023</a:t>
+              <a:t>2/23/2023</a:t>
             </a:fld>
             <a:endParaRPr lang="en-US"/>
           </a:p>
@@ -2985,7 +3006,7 @@
               <a:pPr>
                 <a:defRPr/>
               </a:pPr>
-              <a:t>2/22/2023</a:t>
+              <a:t>2/23/2023</a:t>
             </a:fld>
             <a:endParaRPr lang="en-US"/>
           </a:p>
@@ -3282,7 +3303,7 @@
               <a:pPr>
                 <a:defRPr/>
               </a:pPr>
-              <a:t>2/22/2023</a:t>
+              <a:t>2/23/2023</a:t>
             </a:fld>
             <a:endParaRPr lang="en-US"/>
           </a:p>
@@ -3748,7 +3769,7 @@
               <a:pPr>
                 <a:defRPr/>
               </a:pPr>
-              <a:t>2/22/2023</a:t>
+              <a:t>2/23/2023</a:t>
             </a:fld>
             <a:endParaRPr lang="en-US"/>
           </a:p>
@@ -3938,7 +3959,7 @@
               <a:pPr>
                 <a:defRPr/>
               </a:pPr>
-              <a:t>2/22/2023</a:t>
+              <a:t>2/23/2023</a:t>
             </a:fld>
             <a:endParaRPr lang="en-US"/>
           </a:p>
@@ -4138,7 +4159,7 @@
               <a:pPr>
                 <a:defRPr/>
               </a:pPr>
-              <a:t>2/22/2023</a:t>
+              <a:t>2/23/2023</a:t>
             </a:fld>
             <a:endParaRPr lang="en-US"/>
           </a:p>
@@ -4400,7 +4421,7 @@
               <a:pPr>
                 <a:defRPr/>
               </a:pPr>
-              <a:t>2/22/2023</a:t>
+              <a:t>2/23/2023</a:t>
             </a:fld>
             <a:endParaRPr lang="en-US"/>
           </a:p>
@@ -4599,7 +4620,7 @@
               <a:pPr>
                 <a:defRPr/>
               </a:pPr>
-              <a:t>2/22/2023</a:t>
+              <a:t>2/23/2023</a:t>
             </a:fld>
             <a:endParaRPr lang="en-US"/>
           </a:p>
@@ -4866,7 +4887,7 @@
               <a:pPr>
                 <a:defRPr/>
               </a:pPr>
-              <a:t>2/22/2023</a:t>
+              <a:t>2/23/2023</a:t>
             </a:fld>
             <a:endParaRPr lang="en-US"/>
           </a:p>
@@ -5173,7 +5194,7 @@
               <a:pPr>
                 <a:defRPr/>
               </a:pPr>
-              <a:t>2/22/2023</a:t>
+              <a:t>2/23/2023</a:t>
             </a:fld>
             <a:endParaRPr lang="en-US"/>
           </a:p>
@@ -5614,7 +5635,7 @@
               <a:pPr>
                 <a:defRPr/>
               </a:pPr>
-              <a:t>2/22/2023</a:t>
+              <a:t>2/23/2023</a:t>
             </a:fld>
             <a:endParaRPr lang="en-US"/>
           </a:p>
@@ -5753,7 +5774,7 @@
               <a:pPr>
                 <a:defRPr/>
               </a:pPr>
-              <a:t>2/22/2023</a:t>
+              <a:t>2/23/2023</a:t>
             </a:fld>
             <a:endParaRPr lang="en-US"/>
           </a:p>
@@ -5870,7 +5891,7 @@
               <a:pPr>
                 <a:defRPr/>
               </a:pPr>
-              <a:t>2/22/2023</a:t>
+              <a:t>2/23/2023</a:t>
             </a:fld>
             <a:endParaRPr lang="en-US"/>
           </a:p>
@@ -6379,7 +6400,7 @@
               <a:pPr>
                 <a:defRPr/>
               </a:pPr>
-              <a:t>2/22/2023</a:t>
+              <a:t>2/23/2023</a:t>
             </a:fld>
             <a:endParaRPr lang="en-US"/>
           </a:p>
@@ -6656,7 +6677,7 @@
               <a:pPr>
                 <a:defRPr/>
               </a:pPr>
-              <a:t>2/22/2023</a:t>
+              <a:t>2/23/2023</a:t>
             </a:fld>
             <a:endParaRPr lang="en-US"/>
           </a:p>
@@ -6846,7 +6867,7 @@
               <a:pPr>
                 <a:defRPr/>
               </a:pPr>
-              <a:t>2/22/2023</a:t>
+              <a:t>2/23/2023</a:t>
             </a:fld>
             <a:endParaRPr lang="en-US"/>
           </a:p>
@@ -7046,7 +7067,7 @@
               <a:pPr>
                 <a:defRPr/>
               </a:pPr>
-              <a:t>2/22/2023</a:t>
+              <a:t>2/23/2023</a:t>
             </a:fld>
             <a:endParaRPr lang="en-US"/>
           </a:p>
@@ -7308,7 +7329,7 @@
               <a:pPr>
                 <a:defRPr/>
               </a:pPr>
-              <a:t>2/22/2023</a:t>
+              <a:t>2/23/2023</a:t>
             </a:fld>
             <a:endParaRPr lang="en-US"/>
           </a:p>
@@ -7498,7 +7519,7 @@
               <a:pPr>
                 <a:defRPr/>
               </a:pPr>
-              <a:t>2/22/2023</a:t>
+              <a:t>2/23/2023</a:t>
             </a:fld>
             <a:endParaRPr lang="en-US"/>
           </a:p>
@@ -7765,7 +7786,7 @@
               <a:pPr>
                 <a:defRPr/>
               </a:pPr>
-              <a:t>2/22/2023</a:t>
+              <a:t>2/23/2023</a:t>
             </a:fld>
             <a:endParaRPr lang="en-US"/>
           </a:p>
@@ -8072,7 +8093,7 @@
               <a:pPr>
                 <a:defRPr/>
               </a:pPr>
-              <a:t>2/22/2023</a:t>
+              <a:t>2/23/2023</a:t>
             </a:fld>
             <a:endParaRPr lang="en-US"/>
           </a:p>
@@ -8513,7 +8534,7 @@
               <a:pPr>
                 <a:defRPr/>
               </a:pPr>
-              <a:t>2/22/2023</a:t>
+              <a:t>2/23/2023</a:t>
             </a:fld>
             <a:endParaRPr lang="en-US"/>
           </a:p>
@@ -8652,7 +8673,7 @@
               <a:pPr>
                 <a:defRPr/>
               </a:pPr>
-              <a:t>2/22/2023</a:t>
+              <a:t>2/23/2023</a:t>
             </a:fld>
             <a:endParaRPr lang="en-US"/>
           </a:p>
@@ -9075,7 +9096,7 @@
               <a:pPr>
                 <a:defRPr/>
               </a:pPr>
-              <a:t>2/22/2023</a:t>
+              <a:t>2/23/2023</a:t>
             </a:fld>
             <a:endParaRPr lang="en-US"/>
           </a:p>
@@ -9372,7 +9393,7 @@
               <a:pPr>
                 <a:defRPr/>
               </a:pPr>
-              <a:t>2/22/2023</a:t>
+              <a:t>2/23/2023</a:t>
             </a:fld>
             <a:endParaRPr lang="en-US"/>
           </a:p>
@@ -9649,7 +9670,7 @@
               <a:pPr>
                 <a:defRPr/>
               </a:pPr>
-              <a:t>2/22/2023</a:t>
+              <a:t>2/23/2023</a:t>
             </a:fld>
             <a:endParaRPr lang="en-US"/>
           </a:p>
@@ -9839,7 +9860,7 @@
               <a:pPr>
                 <a:defRPr/>
               </a:pPr>
-              <a:t>2/22/2023</a:t>
+              <a:t>2/23/2023</a:t>
             </a:fld>
             <a:endParaRPr lang="en-US"/>
           </a:p>
@@ -10039,7 +10060,7 @@
               <a:pPr>
                 <a:defRPr/>
               </a:pPr>
-              <a:t>2/22/2023</a:t>
+              <a:t>2/23/2023</a:t>
             </a:fld>
             <a:endParaRPr lang="en-US"/>
           </a:p>
@@ -12243,7 +12264,7 @@
               <a:pPr>
                 <a:defRPr/>
               </a:pPr>
-              <a:t>2/22/2023</a:t>
+              <a:t>2/23/2023</a:t>
             </a:fld>
             <a:endParaRPr lang="en-US"/>
           </a:p>
@@ -12922,7 +12943,7 @@
               <a:pPr>
                 <a:defRPr/>
               </a:pPr>
-              <a:t>2/22/2023</a:t>
+              <a:t>2/23/2023</a:t>
             </a:fld>
             <a:endParaRPr lang="en-US"/>
           </a:p>
@@ -13608,7 +13629,7 @@
               <a:pPr>
                 <a:defRPr/>
               </a:pPr>
-              <a:t>2/22/2023</a:t>
+              <a:t>2/23/2023</a:t>
             </a:fld>
             <a:endParaRPr lang="en-US"/>
           </a:p>
@@ -14127,7 +14148,7 @@
           <p:cNvPr id="2" name="Title 1">
             <a:extLst>
               <a:ext uri="{FF2B5EF4-FFF2-40B4-BE49-F238E27FC236}">
-                <a16:creationId xmlns:a16="http://schemas.microsoft.com/office/drawing/2014/main" id="{6442BFB3-50B7-CB64-9D6F-632F86BE2902}"/>
+                <a16:creationId xmlns:a16="http://schemas.microsoft.com/office/drawing/2014/main" id="{E5277F28-4700-7326-7DE7-E6683E4893F1}"/>
               </a:ext>
             </a:extLst>
           </p:cNvPr>
@@ -14135,47 +14156,27 @@
             <a:spLocks noGrp="1"/>
           </p:cNvSpPr>
           <p:nvPr>
-            <p:ph type="ctrTitle"/>
-          </p:nvPr>
-        </p:nvSpPr>
-        <p:spPr>
-          <a:xfrm>
-            <a:off x="1485900" y="2130425"/>
-            <a:ext cx="6172200" cy="1470025"/>
-          </a:xfrm>
-        </p:spPr>
+            <p:ph type="title"/>
+          </p:nvPr>
+        </p:nvSpPr>
+        <p:spPr/>
         <p:txBody>
           <a:bodyPr/>
           <a:lstStyle/>
           <a:p>
-            <a:pPr algn="ctr"/>
-            <a:r>
-              <a:rPr lang="en-US" sz="5400" dirty="0"/>
-              <a:t>Effective</a:t>
-            </a:r>
-            <a:br>
-              <a:rPr lang="en-US" sz="5400" dirty="0"/>
-            </a:br>
-            <a:r>
-              <a:rPr lang="en-US" sz="5400" dirty="0"/>
-              <a:t>Data Visualization</a:t>
-            </a:r>
-            <a:br>
-              <a:rPr lang="en-US" sz="5400" dirty="0"/>
-            </a:br>
-            <a:r>
-              <a:rPr lang="en-US" sz="5400" dirty="0"/>
-              <a:t>for Actuaries</a:t>
-            </a:r>
-          </a:p>
-        </p:txBody>
-      </p:sp>
-      <p:sp>
-        <p:nvSpPr>
-          <p:cNvPr id="3" name="Subtitle 2">
+            <a:r>
+              <a:rPr lang="en-US" dirty="0"/>
+              <a:t>Original Proposed Content</a:t>
+            </a:r>
+          </a:p>
+        </p:txBody>
+      </p:sp>
+      <p:sp>
+        <p:nvSpPr>
+          <p:cNvPr id="3" name="Content Placeholder 2">
             <a:extLst>
               <a:ext uri="{FF2B5EF4-FFF2-40B4-BE49-F238E27FC236}">
-                <a16:creationId xmlns:a16="http://schemas.microsoft.com/office/drawing/2014/main" id="{9AF04EAA-821F-B55D-E8F7-C5651E6F8F40}"/>
+                <a16:creationId xmlns:a16="http://schemas.microsoft.com/office/drawing/2014/main" id="{AEA73732-7C01-D2DF-814F-02669711A8AF}"/>
               </a:ext>
             </a:extLst>
           </p:cNvPr>
@@ -14183,28 +14184,728 @@
             <a:spLocks noGrp="1"/>
           </p:cNvSpPr>
           <p:nvPr>
-            <p:ph type="subTitle" idx="1"/>
+            <p:ph idx="1"/>
           </p:nvPr>
         </p:nvSpPr>
         <p:spPr>
           <a:xfrm>
-            <a:off x="1371600" y="4495800"/>
-            <a:ext cx="6400800" cy="1752600"/>
+            <a:off x="152400" y="1417638"/>
+            <a:ext cx="7924800" cy="4708525"/>
           </a:xfrm>
         </p:spPr>
         <p:txBody>
           <a:bodyPr/>
           <a:lstStyle/>
           <a:p>
-            <a:r>
-              <a:rPr lang="en-US" dirty="0"/>
-              <a:t>Brian Fannin</a:t>
-            </a:r>
-          </a:p>
-          <a:p>
-            <a:r>
-              <a:rPr lang="en-US" dirty="0"/>
-              <a:t>Jordan Bonner</a:t>
+            <a:pPr marL="114300" marR="0" indent="0">
+              <a:lnSpc>
+                <a:spcPct val="110000"/>
+              </a:lnSpc>
+              <a:spcBef>
+                <a:spcPts val="0"/>
+              </a:spcBef>
+              <a:spcAft>
+                <a:spcPts val="0"/>
+              </a:spcAft>
+              <a:buNone/>
+            </a:pPr>
+            <a:r>
+              <a:rPr lang="en-US" sz="1050" b="1" dirty="0">
+                <a:solidFill>
+                  <a:srgbClr val="00589A"/>
+                </a:solidFill>
+                <a:effectLst/>
+                <a:latin typeface="Arial" panose="020B0604020202020204" pitchFamily="34" charset="0"/>
+                <a:ea typeface="SimSun" panose="02010600030101010101" pitchFamily="2" charset="-122"/>
+              </a:rPr>
+              <a:t>Title</a:t>
+            </a:r>
+            <a:r>
+              <a:rPr lang="en-US" sz="1050" dirty="0">
+                <a:solidFill>
+                  <a:srgbClr val="00589A"/>
+                </a:solidFill>
+                <a:effectLst/>
+                <a:latin typeface="Arial" panose="020B0604020202020204" pitchFamily="34" charset="0"/>
+                <a:ea typeface="SimSun" panose="02010600030101010101" pitchFamily="2" charset="-122"/>
+              </a:rPr>
+              <a:t>: Effective Data Visualization for Actuaries</a:t>
+            </a:r>
+            <a:endParaRPr lang="en-US" sz="1050" dirty="0">
+              <a:effectLst/>
+              <a:latin typeface="Arial" panose="020B0604020202020204" pitchFamily="34" charset="0"/>
+              <a:ea typeface="SimSun" panose="02010600030101010101" pitchFamily="2" charset="-122"/>
+            </a:endParaRPr>
+          </a:p>
+          <a:p>
+            <a:pPr marL="114300" marR="0" indent="0">
+              <a:lnSpc>
+                <a:spcPct val="110000"/>
+              </a:lnSpc>
+              <a:spcBef>
+                <a:spcPts val="0"/>
+              </a:spcBef>
+              <a:spcAft>
+                <a:spcPts val="0"/>
+              </a:spcAft>
+              <a:buNone/>
+            </a:pPr>
+            <a:r>
+              <a:rPr lang="en-US" sz="1050" b="1" dirty="0">
+                <a:solidFill>
+                  <a:srgbClr val="00589A"/>
+                </a:solidFill>
+                <a:effectLst/>
+                <a:latin typeface="Arial" panose="020B0604020202020204" pitchFamily="34" charset="0"/>
+                <a:ea typeface="SimSun" panose="02010600030101010101" pitchFamily="2" charset="-122"/>
+              </a:rPr>
+              <a:t>Session Description: </a:t>
+            </a:r>
+            <a:endParaRPr lang="en-US" sz="1050" dirty="0">
+              <a:solidFill>
+                <a:srgbClr val="00589A"/>
+              </a:solidFill>
+              <a:effectLst/>
+              <a:latin typeface="Arial" panose="020B0604020202020204" pitchFamily="34" charset="0"/>
+              <a:ea typeface="SimSun" panose="02010600030101010101" pitchFamily="2" charset="-122"/>
+            </a:endParaRPr>
+          </a:p>
+          <a:p>
+            <a:pPr marL="514350" lvl="1" indent="0">
+              <a:lnSpc>
+                <a:spcPct val="110000"/>
+              </a:lnSpc>
+              <a:spcBef>
+                <a:spcPts val="0"/>
+              </a:spcBef>
+              <a:spcAft>
+                <a:spcPts val="0"/>
+              </a:spcAft>
+              <a:buNone/>
+            </a:pPr>
+            <a:r>
+              <a:rPr lang="en-US" sz="1050" dirty="0">
+                <a:solidFill>
+                  <a:srgbClr val="00589A"/>
+                </a:solidFill>
+                <a:effectLst/>
+                <a:latin typeface="Arial" panose="020B0604020202020204" pitchFamily="34" charset="0"/>
+                <a:ea typeface="SimSun" panose="02010600030101010101" pitchFamily="2" charset="-122"/>
+              </a:rPr>
+              <a:t>Actuaries often need to regularly communicate trends, diagnostics, and findings to stakeholders (other actuaries, their business partners, or clients).</a:t>
+            </a:r>
+            <a:endParaRPr lang="en-US" sz="1050" dirty="0">
+              <a:solidFill>
+                <a:srgbClr val="0072BC"/>
+              </a:solidFill>
+              <a:effectLst/>
+              <a:latin typeface="Arial" panose="020B0604020202020204" pitchFamily="34" charset="0"/>
+              <a:ea typeface="SimSun" panose="02010600030101010101" pitchFamily="2" charset="-122"/>
+            </a:endParaRPr>
+          </a:p>
+          <a:p>
+            <a:pPr marL="514350" lvl="1" indent="0">
+              <a:lnSpc>
+                <a:spcPct val="110000"/>
+              </a:lnSpc>
+              <a:spcBef>
+                <a:spcPts val="0"/>
+              </a:spcBef>
+              <a:spcAft>
+                <a:spcPts val="0"/>
+              </a:spcAft>
+              <a:buNone/>
+            </a:pPr>
+            <a:endParaRPr lang="en-US" sz="400" dirty="0">
+              <a:solidFill>
+                <a:srgbClr val="0072BC"/>
+              </a:solidFill>
+              <a:ea typeface="SimSun" panose="02010600030101010101" pitchFamily="2" charset="-122"/>
+            </a:endParaRPr>
+          </a:p>
+          <a:p>
+            <a:pPr marL="514350" lvl="1" indent="0">
+              <a:lnSpc>
+                <a:spcPct val="110000"/>
+              </a:lnSpc>
+              <a:spcBef>
+                <a:spcPts val="0"/>
+              </a:spcBef>
+              <a:spcAft>
+                <a:spcPts val="0"/>
+              </a:spcAft>
+              <a:buNone/>
+            </a:pPr>
+            <a:r>
+              <a:rPr lang="en-US" sz="1050" dirty="0">
+                <a:solidFill>
+                  <a:srgbClr val="00589A"/>
+                </a:solidFill>
+                <a:effectLst/>
+                <a:latin typeface="Arial" panose="020B0604020202020204" pitchFamily="34" charset="0"/>
+                <a:ea typeface="SimSun" panose="02010600030101010101" pitchFamily="2" charset="-122"/>
+              </a:rPr>
+              <a:t>Two questions arise:</a:t>
+            </a:r>
+          </a:p>
+          <a:p>
+            <a:pPr marL="685800" lvl="1" indent="-171450">
+              <a:lnSpc>
+                <a:spcPct val="110000"/>
+              </a:lnSpc>
+              <a:spcBef>
+                <a:spcPts val="0"/>
+              </a:spcBef>
+              <a:spcAft>
+                <a:spcPts val="0"/>
+              </a:spcAft>
+            </a:pPr>
+            <a:r>
+              <a:rPr lang="en-US" sz="1050" dirty="0">
+                <a:solidFill>
+                  <a:srgbClr val="00589A"/>
+                </a:solidFill>
+                <a:effectLst/>
+                <a:latin typeface="Arial" panose="020B0604020202020204" pitchFamily="34" charset="0"/>
+                <a:ea typeface="SimSun" panose="02010600030101010101" pitchFamily="2" charset="-122"/>
+              </a:rPr>
+              <a:t>How do we create visualizations that let actuaries focus on interpreting rather than doing?</a:t>
+            </a:r>
+          </a:p>
+          <a:p>
+            <a:pPr marL="685800" lvl="1" indent="-171450">
+              <a:lnSpc>
+                <a:spcPct val="110000"/>
+              </a:lnSpc>
+              <a:spcBef>
+                <a:spcPts val="0"/>
+              </a:spcBef>
+              <a:spcAft>
+                <a:spcPts val="0"/>
+              </a:spcAft>
+            </a:pPr>
+            <a:r>
+              <a:rPr lang="en-US" sz="1050" dirty="0">
+                <a:solidFill>
+                  <a:srgbClr val="00589A"/>
+                </a:solidFill>
+                <a:effectLst/>
+                <a:latin typeface="Arial" panose="020B0604020202020204" pitchFamily="34" charset="0"/>
+                <a:ea typeface="SimSun" panose="02010600030101010101" pitchFamily="2" charset="-122"/>
+              </a:rPr>
+              <a:t>How do we re-structure these visualizations to tell a better story?</a:t>
+            </a:r>
+            <a:endParaRPr lang="en-US" sz="1050" dirty="0">
+              <a:solidFill>
+                <a:srgbClr val="0072BC"/>
+              </a:solidFill>
+              <a:ea typeface="SimSun" panose="02010600030101010101" pitchFamily="2" charset="-122"/>
+            </a:endParaRPr>
+          </a:p>
+          <a:p>
+            <a:pPr marL="685800" lvl="1" indent="-171450">
+              <a:lnSpc>
+                <a:spcPct val="110000"/>
+              </a:lnSpc>
+              <a:spcBef>
+                <a:spcPts val="0"/>
+              </a:spcBef>
+              <a:spcAft>
+                <a:spcPts val="0"/>
+              </a:spcAft>
+            </a:pPr>
+            <a:endParaRPr lang="en-US" sz="400" dirty="0">
+              <a:solidFill>
+                <a:srgbClr val="0072BC"/>
+              </a:solidFill>
+              <a:effectLst/>
+              <a:latin typeface="Arial" panose="020B0604020202020204" pitchFamily="34" charset="0"/>
+              <a:ea typeface="SimSun" panose="02010600030101010101" pitchFamily="2" charset="-122"/>
+            </a:endParaRPr>
+          </a:p>
+          <a:p>
+            <a:pPr marL="514350" lvl="1" indent="0">
+              <a:lnSpc>
+                <a:spcPct val="110000"/>
+              </a:lnSpc>
+              <a:spcBef>
+                <a:spcPts val="0"/>
+              </a:spcBef>
+              <a:spcAft>
+                <a:spcPts val="0"/>
+              </a:spcAft>
+              <a:buNone/>
+            </a:pPr>
+            <a:r>
+              <a:rPr lang="en-US" sz="1050" dirty="0">
+                <a:solidFill>
+                  <a:srgbClr val="00589A"/>
+                </a:solidFill>
+                <a:effectLst/>
+                <a:latin typeface="Arial" panose="020B0604020202020204" pitchFamily="34" charset="0"/>
+                <a:ea typeface="SimSun" panose="02010600030101010101" pitchFamily="2" charset="-122"/>
+              </a:rPr>
+              <a:t>In this session Brian and I will examine some common actuarial analysis problems (e.g. loss development, trend/inflation, mix shift exhibits, and model diagnostics) through the lens of visualization. Using R’s </a:t>
+            </a:r>
+            <a:r>
+              <a:rPr lang="en-US" sz="1050" dirty="0">
+                <a:effectLst/>
+                <a:latin typeface="Arial" panose="020B0604020202020204" pitchFamily="34" charset="0"/>
+                <a:ea typeface="SimSun" panose="02010600030101010101" pitchFamily="2" charset="-122"/>
+              </a:rPr>
+              <a:t>`ggplot2` </a:t>
+            </a:r>
+            <a:r>
+              <a:rPr lang="en-US" sz="1050" dirty="0">
+                <a:solidFill>
+                  <a:srgbClr val="00589A"/>
+                </a:solidFill>
+                <a:effectLst/>
+                <a:latin typeface="Arial" panose="020B0604020202020204" pitchFamily="34" charset="0"/>
+                <a:ea typeface="SimSun" panose="02010600030101010101" pitchFamily="2" charset="-122"/>
+              </a:rPr>
+              <a:t>package, we’ll show how these visualizations can be improved to better communicate the story. For example, reserve loss development can be manipulated with</a:t>
+            </a:r>
+            <a:r>
+              <a:rPr lang="en-US" sz="1050" dirty="0">
+                <a:effectLst/>
+                <a:latin typeface="Arial" panose="020B0604020202020204" pitchFamily="34" charset="0"/>
+                <a:ea typeface="SimSun" panose="02010600030101010101" pitchFamily="2" charset="-122"/>
+              </a:rPr>
+              <a:t> `</a:t>
+            </a:r>
+            <a:r>
+              <a:rPr lang="en-US" sz="1050" dirty="0" err="1">
+                <a:effectLst/>
+                <a:latin typeface="Arial" panose="020B0604020202020204" pitchFamily="34" charset="0"/>
+                <a:ea typeface="SimSun" panose="02010600030101010101" pitchFamily="2" charset="-122"/>
+              </a:rPr>
+              <a:t>dplyr</a:t>
+            </a:r>
+            <a:r>
+              <a:rPr lang="en-US" sz="1050" dirty="0">
+                <a:effectLst/>
+                <a:latin typeface="Arial" panose="020B0604020202020204" pitchFamily="34" charset="0"/>
+                <a:ea typeface="SimSun" panose="02010600030101010101" pitchFamily="2" charset="-122"/>
+              </a:rPr>
+              <a:t>`</a:t>
+            </a:r>
+            <a:r>
+              <a:rPr lang="en-US" sz="1050" dirty="0">
+                <a:solidFill>
+                  <a:srgbClr val="00589A"/>
+                </a:solidFill>
+                <a:effectLst/>
+                <a:latin typeface="Arial" panose="020B0604020202020204" pitchFamily="34" charset="0"/>
+                <a:ea typeface="SimSun" panose="02010600030101010101" pitchFamily="2" charset="-122"/>
+              </a:rPr>
+              <a:t> to show cumulative losses on the x-axis and incremental amounts on the y-axis to better highlight the loss development factor. After demoing a few visualization examples, we’ll show how some formatting tricks can be used to make your visualizations look polished.</a:t>
+            </a:r>
+            <a:endParaRPr lang="en-US" sz="1050" dirty="0">
+              <a:solidFill>
+                <a:srgbClr val="0072BC"/>
+              </a:solidFill>
+              <a:ea typeface="SimSun" panose="02010600030101010101" pitchFamily="2" charset="-122"/>
+            </a:endParaRPr>
+          </a:p>
+          <a:p>
+            <a:pPr marL="114300" indent="0">
+              <a:lnSpc>
+                <a:spcPct val="110000"/>
+              </a:lnSpc>
+              <a:spcBef>
+                <a:spcPts val="0"/>
+              </a:spcBef>
+              <a:spcAft>
+                <a:spcPts val="0"/>
+              </a:spcAft>
+              <a:buNone/>
+            </a:pPr>
+            <a:r>
+              <a:rPr lang="en-US" sz="1050" b="1" dirty="0">
+                <a:solidFill>
+                  <a:srgbClr val="00589A"/>
+                </a:solidFill>
+                <a:effectLst/>
+                <a:latin typeface="Arial" panose="020B0604020202020204" pitchFamily="34" charset="0"/>
+                <a:ea typeface="SimSun" panose="02010600030101010101" pitchFamily="2" charset="-122"/>
+              </a:rPr>
+              <a:t>Learning Objectives:</a:t>
+            </a:r>
+            <a:endParaRPr lang="en-US" sz="1050" b="1" dirty="0">
+              <a:ea typeface="SimSun" panose="02010600030101010101" pitchFamily="2" charset="-122"/>
+            </a:endParaRPr>
+          </a:p>
+          <a:p>
+            <a:pPr indent="-228600">
+              <a:lnSpc>
+                <a:spcPct val="110000"/>
+              </a:lnSpc>
+              <a:spcBef>
+                <a:spcPts val="0"/>
+              </a:spcBef>
+              <a:spcAft>
+                <a:spcPts val="0"/>
+              </a:spcAft>
+              <a:buFont typeface="+mj-lt"/>
+              <a:buAutoNum type="arabicPeriod"/>
+            </a:pPr>
+            <a:r>
+              <a:rPr lang="en-US" sz="1050" dirty="0">
+                <a:solidFill>
+                  <a:srgbClr val="00589A"/>
+                </a:solidFill>
+                <a:effectLst/>
+                <a:latin typeface="Arial" panose="020B0604020202020204" pitchFamily="34" charset="0"/>
+                <a:ea typeface="SimSun" panose="02010600030101010101" pitchFamily="2" charset="-122"/>
+              </a:rPr>
+              <a:t>Demonstrate when alternative representations of common actuarial visualizations are helpful</a:t>
+            </a:r>
+            <a:endParaRPr lang="en-US" sz="1050" dirty="0">
+              <a:ea typeface="SimSun" panose="02010600030101010101" pitchFamily="2" charset="-122"/>
+            </a:endParaRPr>
+          </a:p>
+          <a:p>
+            <a:pPr indent="-228600">
+              <a:lnSpc>
+                <a:spcPct val="110000"/>
+              </a:lnSpc>
+              <a:spcBef>
+                <a:spcPts val="0"/>
+              </a:spcBef>
+              <a:spcAft>
+                <a:spcPts val="0"/>
+              </a:spcAft>
+              <a:buFont typeface="+mj-lt"/>
+              <a:buAutoNum type="arabicPeriod"/>
+            </a:pPr>
+            <a:r>
+              <a:rPr lang="en-US" sz="1050" dirty="0">
+                <a:solidFill>
+                  <a:srgbClr val="00589A"/>
+                </a:solidFill>
+                <a:effectLst/>
+                <a:latin typeface="Arial" panose="020B0604020202020204" pitchFamily="34" charset="0"/>
+                <a:ea typeface="SimSun" panose="02010600030101010101" pitchFamily="2" charset="-122"/>
+              </a:rPr>
+              <a:t>Basic use of the </a:t>
+            </a:r>
+            <a:r>
+              <a:rPr lang="en-US" sz="1050" dirty="0">
+                <a:effectLst/>
+                <a:latin typeface="Arial" panose="020B0604020202020204" pitchFamily="34" charset="0"/>
+                <a:ea typeface="SimSun" panose="02010600030101010101" pitchFamily="2" charset="-122"/>
+              </a:rPr>
+              <a:t>`ggplot2`</a:t>
+            </a:r>
+            <a:r>
+              <a:rPr lang="en-US" sz="1050" dirty="0">
+                <a:solidFill>
+                  <a:srgbClr val="00589A"/>
+                </a:solidFill>
+                <a:effectLst/>
+                <a:latin typeface="Arial" panose="020B0604020202020204" pitchFamily="34" charset="0"/>
+                <a:ea typeface="SimSun" panose="02010600030101010101" pitchFamily="2" charset="-122"/>
+              </a:rPr>
+              <a:t> package</a:t>
+            </a:r>
+            <a:endParaRPr lang="en-US" sz="1050" dirty="0">
+              <a:ea typeface="SimSun" panose="02010600030101010101" pitchFamily="2" charset="-122"/>
+            </a:endParaRPr>
+          </a:p>
+          <a:p>
+            <a:pPr indent="-228600">
+              <a:lnSpc>
+                <a:spcPct val="110000"/>
+              </a:lnSpc>
+              <a:spcBef>
+                <a:spcPts val="0"/>
+              </a:spcBef>
+              <a:spcAft>
+                <a:spcPts val="0"/>
+              </a:spcAft>
+              <a:buFont typeface="+mj-lt"/>
+              <a:buAutoNum type="arabicPeriod"/>
+            </a:pPr>
+            <a:r>
+              <a:rPr lang="en-US" sz="1050" dirty="0">
+                <a:solidFill>
+                  <a:srgbClr val="00589A"/>
+                </a:solidFill>
+                <a:effectLst/>
+                <a:latin typeface="Arial" panose="020B0604020202020204" pitchFamily="34" charset="0"/>
+                <a:ea typeface="SimSun" panose="02010600030101010101" pitchFamily="2" charset="-122"/>
+              </a:rPr>
+              <a:t>When and how to use non-data formatting to customize a visualization for your audience</a:t>
+            </a:r>
+            <a:endParaRPr lang="en-US" sz="1050" dirty="0">
+              <a:effectLst/>
+              <a:latin typeface="Arial" panose="020B0604020202020204" pitchFamily="34" charset="0"/>
+              <a:ea typeface="SimSun" panose="02010600030101010101" pitchFamily="2" charset="-122"/>
+            </a:endParaRPr>
+          </a:p>
+          <a:p>
+            <a:pPr marL="114300" marR="0" indent="0">
+              <a:lnSpc>
+                <a:spcPct val="110000"/>
+              </a:lnSpc>
+              <a:spcBef>
+                <a:spcPts val="0"/>
+              </a:spcBef>
+              <a:spcAft>
+                <a:spcPts val="0"/>
+              </a:spcAft>
+              <a:buNone/>
+            </a:pPr>
+            <a:r>
+              <a:rPr lang="en-US" sz="1050" b="1" dirty="0">
+                <a:solidFill>
+                  <a:srgbClr val="00589A"/>
+                </a:solidFill>
+                <a:effectLst/>
+                <a:latin typeface="Arial" panose="020B0604020202020204" pitchFamily="34" charset="0"/>
+                <a:ea typeface="SimSun" panose="02010600030101010101" pitchFamily="2" charset="-122"/>
+              </a:rPr>
+              <a:t>Session Format</a:t>
+            </a:r>
+            <a:r>
+              <a:rPr lang="en-US" sz="1050" dirty="0">
+                <a:solidFill>
+                  <a:srgbClr val="00589A"/>
+                </a:solidFill>
+                <a:effectLst/>
+                <a:latin typeface="Arial" panose="020B0604020202020204" pitchFamily="34" charset="0"/>
+                <a:ea typeface="SimSun" panose="02010600030101010101" pitchFamily="2" charset="-122"/>
+              </a:rPr>
+              <a:t>: Concurrent Session, 50-60 minutes</a:t>
+            </a:r>
+            <a:endParaRPr lang="en-US" sz="1050" dirty="0">
+              <a:effectLst/>
+              <a:latin typeface="Arial" panose="020B0604020202020204" pitchFamily="34" charset="0"/>
+              <a:ea typeface="SimSun" panose="02010600030101010101" pitchFamily="2" charset="-122"/>
+            </a:endParaRPr>
+          </a:p>
+          <a:p>
+            <a:pPr marL="114300" marR="0" indent="0">
+              <a:lnSpc>
+                <a:spcPct val="110000"/>
+              </a:lnSpc>
+              <a:spcBef>
+                <a:spcPts val="0"/>
+              </a:spcBef>
+              <a:spcAft>
+                <a:spcPts val="0"/>
+              </a:spcAft>
+              <a:buNone/>
+            </a:pPr>
+            <a:r>
+              <a:rPr lang="en-US" sz="1050" b="1" dirty="0">
+                <a:solidFill>
+                  <a:srgbClr val="00589A"/>
+                </a:solidFill>
+                <a:effectLst/>
+                <a:latin typeface="Arial" panose="020B0604020202020204" pitchFamily="34" charset="0"/>
+                <a:ea typeface="SimSun" panose="02010600030101010101" pitchFamily="2" charset="-122"/>
+              </a:rPr>
+              <a:t>Theme</a:t>
+            </a:r>
+            <a:r>
+              <a:rPr lang="en-US" sz="1050" dirty="0">
+                <a:solidFill>
+                  <a:srgbClr val="00589A"/>
+                </a:solidFill>
+                <a:effectLst/>
+                <a:latin typeface="Arial" panose="020B0604020202020204" pitchFamily="34" charset="0"/>
+                <a:ea typeface="SimSun" panose="02010600030101010101" pitchFamily="2" charset="-122"/>
+              </a:rPr>
+              <a:t>: Navigate</a:t>
+            </a:r>
+            <a:endParaRPr lang="en-US" sz="1050" dirty="0">
+              <a:effectLst/>
+              <a:latin typeface="Arial" panose="020B0604020202020204" pitchFamily="34" charset="0"/>
+              <a:ea typeface="SimSun" panose="02010600030101010101" pitchFamily="2" charset="-122"/>
+            </a:endParaRPr>
+          </a:p>
+          <a:p>
+            <a:pPr marL="114300" marR="0" indent="0">
+              <a:lnSpc>
+                <a:spcPct val="110000"/>
+              </a:lnSpc>
+              <a:spcBef>
+                <a:spcPts val="0"/>
+              </a:spcBef>
+              <a:spcAft>
+                <a:spcPts val="0"/>
+              </a:spcAft>
+              <a:buNone/>
+            </a:pPr>
+            <a:r>
+              <a:rPr lang="en-US" sz="1050" b="1" dirty="0">
+                <a:solidFill>
+                  <a:srgbClr val="00589A"/>
+                </a:solidFill>
+                <a:effectLst/>
+                <a:latin typeface="Arial" panose="020B0604020202020204" pitchFamily="34" charset="0"/>
+                <a:ea typeface="SimSun" panose="02010600030101010101" pitchFamily="2" charset="-122"/>
+              </a:rPr>
+              <a:t>Applicable Areas</a:t>
+            </a:r>
+            <a:r>
+              <a:rPr lang="en-US" sz="1050" dirty="0">
+                <a:solidFill>
+                  <a:srgbClr val="00589A"/>
+                </a:solidFill>
+                <a:effectLst/>
+                <a:latin typeface="Arial" panose="020B0604020202020204" pitchFamily="34" charset="0"/>
+                <a:ea typeface="SimSun" panose="02010600030101010101" pitchFamily="2" charset="-122"/>
+              </a:rPr>
+              <a:t>: Actuarial Toolkit: Programming Software, Data Manipulation Tools, and Data Visualization Tools</a:t>
+            </a:r>
+            <a:endParaRPr lang="en-US" sz="1050" dirty="0">
+              <a:effectLst/>
+              <a:latin typeface="Arial" panose="020B0604020202020204" pitchFamily="34" charset="0"/>
+              <a:ea typeface="SimSun" panose="02010600030101010101" pitchFamily="2" charset="-122"/>
+            </a:endParaRPr>
+          </a:p>
+          <a:p>
+            <a:pPr marL="114300" marR="0" indent="0">
+              <a:lnSpc>
+                <a:spcPct val="110000"/>
+              </a:lnSpc>
+              <a:spcBef>
+                <a:spcPts val="0"/>
+              </a:spcBef>
+              <a:spcAft>
+                <a:spcPts val="0"/>
+              </a:spcAft>
+              <a:buNone/>
+            </a:pPr>
+            <a:r>
+              <a:rPr lang="en-US" sz="1050" b="1" dirty="0">
+                <a:solidFill>
+                  <a:srgbClr val="00589A"/>
+                </a:solidFill>
+                <a:effectLst/>
+                <a:latin typeface="Arial" panose="020B0604020202020204" pitchFamily="34" charset="0"/>
+                <a:ea typeface="SimSun" panose="02010600030101010101" pitchFamily="2" charset="-122"/>
+              </a:rPr>
+              <a:t>Knowledge Level</a:t>
+            </a:r>
+            <a:r>
+              <a:rPr lang="en-US" sz="1050" dirty="0">
+                <a:solidFill>
+                  <a:srgbClr val="00589A"/>
+                </a:solidFill>
+                <a:effectLst/>
+                <a:latin typeface="Arial" panose="020B0604020202020204" pitchFamily="34" charset="0"/>
+                <a:ea typeface="SimSun" panose="02010600030101010101" pitchFamily="2" charset="-122"/>
+              </a:rPr>
+              <a:t>: Level 2: General Knowledge of the Subject (6-9 years)</a:t>
+            </a:r>
+            <a:endParaRPr lang="en-US" sz="1050" dirty="0">
+              <a:effectLst/>
+              <a:latin typeface="Arial" panose="020B0604020202020204" pitchFamily="34" charset="0"/>
+              <a:ea typeface="SimSun" panose="02010600030101010101" pitchFamily="2" charset="-122"/>
+            </a:endParaRPr>
+          </a:p>
+          <a:p>
+            <a:pPr marL="114300" marR="0" indent="0">
+              <a:lnSpc>
+                <a:spcPct val="110000"/>
+              </a:lnSpc>
+              <a:spcBef>
+                <a:spcPts val="0"/>
+              </a:spcBef>
+              <a:spcAft>
+                <a:spcPts val="0"/>
+              </a:spcAft>
+              <a:buNone/>
+            </a:pPr>
+            <a:r>
+              <a:rPr lang="en-US" sz="1050" b="1" dirty="0">
+                <a:solidFill>
+                  <a:srgbClr val="00589A"/>
+                </a:solidFill>
+                <a:effectLst/>
+                <a:latin typeface="Arial" panose="020B0604020202020204" pitchFamily="34" charset="0"/>
+                <a:ea typeface="SimSun" panose="02010600030101010101" pitchFamily="2" charset="-122"/>
+              </a:rPr>
+              <a:t>Interactive Elements</a:t>
+            </a:r>
+            <a:r>
+              <a:rPr lang="en-US" sz="1050" dirty="0">
+                <a:solidFill>
+                  <a:srgbClr val="00589A"/>
+                </a:solidFill>
+                <a:effectLst/>
+                <a:latin typeface="Arial" panose="020B0604020202020204" pitchFamily="34" charset="0"/>
+                <a:ea typeface="SimSun" panose="02010600030101010101" pitchFamily="2" charset="-122"/>
+              </a:rPr>
+              <a:t>: There will be one or two discussion prompts, as well live voting to compare different means of visualizing data analysis</a:t>
+            </a:r>
+            <a:endParaRPr lang="en-US" sz="1050" dirty="0">
+              <a:effectLst/>
+              <a:latin typeface="Arial" panose="020B0604020202020204" pitchFamily="34" charset="0"/>
+              <a:ea typeface="SimSun" panose="02010600030101010101" pitchFamily="2" charset="-122"/>
+            </a:endParaRPr>
+          </a:p>
+          <a:p>
+            <a:endParaRPr lang="en-US" sz="1050" dirty="0"/>
+          </a:p>
+        </p:txBody>
+      </p:sp>
+      <p:sp>
+        <p:nvSpPr>
+          <p:cNvPr id="4" name="Rectangle 3">
+            <a:extLst>
+              <a:ext uri="{FF2B5EF4-FFF2-40B4-BE49-F238E27FC236}">
+                <a16:creationId xmlns:a16="http://schemas.microsoft.com/office/drawing/2014/main" id="{9BEF9406-5BE2-272B-C07C-310932DEEE05}"/>
+              </a:ext>
+            </a:extLst>
+          </p:cNvPr>
+          <p:cNvSpPr/>
+          <p:nvPr/>
+        </p:nvSpPr>
+        <p:spPr>
+          <a:xfrm>
+            <a:off x="0" y="5638800"/>
+            <a:ext cx="5029200" cy="1219199"/>
+          </a:xfrm>
+          <a:prstGeom prst="rect">
+            <a:avLst/>
+          </a:prstGeom>
+          <a:solidFill>
+            <a:srgbClr val="FFFF00"/>
+          </a:solidFill>
+        </p:spPr>
+        <p:style>
+          <a:lnRef idx="2">
+            <a:schemeClr val="accent1">
+              <a:shade val="50000"/>
+            </a:schemeClr>
+          </a:lnRef>
+          <a:fillRef idx="1">
+            <a:schemeClr val="accent1"/>
+          </a:fillRef>
+          <a:effectRef idx="0">
+            <a:schemeClr val="accent1"/>
+          </a:effectRef>
+          <a:fontRef idx="minor">
+            <a:schemeClr val="lt1"/>
+          </a:fontRef>
+        </p:style>
+        <p:txBody>
+          <a:bodyPr rtlCol="0" anchor="ctr"/>
+          <a:lstStyle/>
+          <a:p>
+            <a:pPr algn="ctr"/>
+            <a:r>
+              <a:rPr lang="en-US" b="1" dirty="0">
+                <a:solidFill>
+                  <a:schemeClr val="tx1"/>
+                </a:solidFill>
+              </a:rPr>
+              <a:t>To Be Removed. For Reference Only.</a:t>
             </a:r>
           </a:p>
         </p:txBody>
@@ -14212,7 +14913,839 @@
     </p:spTree>
     <p:extLst>
       <p:ext uri="{BB962C8B-B14F-4D97-AF65-F5344CB8AC3E}">
-        <p14:creationId xmlns:p14="http://schemas.microsoft.com/office/powerpoint/2010/main" val="3575641883"/>
+        <p14:creationId xmlns:p14="http://schemas.microsoft.com/office/powerpoint/2010/main" val="2821091003"/>
+      </p:ext>
+    </p:extLst>
+  </p:cSld>
+  <p:clrMapOvr>
+    <a:masterClrMapping/>
+  </p:clrMapOvr>
+</p:sld>
+</file>
+
+<file path=ppt/slides/slide10.xml><?xml version="1.0" encoding="utf-8"?>
+<p:sld xmlns:a="http://schemas.openxmlformats.org/drawingml/2006/main" xmlns:r="http://schemas.openxmlformats.org/officeDocument/2006/relationships" xmlns:p="http://schemas.openxmlformats.org/presentationml/2006/main">
+  <p:cSld>
+    <p:spTree>
+      <p:nvGrpSpPr>
+        <p:cNvPr id="1" name=""/>
+        <p:cNvGrpSpPr/>
+        <p:nvPr/>
+      </p:nvGrpSpPr>
+      <p:grpSpPr>
+        <a:xfrm>
+          <a:off x="0" y="0"/>
+          <a:ext cx="0" cy="0"/>
+          <a:chOff x="0" y="0"/>
+          <a:chExt cx="0" cy="0"/>
+        </a:xfrm>
+      </p:grpSpPr>
+      <p:sp>
+        <p:nvSpPr>
+          <p:cNvPr id="2" name="Title 1">
+            <a:extLst>
+              <a:ext uri="{FF2B5EF4-FFF2-40B4-BE49-F238E27FC236}">
+                <a16:creationId xmlns:a16="http://schemas.microsoft.com/office/drawing/2014/main" id="{18969BF5-0288-FD7C-1739-0C8672F3D7F8}"/>
+              </a:ext>
+            </a:extLst>
+          </p:cNvPr>
+          <p:cNvSpPr>
+            <a:spLocks noGrp="1"/>
+          </p:cNvSpPr>
+          <p:nvPr>
+            <p:ph type="title"/>
+          </p:nvPr>
+        </p:nvSpPr>
+        <p:spPr/>
+        <p:txBody>
+          <a:bodyPr/>
+          <a:lstStyle/>
+          <a:p>
+            <a:r>
+              <a:rPr lang="en-US" dirty="0"/>
+              <a:t>Loss Development Triangles</a:t>
+            </a:r>
+          </a:p>
+        </p:txBody>
+      </p:sp>
+      <p:sp>
+        <p:nvSpPr>
+          <p:cNvPr id="3" name="Content Placeholder 2">
+            <a:extLst>
+              <a:ext uri="{FF2B5EF4-FFF2-40B4-BE49-F238E27FC236}">
+                <a16:creationId xmlns:a16="http://schemas.microsoft.com/office/drawing/2014/main" id="{39176E43-0115-E50B-D268-5E00760022A7}"/>
+              </a:ext>
+            </a:extLst>
+          </p:cNvPr>
+          <p:cNvSpPr>
+            <a:spLocks noGrp="1"/>
+          </p:cNvSpPr>
+          <p:nvPr>
+            <p:ph idx="1"/>
+          </p:nvPr>
+        </p:nvSpPr>
+        <p:spPr/>
+        <p:txBody>
+          <a:bodyPr/>
+          <a:lstStyle/>
+          <a:p>
+            <a:endParaRPr lang="en-US" dirty="0"/>
+          </a:p>
+        </p:txBody>
+      </p:sp>
+    </p:spTree>
+    <p:extLst>
+      <p:ext uri="{BB962C8B-B14F-4D97-AF65-F5344CB8AC3E}">
+        <p14:creationId xmlns:p14="http://schemas.microsoft.com/office/powerpoint/2010/main" val="2988560573"/>
+      </p:ext>
+    </p:extLst>
+  </p:cSld>
+  <p:clrMapOvr>
+    <a:masterClrMapping/>
+  </p:clrMapOvr>
+</p:sld>
+</file>
+
+<file path=ppt/slides/slide11.xml><?xml version="1.0" encoding="utf-8"?>
+<p:sld xmlns:a="http://schemas.openxmlformats.org/drawingml/2006/main" xmlns:r="http://schemas.openxmlformats.org/officeDocument/2006/relationships" xmlns:p="http://schemas.openxmlformats.org/presentationml/2006/main">
+  <p:cSld>
+    <p:spTree>
+      <p:nvGrpSpPr>
+        <p:cNvPr id="1" name=""/>
+        <p:cNvGrpSpPr/>
+        <p:nvPr/>
+      </p:nvGrpSpPr>
+      <p:grpSpPr>
+        <a:xfrm>
+          <a:off x="0" y="0"/>
+          <a:ext cx="0" cy="0"/>
+          <a:chOff x="0" y="0"/>
+          <a:chExt cx="0" cy="0"/>
+        </a:xfrm>
+      </p:grpSpPr>
+      <p:sp>
+        <p:nvSpPr>
+          <p:cNvPr id="2" name="Title 1">
+            <a:extLst>
+              <a:ext uri="{FF2B5EF4-FFF2-40B4-BE49-F238E27FC236}">
+                <a16:creationId xmlns:a16="http://schemas.microsoft.com/office/drawing/2014/main" id="{18969BF5-0288-FD7C-1739-0C8672F3D7F8}"/>
+              </a:ext>
+            </a:extLst>
+          </p:cNvPr>
+          <p:cNvSpPr>
+            <a:spLocks noGrp="1"/>
+          </p:cNvSpPr>
+          <p:nvPr>
+            <p:ph type="title"/>
+          </p:nvPr>
+        </p:nvSpPr>
+        <p:spPr/>
+        <p:txBody>
+          <a:bodyPr/>
+          <a:lstStyle/>
+          <a:p>
+            <a:r>
+              <a:rPr lang="en-US" dirty="0"/>
+              <a:t>Trend Selection</a:t>
+            </a:r>
+          </a:p>
+        </p:txBody>
+      </p:sp>
+      <p:sp>
+        <p:nvSpPr>
+          <p:cNvPr id="3" name="Content Placeholder 2">
+            <a:extLst>
+              <a:ext uri="{FF2B5EF4-FFF2-40B4-BE49-F238E27FC236}">
+                <a16:creationId xmlns:a16="http://schemas.microsoft.com/office/drawing/2014/main" id="{39176E43-0115-E50B-D268-5E00760022A7}"/>
+              </a:ext>
+            </a:extLst>
+          </p:cNvPr>
+          <p:cNvSpPr>
+            <a:spLocks noGrp="1"/>
+          </p:cNvSpPr>
+          <p:nvPr>
+            <p:ph idx="1"/>
+          </p:nvPr>
+        </p:nvSpPr>
+        <p:spPr/>
+        <p:txBody>
+          <a:bodyPr/>
+          <a:lstStyle/>
+          <a:p>
+            <a:endParaRPr lang="en-US" dirty="0"/>
+          </a:p>
+        </p:txBody>
+      </p:sp>
+    </p:spTree>
+    <p:extLst>
+      <p:ext uri="{BB962C8B-B14F-4D97-AF65-F5344CB8AC3E}">
+        <p14:creationId xmlns:p14="http://schemas.microsoft.com/office/powerpoint/2010/main" val="3996687486"/>
+      </p:ext>
+    </p:extLst>
+  </p:cSld>
+  <p:clrMapOvr>
+    <a:masterClrMapping/>
+  </p:clrMapOvr>
+</p:sld>
+</file>
+
+<file path=ppt/slides/slide12.xml><?xml version="1.0" encoding="utf-8"?>
+<p:sld xmlns:a="http://schemas.openxmlformats.org/drawingml/2006/main" xmlns:r="http://schemas.openxmlformats.org/officeDocument/2006/relationships" xmlns:p="http://schemas.openxmlformats.org/presentationml/2006/main">
+  <p:cSld>
+    <p:spTree>
+      <p:nvGrpSpPr>
+        <p:cNvPr id="1" name=""/>
+        <p:cNvGrpSpPr/>
+        <p:nvPr/>
+      </p:nvGrpSpPr>
+      <p:grpSpPr>
+        <a:xfrm>
+          <a:off x="0" y="0"/>
+          <a:ext cx="0" cy="0"/>
+          <a:chOff x="0" y="0"/>
+          <a:chExt cx="0" cy="0"/>
+        </a:xfrm>
+      </p:grpSpPr>
+      <p:sp>
+        <p:nvSpPr>
+          <p:cNvPr id="2" name="Title 1">
+            <a:extLst>
+              <a:ext uri="{FF2B5EF4-FFF2-40B4-BE49-F238E27FC236}">
+                <a16:creationId xmlns:a16="http://schemas.microsoft.com/office/drawing/2014/main" id="{18969BF5-0288-FD7C-1739-0C8672F3D7F8}"/>
+              </a:ext>
+            </a:extLst>
+          </p:cNvPr>
+          <p:cNvSpPr>
+            <a:spLocks noGrp="1"/>
+          </p:cNvSpPr>
+          <p:nvPr>
+            <p:ph type="title"/>
+          </p:nvPr>
+        </p:nvSpPr>
+        <p:spPr/>
+        <p:txBody>
+          <a:bodyPr/>
+          <a:lstStyle/>
+          <a:p>
+            <a:r>
+              <a:rPr lang="en-US" dirty="0"/>
+              <a:t>Trend Selection</a:t>
+            </a:r>
+          </a:p>
+        </p:txBody>
+      </p:sp>
+      <p:sp>
+        <p:nvSpPr>
+          <p:cNvPr id="3" name="Content Placeholder 2">
+            <a:extLst>
+              <a:ext uri="{FF2B5EF4-FFF2-40B4-BE49-F238E27FC236}">
+                <a16:creationId xmlns:a16="http://schemas.microsoft.com/office/drawing/2014/main" id="{39176E43-0115-E50B-D268-5E00760022A7}"/>
+              </a:ext>
+            </a:extLst>
+          </p:cNvPr>
+          <p:cNvSpPr>
+            <a:spLocks noGrp="1"/>
+          </p:cNvSpPr>
+          <p:nvPr>
+            <p:ph idx="1"/>
+          </p:nvPr>
+        </p:nvSpPr>
+        <p:spPr/>
+        <p:txBody>
+          <a:bodyPr/>
+          <a:lstStyle/>
+          <a:p>
+            <a:endParaRPr lang="en-US" dirty="0"/>
+          </a:p>
+        </p:txBody>
+      </p:sp>
+    </p:spTree>
+    <p:extLst>
+      <p:ext uri="{BB962C8B-B14F-4D97-AF65-F5344CB8AC3E}">
+        <p14:creationId xmlns:p14="http://schemas.microsoft.com/office/powerpoint/2010/main" val="2234546495"/>
+      </p:ext>
+    </p:extLst>
+  </p:cSld>
+  <p:clrMapOvr>
+    <a:masterClrMapping/>
+  </p:clrMapOvr>
+</p:sld>
+</file>
+
+<file path=ppt/slides/slide13.xml><?xml version="1.0" encoding="utf-8"?>
+<p:sld xmlns:a="http://schemas.openxmlformats.org/drawingml/2006/main" xmlns:r="http://schemas.openxmlformats.org/officeDocument/2006/relationships" xmlns:p="http://schemas.openxmlformats.org/presentationml/2006/main">
+  <p:cSld>
+    <p:spTree>
+      <p:nvGrpSpPr>
+        <p:cNvPr id="1" name=""/>
+        <p:cNvGrpSpPr/>
+        <p:nvPr/>
+      </p:nvGrpSpPr>
+      <p:grpSpPr>
+        <a:xfrm>
+          <a:off x="0" y="0"/>
+          <a:ext cx="0" cy="0"/>
+          <a:chOff x="0" y="0"/>
+          <a:chExt cx="0" cy="0"/>
+        </a:xfrm>
+      </p:grpSpPr>
+      <p:sp>
+        <p:nvSpPr>
+          <p:cNvPr id="2" name="Title 1">
+            <a:extLst>
+              <a:ext uri="{FF2B5EF4-FFF2-40B4-BE49-F238E27FC236}">
+                <a16:creationId xmlns:a16="http://schemas.microsoft.com/office/drawing/2014/main" id="{18969BF5-0288-FD7C-1739-0C8672F3D7F8}"/>
+              </a:ext>
+            </a:extLst>
+          </p:cNvPr>
+          <p:cNvSpPr>
+            <a:spLocks noGrp="1"/>
+          </p:cNvSpPr>
+          <p:nvPr>
+            <p:ph type="title"/>
+          </p:nvPr>
+        </p:nvSpPr>
+        <p:spPr/>
+        <p:txBody>
+          <a:bodyPr/>
+          <a:lstStyle/>
+          <a:p>
+            <a:r>
+              <a:rPr lang="en-US" dirty="0"/>
+              <a:t>Rate Indications</a:t>
+            </a:r>
+          </a:p>
+        </p:txBody>
+      </p:sp>
+      <p:sp>
+        <p:nvSpPr>
+          <p:cNvPr id="3" name="Content Placeholder 2">
+            <a:extLst>
+              <a:ext uri="{FF2B5EF4-FFF2-40B4-BE49-F238E27FC236}">
+                <a16:creationId xmlns:a16="http://schemas.microsoft.com/office/drawing/2014/main" id="{39176E43-0115-E50B-D268-5E00760022A7}"/>
+              </a:ext>
+            </a:extLst>
+          </p:cNvPr>
+          <p:cNvSpPr>
+            <a:spLocks noGrp="1"/>
+          </p:cNvSpPr>
+          <p:nvPr>
+            <p:ph idx="1"/>
+          </p:nvPr>
+        </p:nvSpPr>
+        <p:spPr/>
+        <p:txBody>
+          <a:bodyPr/>
+          <a:lstStyle/>
+          <a:p>
+            <a:endParaRPr lang="en-US" dirty="0"/>
+          </a:p>
+        </p:txBody>
+      </p:sp>
+    </p:spTree>
+    <p:extLst>
+      <p:ext uri="{BB962C8B-B14F-4D97-AF65-F5344CB8AC3E}">
+        <p14:creationId xmlns:p14="http://schemas.microsoft.com/office/powerpoint/2010/main" val="3744326896"/>
+      </p:ext>
+    </p:extLst>
+  </p:cSld>
+  <p:clrMapOvr>
+    <a:masterClrMapping/>
+  </p:clrMapOvr>
+</p:sld>
+</file>
+
+<file path=ppt/slides/slide14.xml><?xml version="1.0" encoding="utf-8"?>
+<p:sld xmlns:a="http://schemas.openxmlformats.org/drawingml/2006/main" xmlns:r="http://schemas.openxmlformats.org/officeDocument/2006/relationships" xmlns:p="http://schemas.openxmlformats.org/presentationml/2006/main">
+  <p:cSld>
+    <p:spTree>
+      <p:nvGrpSpPr>
+        <p:cNvPr id="1" name=""/>
+        <p:cNvGrpSpPr/>
+        <p:nvPr/>
+      </p:nvGrpSpPr>
+      <p:grpSpPr>
+        <a:xfrm>
+          <a:off x="0" y="0"/>
+          <a:ext cx="0" cy="0"/>
+          <a:chOff x="0" y="0"/>
+          <a:chExt cx="0" cy="0"/>
+        </a:xfrm>
+      </p:grpSpPr>
+      <p:sp>
+        <p:nvSpPr>
+          <p:cNvPr id="2" name="Title 1">
+            <a:extLst>
+              <a:ext uri="{FF2B5EF4-FFF2-40B4-BE49-F238E27FC236}">
+                <a16:creationId xmlns:a16="http://schemas.microsoft.com/office/drawing/2014/main" id="{18969BF5-0288-FD7C-1739-0C8672F3D7F8}"/>
+              </a:ext>
+            </a:extLst>
+          </p:cNvPr>
+          <p:cNvSpPr>
+            <a:spLocks noGrp="1"/>
+          </p:cNvSpPr>
+          <p:nvPr>
+            <p:ph type="title"/>
+          </p:nvPr>
+        </p:nvSpPr>
+        <p:spPr/>
+        <p:txBody>
+          <a:bodyPr/>
+          <a:lstStyle/>
+          <a:p>
+            <a:r>
+              <a:rPr lang="en-US"/>
+              <a:t>Rate Indications</a:t>
+            </a:r>
+            <a:endParaRPr lang="en-US" dirty="0"/>
+          </a:p>
+        </p:txBody>
+      </p:sp>
+      <p:sp>
+        <p:nvSpPr>
+          <p:cNvPr id="3" name="Content Placeholder 2">
+            <a:extLst>
+              <a:ext uri="{FF2B5EF4-FFF2-40B4-BE49-F238E27FC236}">
+                <a16:creationId xmlns:a16="http://schemas.microsoft.com/office/drawing/2014/main" id="{39176E43-0115-E50B-D268-5E00760022A7}"/>
+              </a:ext>
+            </a:extLst>
+          </p:cNvPr>
+          <p:cNvSpPr>
+            <a:spLocks noGrp="1"/>
+          </p:cNvSpPr>
+          <p:nvPr>
+            <p:ph idx="1"/>
+          </p:nvPr>
+        </p:nvSpPr>
+        <p:spPr/>
+        <p:txBody>
+          <a:bodyPr/>
+          <a:lstStyle/>
+          <a:p>
+            <a:endParaRPr lang="en-US" dirty="0"/>
+          </a:p>
+        </p:txBody>
+      </p:sp>
+    </p:spTree>
+    <p:extLst>
+      <p:ext uri="{BB962C8B-B14F-4D97-AF65-F5344CB8AC3E}">
+        <p14:creationId xmlns:p14="http://schemas.microsoft.com/office/powerpoint/2010/main" val="2037117755"/>
+      </p:ext>
+    </p:extLst>
+  </p:cSld>
+  <p:clrMapOvr>
+    <a:masterClrMapping/>
+  </p:clrMapOvr>
+</p:sld>
+</file>
+
+<file path=ppt/slides/slide15.xml><?xml version="1.0" encoding="utf-8"?>
+<p:sld xmlns:a="http://schemas.openxmlformats.org/drawingml/2006/main" xmlns:r="http://schemas.openxmlformats.org/officeDocument/2006/relationships" xmlns:p="http://schemas.openxmlformats.org/presentationml/2006/main">
+  <p:cSld>
+    <p:spTree>
+      <p:nvGrpSpPr>
+        <p:cNvPr id="1" name=""/>
+        <p:cNvGrpSpPr/>
+        <p:nvPr/>
+      </p:nvGrpSpPr>
+      <p:grpSpPr>
+        <a:xfrm>
+          <a:off x="0" y="0"/>
+          <a:ext cx="0" cy="0"/>
+          <a:chOff x="0" y="0"/>
+          <a:chExt cx="0" cy="0"/>
+        </a:xfrm>
+      </p:grpSpPr>
+      <p:sp>
+        <p:nvSpPr>
+          <p:cNvPr id="2" name="Title 1">
+            <a:extLst>
+              <a:ext uri="{FF2B5EF4-FFF2-40B4-BE49-F238E27FC236}">
+                <a16:creationId xmlns:a16="http://schemas.microsoft.com/office/drawing/2014/main" id="{18969BF5-0288-FD7C-1739-0C8672F3D7F8}"/>
+              </a:ext>
+            </a:extLst>
+          </p:cNvPr>
+          <p:cNvSpPr>
+            <a:spLocks noGrp="1"/>
+          </p:cNvSpPr>
+          <p:nvPr>
+            <p:ph type="title"/>
+          </p:nvPr>
+        </p:nvSpPr>
+        <p:spPr/>
+        <p:txBody>
+          <a:bodyPr/>
+          <a:lstStyle/>
+          <a:p>
+            <a:r>
+              <a:rPr lang="en-US" dirty="0"/>
+              <a:t>Mix Shift</a:t>
+            </a:r>
+          </a:p>
+        </p:txBody>
+      </p:sp>
+      <p:sp>
+        <p:nvSpPr>
+          <p:cNvPr id="3" name="Content Placeholder 2">
+            <a:extLst>
+              <a:ext uri="{FF2B5EF4-FFF2-40B4-BE49-F238E27FC236}">
+                <a16:creationId xmlns:a16="http://schemas.microsoft.com/office/drawing/2014/main" id="{39176E43-0115-E50B-D268-5E00760022A7}"/>
+              </a:ext>
+            </a:extLst>
+          </p:cNvPr>
+          <p:cNvSpPr>
+            <a:spLocks noGrp="1"/>
+          </p:cNvSpPr>
+          <p:nvPr>
+            <p:ph idx="1"/>
+          </p:nvPr>
+        </p:nvSpPr>
+        <p:spPr/>
+        <p:txBody>
+          <a:bodyPr/>
+          <a:lstStyle/>
+          <a:p>
+            <a:endParaRPr lang="en-US" dirty="0"/>
+          </a:p>
+        </p:txBody>
+      </p:sp>
+    </p:spTree>
+    <p:extLst>
+      <p:ext uri="{BB962C8B-B14F-4D97-AF65-F5344CB8AC3E}">
+        <p14:creationId xmlns:p14="http://schemas.microsoft.com/office/powerpoint/2010/main" val="233457934"/>
+      </p:ext>
+    </p:extLst>
+  </p:cSld>
+  <p:clrMapOvr>
+    <a:masterClrMapping/>
+  </p:clrMapOvr>
+</p:sld>
+</file>
+
+<file path=ppt/slides/slide16.xml><?xml version="1.0" encoding="utf-8"?>
+<p:sld xmlns:a="http://schemas.openxmlformats.org/drawingml/2006/main" xmlns:r="http://schemas.openxmlformats.org/officeDocument/2006/relationships" xmlns:p="http://schemas.openxmlformats.org/presentationml/2006/main">
+  <p:cSld>
+    <p:spTree>
+      <p:nvGrpSpPr>
+        <p:cNvPr id="1" name=""/>
+        <p:cNvGrpSpPr/>
+        <p:nvPr/>
+      </p:nvGrpSpPr>
+      <p:grpSpPr>
+        <a:xfrm>
+          <a:off x="0" y="0"/>
+          <a:ext cx="0" cy="0"/>
+          <a:chOff x="0" y="0"/>
+          <a:chExt cx="0" cy="0"/>
+        </a:xfrm>
+      </p:grpSpPr>
+      <p:sp>
+        <p:nvSpPr>
+          <p:cNvPr id="2" name="Title 1">
+            <a:extLst>
+              <a:ext uri="{FF2B5EF4-FFF2-40B4-BE49-F238E27FC236}">
+                <a16:creationId xmlns:a16="http://schemas.microsoft.com/office/drawing/2014/main" id="{18969BF5-0288-FD7C-1739-0C8672F3D7F8}"/>
+              </a:ext>
+            </a:extLst>
+          </p:cNvPr>
+          <p:cNvSpPr>
+            <a:spLocks noGrp="1"/>
+          </p:cNvSpPr>
+          <p:nvPr>
+            <p:ph type="title"/>
+          </p:nvPr>
+        </p:nvSpPr>
+        <p:spPr/>
+        <p:txBody>
+          <a:bodyPr/>
+          <a:lstStyle/>
+          <a:p>
+            <a:r>
+              <a:rPr lang="en-US" dirty="0"/>
+              <a:t>Mix Shift</a:t>
+            </a:r>
+          </a:p>
+        </p:txBody>
+      </p:sp>
+      <p:sp>
+        <p:nvSpPr>
+          <p:cNvPr id="3" name="Content Placeholder 2">
+            <a:extLst>
+              <a:ext uri="{FF2B5EF4-FFF2-40B4-BE49-F238E27FC236}">
+                <a16:creationId xmlns:a16="http://schemas.microsoft.com/office/drawing/2014/main" id="{39176E43-0115-E50B-D268-5E00760022A7}"/>
+              </a:ext>
+            </a:extLst>
+          </p:cNvPr>
+          <p:cNvSpPr>
+            <a:spLocks noGrp="1"/>
+          </p:cNvSpPr>
+          <p:nvPr>
+            <p:ph idx="1"/>
+          </p:nvPr>
+        </p:nvSpPr>
+        <p:spPr/>
+        <p:txBody>
+          <a:bodyPr/>
+          <a:lstStyle/>
+          <a:p>
+            <a:endParaRPr lang="en-US" dirty="0"/>
+          </a:p>
+        </p:txBody>
+      </p:sp>
+    </p:spTree>
+    <p:extLst>
+      <p:ext uri="{BB962C8B-B14F-4D97-AF65-F5344CB8AC3E}">
+        <p14:creationId xmlns:p14="http://schemas.microsoft.com/office/powerpoint/2010/main" val="3695907033"/>
+      </p:ext>
+    </p:extLst>
+  </p:cSld>
+  <p:clrMapOvr>
+    <a:masterClrMapping/>
+  </p:clrMapOvr>
+</p:sld>
+</file>
+
+<file path=ppt/slides/slide17.xml><?xml version="1.0" encoding="utf-8"?>
+<p:sld xmlns:a="http://schemas.openxmlformats.org/drawingml/2006/main" xmlns:r="http://schemas.openxmlformats.org/officeDocument/2006/relationships" xmlns:p="http://schemas.openxmlformats.org/presentationml/2006/main">
+  <p:cSld>
+    <p:spTree>
+      <p:nvGrpSpPr>
+        <p:cNvPr id="1" name=""/>
+        <p:cNvGrpSpPr/>
+        <p:nvPr/>
+      </p:nvGrpSpPr>
+      <p:grpSpPr>
+        <a:xfrm>
+          <a:off x="0" y="0"/>
+          <a:ext cx="0" cy="0"/>
+          <a:chOff x="0" y="0"/>
+          <a:chExt cx="0" cy="0"/>
+        </a:xfrm>
+      </p:grpSpPr>
+      <p:sp>
+        <p:nvSpPr>
+          <p:cNvPr id="2" name="Title 1">
+            <a:extLst>
+              <a:ext uri="{FF2B5EF4-FFF2-40B4-BE49-F238E27FC236}">
+                <a16:creationId xmlns:a16="http://schemas.microsoft.com/office/drawing/2014/main" id="{18969BF5-0288-FD7C-1739-0C8672F3D7F8}"/>
+              </a:ext>
+            </a:extLst>
+          </p:cNvPr>
+          <p:cNvSpPr>
+            <a:spLocks noGrp="1"/>
+          </p:cNvSpPr>
+          <p:nvPr>
+            <p:ph type="title"/>
+          </p:nvPr>
+        </p:nvSpPr>
+        <p:spPr/>
+        <p:txBody>
+          <a:bodyPr/>
+          <a:lstStyle/>
+          <a:p>
+            <a:r>
+              <a:rPr lang="en-US" dirty="0"/>
+              <a:t>Model Diagnostics</a:t>
+            </a:r>
+          </a:p>
+        </p:txBody>
+      </p:sp>
+      <p:sp>
+        <p:nvSpPr>
+          <p:cNvPr id="3" name="Content Placeholder 2">
+            <a:extLst>
+              <a:ext uri="{FF2B5EF4-FFF2-40B4-BE49-F238E27FC236}">
+                <a16:creationId xmlns:a16="http://schemas.microsoft.com/office/drawing/2014/main" id="{39176E43-0115-E50B-D268-5E00760022A7}"/>
+              </a:ext>
+            </a:extLst>
+          </p:cNvPr>
+          <p:cNvSpPr>
+            <a:spLocks noGrp="1"/>
+          </p:cNvSpPr>
+          <p:nvPr>
+            <p:ph idx="1"/>
+          </p:nvPr>
+        </p:nvSpPr>
+        <p:spPr/>
+        <p:txBody>
+          <a:bodyPr/>
+          <a:lstStyle/>
+          <a:p>
+            <a:endParaRPr lang="en-US" dirty="0"/>
+          </a:p>
+        </p:txBody>
+      </p:sp>
+    </p:spTree>
+    <p:extLst>
+      <p:ext uri="{BB962C8B-B14F-4D97-AF65-F5344CB8AC3E}">
+        <p14:creationId xmlns:p14="http://schemas.microsoft.com/office/powerpoint/2010/main" val="3026868623"/>
+      </p:ext>
+    </p:extLst>
+  </p:cSld>
+  <p:clrMapOvr>
+    <a:masterClrMapping/>
+  </p:clrMapOvr>
+</p:sld>
+</file>
+
+<file path=ppt/slides/slide18.xml><?xml version="1.0" encoding="utf-8"?>
+<p:sld xmlns:a="http://schemas.openxmlformats.org/drawingml/2006/main" xmlns:r="http://schemas.openxmlformats.org/officeDocument/2006/relationships" xmlns:p="http://schemas.openxmlformats.org/presentationml/2006/main">
+  <p:cSld>
+    <p:spTree>
+      <p:nvGrpSpPr>
+        <p:cNvPr id="1" name=""/>
+        <p:cNvGrpSpPr/>
+        <p:nvPr/>
+      </p:nvGrpSpPr>
+      <p:grpSpPr>
+        <a:xfrm>
+          <a:off x="0" y="0"/>
+          <a:ext cx="0" cy="0"/>
+          <a:chOff x="0" y="0"/>
+          <a:chExt cx="0" cy="0"/>
+        </a:xfrm>
+      </p:grpSpPr>
+      <p:sp>
+        <p:nvSpPr>
+          <p:cNvPr id="2" name="Title 1">
+            <a:extLst>
+              <a:ext uri="{FF2B5EF4-FFF2-40B4-BE49-F238E27FC236}">
+                <a16:creationId xmlns:a16="http://schemas.microsoft.com/office/drawing/2014/main" id="{18969BF5-0288-FD7C-1739-0C8672F3D7F8}"/>
+              </a:ext>
+            </a:extLst>
+          </p:cNvPr>
+          <p:cNvSpPr>
+            <a:spLocks noGrp="1"/>
+          </p:cNvSpPr>
+          <p:nvPr>
+            <p:ph type="title"/>
+          </p:nvPr>
+        </p:nvSpPr>
+        <p:spPr/>
+        <p:txBody>
+          <a:bodyPr/>
+          <a:lstStyle/>
+          <a:p>
+            <a:r>
+              <a:rPr lang="en-US"/>
+              <a:t>Model Diagnostics</a:t>
+            </a:r>
+            <a:endParaRPr lang="en-US" dirty="0"/>
+          </a:p>
+        </p:txBody>
+      </p:sp>
+      <p:sp>
+        <p:nvSpPr>
+          <p:cNvPr id="3" name="Content Placeholder 2">
+            <a:extLst>
+              <a:ext uri="{FF2B5EF4-FFF2-40B4-BE49-F238E27FC236}">
+                <a16:creationId xmlns:a16="http://schemas.microsoft.com/office/drawing/2014/main" id="{39176E43-0115-E50B-D268-5E00760022A7}"/>
+              </a:ext>
+            </a:extLst>
+          </p:cNvPr>
+          <p:cNvSpPr>
+            <a:spLocks noGrp="1"/>
+          </p:cNvSpPr>
+          <p:nvPr>
+            <p:ph idx="1"/>
+          </p:nvPr>
+        </p:nvSpPr>
+        <p:spPr/>
+        <p:txBody>
+          <a:bodyPr/>
+          <a:lstStyle/>
+          <a:p>
+            <a:endParaRPr lang="en-US" dirty="0"/>
+          </a:p>
+        </p:txBody>
+      </p:sp>
+    </p:spTree>
+    <p:extLst>
+      <p:ext uri="{BB962C8B-B14F-4D97-AF65-F5344CB8AC3E}">
+        <p14:creationId xmlns:p14="http://schemas.microsoft.com/office/powerpoint/2010/main" val="1881759498"/>
+      </p:ext>
+    </p:extLst>
+  </p:cSld>
+  <p:clrMapOvr>
+    <a:masterClrMapping/>
+  </p:clrMapOvr>
+</p:sld>
+</file>
+
+<file path=ppt/slides/slide19.xml><?xml version="1.0" encoding="utf-8"?>
+<p:sld xmlns:a="http://schemas.openxmlformats.org/drawingml/2006/main" xmlns:r="http://schemas.openxmlformats.org/officeDocument/2006/relationships" xmlns:p="http://schemas.openxmlformats.org/presentationml/2006/main">
+  <p:cSld>
+    <p:spTree>
+      <p:nvGrpSpPr>
+        <p:cNvPr id="1" name=""/>
+        <p:cNvGrpSpPr/>
+        <p:nvPr/>
+      </p:nvGrpSpPr>
+      <p:grpSpPr>
+        <a:xfrm>
+          <a:off x="0" y="0"/>
+          <a:ext cx="0" cy="0"/>
+          <a:chOff x="0" y="0"/>
+          <a:chExt cx="0" cy="0"/>
+        </a:xfrm>
+      </p:grpSpPr>
+      <p:sp>
+        <p:nvSpPr>
+          <p:cNvPr id="2" name="Title 1">
+            <a:extLst>
+              <a:ext uri="{FF2B5EF4-FFF2-40B4-BE49-F238E27FC236}">
+                <a16:creationId xmlns:a16="http://schemas.microsoft.com/office/drawing/2014/main" id="{FABAA41A-77E6-2FBA-A297-38D8E88EA1EE}"/>
+              </a:ext>
+            </a:extLst>
+          </p:cNvPr>
+          <p:cNvSpPr>
+            <a:spLocks noGrp="1"/>
+          </p:cNvSpPr>
+          <p:nvPr>
+            <p:ph type="title"/>
+          </p:nvPr>
+        </p:nvSpPr>
+        <p:spPr/>
+        <p:txBody>
+          <a:bodyPr/>
+          <a:lstStyle/>
+          <a:p>
+            <a:r>
+              <a:rPr lang="en-US" dirty="0"/>
+              <a:t>Practical formatting tricks</a:t>
+            </a:r>
+          </a:p>
+        </p:txBody>
+      </p:sp>
+      <p:sp>
+        <p:nvSpPr>
+          <p:cNvPr id="3" name="Text Placeholder 2">
+            <a:extLst>
+              <a:ext uri="{FF2B5EF4-FFF2-40B4-BE49-F238E27FC236}">
+                <a16:creationId xmlns:a16="http://schemas.microsoft.com/office/drawing/2014/main" id="{CC58DA01-D3BC-9504-0836-D49045D6C03A}"/>
+              </a:ext>
+            </a:extLst>
+          </p:cNvPr>
+          <p:cNvSpPr>
+            <a:spLocks noGrp="1"/>
+          </p:cNvSpPr>
+          <p:nvPr>
+            <p:ph type="body" idx="1"/>
+          </p:nvPr>
+        </p:nvSpPr>
+        <p:spPr/>
+        <p:txBody>
+          <a:bodyPr/>
+          <a:lstStyle/>
+          <a:p>
+            <a:endParaRPr lang="en-US"/>
+          </a:p>
+        </p:txBody>
+      </p:sp>
+    </p:spTree>
+    <p:extLst>
+      <p:ext uri="{BB962C8B-B14F-4D97-AF65-F5344CB8AC3E}">
+        <p14:creationId xmlns:p14="http://schemas.microsoft.com/office/powerpoint/2010/main" val="177268762"/>
       </p:ext>
     </p:extLst>
   </p:cSld>
@@ -14241,110 +15774,97 @@
       </p:grpSpPr>
       <p:sp>
         <p:nvSpPr>
-          <p:cNvPr id="2" name="Title 1"/>
-          <p:cNvSpPr>
-            <a:spLocks noGrp="1"/>
-          </p:cNvSpPr>
-          <p:nvPr>
-            <p:ph type="title"/>
-          </p:nvPr>
-        </p:nvSpPr>
-        <p:spPr/>
-        <p:txBody>
-          <a:bodyPr/>
-          <a:lstStyle/>
-          <a:p>
-            <a:pPr algn="ctr"/>
-            <a:r>
-              <a:rPr lang="en-US" altLang="en-US" dirty="0"/>
-              <a:t>Antitrust Notice</a:t>
-            </a:r>
-            <a:endParaRPr lang="en-US" dirty="0"/>
-          </a:p>
-        </p:txBody>
-      </p:sp>
-      <p:sp>
-        <p:nvSpPr>
-          <p:cNvPr id="3" name="Content Placeholder 2"/>
-          <p:cNvSpPr>
-            <a:spLocks noGrp="1"/>
-          </p:cNvSpPr>
-          <p:nvPr>
-            <p:ph idx="1"/>
+          <p:cNvPr id="2" name="Title 1">
+            <a:extLst>
+              <a:ext uri="{FF2B5EF4-FFF2-40B4-BE49-F238E27FC236}">
+                <a16:creationId xmlns:a16="http://schemas.microsoft.com/office/drawing/2014/main" id="{6442BFB3-50B7-CB64-9D6F-632F86BE2902}"/>
+              </a:ext>
+            </a:extLst>
+          </p:cNvPr>
+          <p:cNvSpPr>
+            <a:spLocks noGrp="1"/>
+          </p:cNvSpPr>
+          <p:nvPr>
+            <p:ph type="ctrTitle"/>
           </p:nvPr>
         </p:nvSpPr>
         <p:spPr>
           <a:xfrm>
-            <a:off x="1143000" y="1600200"/>
-            <a:ext cx="7543800" cy="3962399"/>
+            <a:off x="1485900" y="2130425"/>
+            <a:ext cx="6172200" cy="1470025"/>
           </a:xfrm>
         </p:spPr>
         <p:txBody>
           <a:bodyPr/>
           <a:lstStyle/>
           <a:p>
-            <a:pPr>
-              <a:lnSpc>
-                <a:spcPct val="80000"/>
-              </a:lnSpc>
-            </a:pPr>
-            <a:r>
-              <a:rPr lang="en-US" altLang="en-US" sz="1800" b="1" dirty="0"/>
-              <a:t>The Casualty Actuarial Society is committed to adhering strictly to the letter and spirit of the antitrust laws.  Seminars conducted under the auspices of the CAS are designed solely to provide a forum for the expression of various points of view on topics described in the programs or agendas for such meetings.</a:t>
-            </a:r>
-            <a:r>
-              <a:rPr lang="en-US" altLang="en-US" sz="1800" dirty="0"/>
-              <a:t>  </a:t>
-            </a:r>
-          </a:p>
-          <a:p>
-            <a:pPr>
-              <a:lnSpc>
-                <a:spcPct val="80000"/>
-              </a:lnSpc>
-            </a:pPr>
-            <a:endParaRPr lang="en-US" altLang="en-US" sz="1800" dirty="0"/>
-          </a:p>
-          <a:p>
-            <a:pPr>
-              <a:lnSpc>
-                <a:spcPct val="80000"/>
-              </a:lnSpc>
-            </a:pPr>
-            <a:r>
-              <a:rPr lang="en-US" altLang="en-US" sz="1800" b="1" dirty="0"/>
-              <a:t>Under no circumstances shall CAS seminars be used as a means for competing companies or firms to reach any understanding – expressed or implied – that restricts competition or in any way impairs the ability of members to exercise independent business judgment regarding matters affecting competition.</a:t>
-            </a:r>
-            <a:r>
-              <a:rPr lang="en-US" altLang="en-US" sz="1800" dirty="0"/>
-              <a:t>  </a:t>
-            </a:r>
-          </a:p>
-          <a:p>
-            <a:pPr>
-              <a:lnSpc>
-                <a:spcPct val="80000"/>
-              </a:lnSpc>
-            </a:pPr>
-            <a:endParaRPr lang="en-US" altLang="en-US" sz="1800" dirty="0"/>
-          </a:p>
-          <a:p>
-            <a:pPr>
-              <a:lnSpc>
-                <a:spcPct val="80000"/>
-              </a:lnSpc>
-            </a:pPr>
-            <a:r>
-              <a:rPr lang="en-US" altLang="en-US" sz="1800" b="1" dirty="0"/>
-              <a:t>It is the responsibility of all seminar participants to be aware of antitrust regulations, to prevent any written or verbal discussions that appear to violate these laws, and to adhere in every respect to the CAS antitrust compliance policy.</a:t>
-            </a:r>
-          </a:p>
-          <a:p>
-            <a:endParaRPr lang="en-US" dirty="0"/>
+            <a:pPr algn="ctr"/>
+            <a:r>
+              <a:rPr lang="en-US" sz="5400" dirty="0"/>
+              <a:t>Effective</a:t>
+            </a:r>
+            <a:br>
+              <a:rPr lang="en-US" sz="5400" dirty="0"/>
+            </a:br>
+            <a:r>
+              <a:rPr lang="en-US" sz="5400" dirty="0"/>
+              <a:t>Data Visualization</a:t>
+            </a:r>
+            <a:br>
+              <a:rPr lang="en-US" sz="5400" dirty="0"/>
+            </a:br>
+            <a:r>
+              <a:rPr lang="en-US" sz="5400" dirty="0"/>
+              <a:t>for Actuaries</a:t>
+            </a:r>
+          </a:p>
+        </p:txBody>
+      </p:sp>
+      <p:sp>
+        <p:nvSpPr>
+          <p:cNvPr id="3" name="Subtitle 2">
+            <a:extLst>
+              <a:ext uri="{FF2B5EF4-FFF2-40B4-BE49-F238E27FC236}">
+                <a16:creationId xmlns:a16="http://schemas.microsoft.com/office/drawing/2014/main" id="{9AF04EAA-821F-B55D-E8F7-C5651E6F8F40}"/>
+              </a:ext>
+            </a:extLst>
+          </p:cNvPr>
+          <p:cNvSpPr>
+            <a:spLocks noGrp="1"/>
+          </p:cNvSpPr>
+          <p:nvPr>
+            <p:ph type="subTitle" idx="1"/>
+          </p:nvPr>
+        </p:nvSpPr>
+        <p:spPr>
+          <a:xfrm>
+            <a:off x="1371600" y="4495800"/>
+            <a:ext cx="6400800" cy="1752600"/>
+          </a:xfrm>
+        </p:spPr>
+        <p:txBody>
+          <a:bodyPr/>
+          <a:lstStyle/>
+          <a:p>
+            <a:r>
+              <a:rPr lang="en-US" dirty="0"/>
+              <a:t>Brian Fannin</a:t>
+            </a:r>
+          </a:p>
+          <a:p>
+            <a:r>
+              <a:rPr lang="en-US" dirty="0"/>
+              <a:t>Jordan Bonner</a:t>
+            </a:r>
           </a:p>
         </p:txBody>
       </p:sp>
     </p:spTree>
+    <p:extLst>
+      <p:ext uri="{BB962C8B-B14F-4D97-AF65-F5344CB8AC3E}">
+        <p14:creationId xmlns:p14="http://schemas.microsoft.com/office/powerpoint/2010/main" val="3575641883"/>
+      </p:ext>
+    </p:extLst>
   </p:cSld>
   <p:clrMapOvr>
     <a:masterClrMapping/>
@@ -14352,7 +15872,7 @@
 </p:sld>
 </file>
 
-<file path=ppt/slides/slide3.xml><?xml version="1.0" encoding="utf-8"?>
+<file path=ppt/slides/slide20.xml><?xml version="1.0" encoding="utf-8"?>
 <p:sld xmlns:a="http://schemas.openxmlformats.org/drawingml/2006/main" xmlns:r="http://schemas.openxmlformats.org/officeDocument/2006/relationships" xmlns:p="http://schemas.openxmlformats.org/presentationml/2006/main">
   <p:cSld>
     <p:spTree>
@@ -14374,7 +15894,7 @@
           <p:cNvPr id="2" name="Title 1">
             <a:extLst>
               <a:ext uri="{FF2B5EF4-FFF2-40B4-BE49-F238E27FC236}">
-                <a16:creationId xmlns:a16="http://schemas.microsoft.com/office/drawing/2014/main" id="{0701B3B3-EF2C-C8A7-8ED7-CD65A75184A1}"/>
+                <a16:creationId xmlns:a16="http://schemas.microsoft.com/office/drawing/2014/main" id="{18969BF5-0288-FD7C-1739-0C8672F3D7F8}"/>
               </a:ext>
             </a:extLst>
           </p:cNvPr>
@@ -14392,51 +15912,40 @@
           <a:p>
             <a:r>
               <a:rPr lang="en-US" dirty="0"/>
-              <a:t>Example Plot A</a:t>
-            </a:r>
-          </a:p>
-        </p:txBody>
-      </p:sp>
-      <p:pic>
-        <p:nvPicPr>
-          <p:cNvPr id="5" name="Picture 4" descr="Diagram&#10;&#10;Description automatically generated with low confidence">
+              <a:t>Titles &amp; Renaming Variables</a:t>
+            </a:r>
+          </a:p>
+        </p:txBody>
+      </p:sp>
+      <p:sp>
+        <p:nvSpPr>
+          <p:cNvPr id="3" name="Content Placeholder 2">
             <a:extLst>
               <a:ext uri="{FF2B5EF4-FFF2-40B4-BE49-F238E27FC236}">
-                <a16:creationId xmlns:a16="http://schemas.microsoft.com/office/drawing/2014/main" id="{D06BE20D-1734-A4E5-07FB-1D8F60C84269}"/>
+                <a16:creationId xmlns:a16="http://schemas.microsoft.com/office/drawing/2014/main" id="{39176E43-0115-E50B-D268-5E00760022A7}"/>
               </a:ext>
             </a:extLst>
           </p:cNvPr>
-          <p:cNvPicPr>
-            <a:picLocks noChangeAspect="1"/>
-          </p:cNvPicPr>
-          <p:nvPr/>
-        </p:nvPicPr>
-        <p:blipFill>
-          <a:blip r:embed="rId2" r:link="rId3" cstate="print">
-            <a:extLst>
-              <a:ext uri="{28A0092B-C50C-407E-A947-70E740481C1C}">
-                <a14:useLocalDpi xmlns:a14="http://schemas.microsoft.com/office/drawing/2010/main" val="0"/>
-              </a:ext>
-            </a:extLst>
-          </a:blip>
-          <a:stretch>
-            <a:fillRect/>
-          </a:stretch>
-        </p:blipFill>
-        <p:spPr>
-          <a:xfrm>
-            <a:off x="1371600" y="1295400"/>
-            <a:ext cx="6400800" cy="4267200"/>
-          </a:xfrm>
-          <a:prstGeom prst="rect">
-            <a:avLst/>
-          </a:prstGeom>
-        </p:spPr>
-      </p:pic>
+          <p:cNvSpPr>
+            <a:spLocks noGrp="1"/>
+          </p:cNvSpPr>
+          <p:nvPr>
+            <p:ph idx="1"/>
+          </p:nvPr>
+        </p:nvSpPr>
+        <p:spPr/>
+        <p:txBody>
+          <a:bodyPr/>
+          <a:lstStyle/>
+          <a:p>
+            <a:endParaRPr lang="en-US" dirty="0"/>
+          </a:p>
+        </p:txBody>
+      </p:sp>
     </p:spTree>
     <p:extLst>
       <p:ext uri="{BB962C8B-B14F-4D97-AF65-F5344CB8AC3E}">
-        <p14:creationId xmlns:p14="http://schemas.microsoft.com/office/powerpoint/2010/main" val="265096747"/>
+        <p14:creationId xmlns:p14="http://schemas.microsoft.com/office/powerpoint/2010/main" val="3241427914"/>
       </p:ext>
     </p:extLst>
   </p:cSld>
@@ -14446,7 +15955,7 @@
 </p:sld>
 </file>
 
-<file path=ppt/slides/slide4.xml><?xml version="1.0" encoding="utf-8"?>
+<file path=ppt/slides/slide21.xml><?xml version="1.0" encoding="utf-8"?>
 <p:sld xmlns:a="http://schemas.openxmlformats.org/drawingml/2006/main" xmlns:r="http://schemas.openxmlformats.org/officeDocument/2006/relationships" xmlns:p="http://schemas.openxmlformats.org/presentationml/2006/main">
   <p:cSld>
     <p:spTree>
@@ -14468,6 +15977,255 @@
           <p:cNvPr id="2" name="Title 1">
             <a:extLst>
               <a:ext uri="{FF2B5EF4-FFF2-40B4-BE49-F238E27FC236}">
+                <a16:creationId xmlns:a16="http://schemas.microsoft.com/office/drawing/2014/main" id="{18969BF5-0288-FD7C-1739-0C8672F3D7F8}"/>
+              </a:ext>
+            </a:extLst>
+          </p:cNvPr>
+          <p:cNvSpPr>
+            <a:spLocks noGrp="1"/>
+          </p:cNvSpPr>
+          <p:nvPr>
+            <p:ph type="title"/>
+          </p:nvPr>
+        </p:nvSpPr>
+        <p:spPr/>
+        <p:txBody>
+          <a:bodyPr/>
+          <a:lstStyle/>
+          <a:p>
+            <a:r>
+              <a:rPr lang="en-US" dirty="0"/>
+              <a:t>Text Size</a:t>
+            </a:r>
+          </a:p>
+        </p:txBody>
+      </p:sp>
+      <p:sp>
+        <p:nvSpPr>
+          <p:cNvPr id="3" name="Content Placeholder 2">
+            <a:extLst>
+              <a:ext uri="{FF2B5EF4-FFF2-40B4-BE49-F238E27FC236}">
+                <a16:creationId xmlns:a16="http://schemas.microsoft.com/office/drawing/2014/main" id="{39176E43-0115-E50B-D268-5E00760022A7}"/>
+              </a:ext>
+            </a:extLst>
+          </p:cNvPr>
+          <p:cNvSpPr>
+            <a:spLocks noGrp="1"/>
+          </p:cNvSpPr>
+          <p:nvPr>
+            <p:ph idx="1"/>
+          </p:nvPr>
+        </p:nvSpPr>
+        <p:spPr/>
+        <p:txBody>
+          <a:bodyPr/>
+          <a:lstStyle/>
+          <a:p>
+            <a:endParaRPr lang="en-US" dirty="0"/>
+          </a:p>
+        </p:txBody>
+      </p:sp>
+    </p:spTree>
+    <p:extLst>
+      <p:ext uri="{BB962C8B-B14F-4D97-AF65-F5344CB8AC3E}">
+        <p14:creationId xmlns:p14="http://schemas.microsoft.com/office/powerpoint/2010/main" val="1481048253"/>
+      </p:ext>
+    </p:extLst>
+  </p:cSld>
+  <p:clrMapOvr>
+    <a:masterClrMapping/>
+  </p:clrMapOvr>
+</p:sld>
+</file>
+
+<file path=ppt/slides/slide22.xml><?xml version="1.0" encoding="utf-8"?>
+<p:sld xmlns:a="http://schemas.openxmlformats.org/drawingml/2006/main" xmlns:r="http://schemas.openxmlformats.org/officeDocument/2006/relationships" xmlns:p="http://schemas.openxmlformats.org/presentationml/2006/main">
+  <p:cSld>
+    <p:spTree>
+      <p:nvGrpSpPr>
+        <p:cNvPr id="1" name=""/>
+        <p:cNvGrpSpPr/>
+        <p:nvPr/>
+      </p:nvGrpSpPr>
+      <p:grpSpPr>
+        <a:xfrm>
+          <a:off x="0" y="0"/>
+          <a:ext cx="0" cy="0"/>
+          <a:chOff x="0" y="0"/>
+          <a:chExt cx="0" cy="0"/>
+        </a:xfrm>
+      </p:grpSpPr>
+      <p:sp>
+        <p:nvSpPr>
+          <p:cNvPr id="2" name="Title 1">
+            <a:extLst>
+              <a:ext uri="{FF2B5EF4-FFF2-40B4-BE49-F238E27FC236}">
+                <a16:creationId xmlns:a16="http://schemas.microsoft.com/office/drawing/2014/main" id="{18969BF5-0288-FD7C-1739-0C8672F3D7F8}"/>
+              </a:ext>
+            </a:extLst>
+          </p:cNvPr>
+          <p:cNvSpPr>
+            <a:spLocks noGrp="1"/>
+          </p:cNvSpPr>
+          <p:nvPr>
+            <p:ph type="title"/>
+          </p:nvPr>
+        </p:nvSpPr>
+        <p:spPr/>
+        <p:txBody>
+          <a:bodyPr/>
+          <a:lstStyle/>
+          <a:p>
+            <a:r>
+              <a:rPr lang="en-US" dirty="0"/>
+              <a:t>Colors</a:t>
+            </a:r>
+          </a:p>
+        </p:txBody>
+      </p:sp>
+      <p:sp>
+        <p:nvSpPr>
+          <p:cNvPr id="3" name="Content Placeholder 2">
+            <a:extLst>
+              <a:ext uri="{FF2B5EF4-FFF2-40B4-BE49-F238E27FC236}">
+                <a16:creationId xmlns:a16="http://schemas.microsoft.com/office/drawing/2014/main" id="{39176E43-0115-E50B-D268-5E00760022A7}"/>
+              </a:ext>
+            </a:extLst>
+          </p:cNvPr>
+          <p:cNvSpPr>
+            <a:spLocks noGrp="1"/>
+          </p:cNvSpPr>
+          <p:nvPr>
+            <p:ph idx="1"/>
+          </p:nvPr>
+        </p:nvSpPr>
+        <p:spPr/>
+        <p:txBody>
+          <a:bodyPr/>
+          <a:lstStyle/>
+          <a:p>
+            <a:endParaRPr lang="en-US" dirty="0"/>
+          </a:p>
+        </p:txBody>
+      </p:sp>
+    </p:spTree>
+    <p:extLst>
+      <p:ext uri="{BB962C8B-B14F-4D97-AF65-F5344CB8AC3E}">
+        <p14:creationId xmlns:p14="http://schemas.microsoft.com/office/powerpoint/2010/main" val="2002468093"/>
+      </p:ext>
+    </p:extLst>
+  </p:cSld>
+  <p:clrMapOvr>
+    <a:masterClrMapping/>
+  </p:clrMapOvr>
+</p:sld>
+</file>
+
+<file path=ppt/slides/slide23.xml><?xml version="1.0" encoding="utf-8"?>
+<p:sld xmlns:a="http://schemas.openxmlformats.org/drawingml/2006/main" xmlns:r="http://schemas.openxmlformats.org/officeDocument/2006/relationships" xmlns:p="http://schemas.openxmlformats.org/presentationml/2006/main">
+  <p:cSld>
+    <p:spTree>
+      <p:nvGrpSpPr>
+        <p:cNvPr id="1" name=""/>
+        <p:cNvGrpSpPr/>
+        <p:nvPr/>
+      </p:nvGrpSpPr>
+      <p:grpSpPr>
+        <a:xfrm>
+          <a:off x="0" y="0"/>
+          <a:ext cx="0" cy="0"/>
+          <a:chOff x="0" y="0"/>
+          <a:chExt cx="0" cy="0"/>
+        </a:xfrm>
+      </p:grpSpPr>
+      <p:sp>
+        <p:nvSpPr>
+          <p:cNvPr id="2" name="Title 1">
+            <a:extLst>
+              <a:ext uri="{FF2B5EF4-FFF2-40B4-BE49-F238E27FC236}">
+                <a16:creationId xmlns:a16="http://schemas.microsoft.com/office/drawing/2014/main" id="{6AA0D46C-160A-13B4-DED2-2C2A2470264C}"/>
+              </a:ext>
+            </a:extLst>
+          </p:cNvPr>
+          <p:cNvSpPr>
+            <a:spLocks noGrp="1"/>
+          </p:cNvSpPr>
+          <p:nvPr>
+            <p:ph type="title"/>
+          </p:nvPr>
+        </p:nvSpPr>
+        <p:spPr/>
+        <p:txBody>
+          <a:bodyPr/>
+          <a:lstStyle/>
+          <a:p>
+            <a:r>
+              <a:rPr lang="en-US" dirty="0"/>
+              <a:t>Appendix</a:t>
+            </a:r>
+          </a:p>
+        </p:txBody>
+      </p:sp>
+      <p:sp>
+        <p:nvSpPr>
+          <p:cNvPr id="3" name="Text Placeholder 2">
+            <a:extLst>
+              <a:ext uri="{FF2B5EF4-FFF2-40B4-BE49-F238E27FC236}">
+                <a16:creationId xmlns:a16="http://schemas.microsoft.com/office/drawing/2014/main" id="{0E763E03-4660-8CF9-6C32-6D09D78F6FDE}"/>
+              </a:ext>
+            </a:extLst>
+          </p:cNvPr>
+          <p:cNvSpPr>
+            <a:spLocks noGrp="1"/>
+          </p:cNvSpPr>
+          <p:nvPr>
+            <p:ph type="body" idx="1"/>
+          </p:nvPr>
+        </p:nvSpPr>
+        <p:spPr/>
+        <p:txBody>
+          <a:bodyPr/>
+          <a:lstStyle/>
+          <a:p>
+            <a:endParaRPr lang="en-US" dirty="0"/>
+          </a:p>
+        </p:txBody>
+      </p:sp>
+    </p:spTree>
+    <p:extLst>
+      <p:ext uri="{BB962C8B-B14F-4D97-AF65-F5344CB8AC3E}">
+        <p14:creationId xmlns:p14="http://schemas.microsoft.com/office/powerpoint/2010/main" val="2128084239"/>
+      </p:ext>
+    </p:extLst>
+  </p:cSld>
+  <p:clrMapOvr>
+    <a:masterClrMapping/>
+  </p:clrMapOvr>
+</p:sld>
+</file>
+
+<file path=ppt/slides/slide24.xml><?xml version="1.0" encoding="utf-8"?>
+<p:sld xmlns:a="http://schemas.openxmlformats.org/drawingml/2006/main" xmlns:r="http://schemas.openxmlformats.org/officeDocument/2006/relationships" xmlns:p="http://schemas.openxmlformats.org/presentationml/2006/main">
+  <p:cSld>
+    <p:spTree>
+      <p:nvGrpSpPr>
+        <p:cNvPr id="1" name=""/>
+        <p:cNvGrpSpPr/>
+        <p:nvPr/>
+      </p:nvGrpSpPr>
+      <p:grpSpPr>
+        <a:xfrm>
+          <a:off x="0" y="0"/>
+          <a:ext cx="0" cy="0"/>
+          <a:chOff x="0" y="0"/>
+          <a:chExt cx="0" cy="0"/>
+        </a:xfrm>
+      </p:grpSpPr>
+      <p:sp>
+        <p:nvSpPr>
+          <p:cNvPr id="2" name="Title 1">
+            <a:extLst>
+              <a:ext uri="{FF2B5EF4-FFF2-40B4-BE49-F238E27FC236}">
                 <a16:creationId xmlns:a16="http://schemas.microsoft.com/office/drawing/2014/main" id="{0701B3B3-EF2C-C8A7-8ED7-CD65A75184A1}"/>
               </a:ext>
             </a:extLst>
@@ -14486,7 +16244,7 @@
           <a:p>
             <a:r>
               <a:rPr lang="en-US" dirty="0"/>
-              <a:t>Example Plot B</a:t>
+              <a:t>Example Plot A</a:t>
             </a:r>
           </a:p>
         </p:txBody>
@@ -14531,7 +16289,7 @@
     </p:spTree>
     <p:extLst>
       <p:ext uri="{BB962C8B-B14F-4D97-AF65-F5344CB8AC3E}">
-        <p14:creationId xmlns:p14="http://schemas.microsoft.com/office/powerpoint/2010/main" val="1985292993"/>
+        <p14:creationId xmlns:p14="http://schemas.microsoft.com/office/powerpoint/2010/main" val="265096747"/>
       </p:ext>
     </p:extLst>
   </p:cSld>
@@ -14541,7 +16299,7 @@
 </p:sld>
 </file>
 
-<file path=ppt/slides/slide5.xml><?xml version="1.0" encoding="utf-8"?>
+<file path=ppt/slides/slide25.xml><?xml version="1.0" encoding="utf-8"?>
 <p:sld xmlns:a="http://schemas.openxmlformats.org/drawingml/2006/main" xmlns:r="http://schemas.openxmlformats.org/officeDocument/2006/relationships" xmlns:p="http://schemas.openxmlformats.org/presentationml/2006/main">
   <p:cSld>
     <p:spTree>
@@ -14581,7 +16339,7 @@
           <a:p>
             <a:r>
               <a:rPr lang="en-US" dirty="0"/>
-              <a:t>Example Plot C</a:t>
+              <a:t>Example Plot B</a:t>
             </a:r>
           </a:p>
         </p:txBody>
@@ -14616,7 +16374,102 @@
         <p:spPr>
           <a:xfrm>
             <a:off x="1371600" y="1295400"/>
-            <a:ext cx="6400800" cy="4267199"/>
+            <a:ext cx="6400799" cy="4267199"/>
+          </a:xfrm>
+          <a:prstGeom prst="rect">
+            <a:avLst/>
+          </a:prstGeom>
+        </p:spPr>
+      </p:pic>
+    </p:spTree>
+    <p:extLst>
+      <p:ext uri="{BB962C8B-B14F-4D97-AF65-F5344CB8AC3E}">
+        <p14:creationId xmlns:p14="http://schemas.microsoft.com/office/powerpoint/2010/main" val="1985292993"/>
+      </p:ext>
+    </p:extLst>
+  </p:cSld>
+  <p:clrMapOvr>
+    <a:masterClrMapping/>
+  </p:clrMapOvr>
+</p:sld>
+</file>
+
+<file path=ppt/slides/slide26.xml><?xml version="1.0" encoding="utf-8"?>
+<p:sld xmlns:a="http://schemas.openxmlformats.org/drawingml/2006/main" xmlns:r="http://schemas.openxmlformats.org/officeDocument/2006/relationships" xmlns:p="http://schemas.openxmlformats.org/presentationml/2006/main">
+  <p:cSld>
+    <p:spTree>
+      <p:nvGrpSpPr>
+        <p:cNvPr id="1" name=""/>
+        <p:cNvGrpSpPr/>
+        <p:nvPr/>
+      </p:nvGrpSpPr>
+      <p:grpSpPr>
+        <a:xfrm>
+          <a:off x="0" y="0"/>
+          <a:ext cx="0" cy="0"/>
+          <a:chOff x="0" y="0"/>
+          <a:chExt cx="0" cy="0"/>
+        </a:xfrm>
+      </p:grpSpPr>
+      <p:sp>
+        <p:nvSpPr>
+          <p:cNvPr id="2" name="Title 1">
+            <a:extLst>
+              <a:ext uri="{FF2B5EF4-FFF2-40B4-BE49-F238E27FC236}">
+                <a16:creationId xmlns:a16="http://schemas.microsoft.com/office/drawing/2014/main" id="{0701B3B3-EF2C-C8A7-8ED7-CD65A75184A1}"/>
+              </a:ext>
+            </a:extLst>
+          </p:cNvPr>
+          <p:cNvSpPr>
+            <a:spLocks noGrp="1"/>
+          </p:cNvSpPr>
+          <p:nvPr>
+            <p:ph type="title"/>
+          </p:nvPr>
+        </p:nvSpPr>
+        <p:spPr/>
+        <p:txBody>
+          <a:bodyPr/>
+          <a:lstStyle/>
+          <a:p>
+            <a:r>
+              <a:rPr lang="en-US" dirty="0"/>
+              <a:t>Example Plot C</a:t>
+            </a:r>
+          </a:p>
+        </p:txBody>
+      </p:sp>
+      <p:pic>
+        <p:nvPicPr>
+          <p:cNvPr id="5" name="Picture 4">
+            <a:extLst>
+              <a:ext uri="{FF2B5EF4-FFF2-40B4-BE49-F238E27FC236}">
+                <a16:creationId xmlns:a16="http://schemas.microsoft.com/office/drawing/2014/main" id="{D06BE20D-1734-A4E5-07FB-1D8F60C84269}"/>
+              </a:ext>
+            </a:extLst>
+          </p:cNvPr>
+          <p:cNvPicPr>
+            <a:picLocks noChangeAspect="1"/>
+          </p:cNvPicPr>
+          <p:nvPr/>
+        </p:nvPicPr>
+        <p:blipFill>
+          <a:blip r:embed="rId2" r:link="rId3" cstate="print">
+            <a:extLst>
+              <a:ext uri="{28A0092B-C50C-407E-A947-70E740481C1C}">
+                <a14:useLocalDpi xmlns:a14="http://schemas.microsoft.com/office/drawing/2010/main" val="0"/>
+              </a:ext>
+            </a:extLst>
+          </a:blip>
+          <a:srcRect/>
+          <a:stretch>
+            <a:fillRect/>
+          </a:stretch>
+        </p:blipFill>
+        <p:spPr>
+          <a:xfrm>
+            <a:off x="1371600" y="1295400"/>
+            <a:ext cx="6400799" cy="4267199"/>
           </a:xfrm>
           <a:prstGeom prst="rect">
             <a:avLst/>
@@ -14627,6 +16480,708 @@
     <p:extLst>
       <p:ext uri="{BB962C8B-B14F-4D97-AF65-F5344CB8AC3E}">
         <p14:creationId xmlns:p14="http://schemas.microsoft.com/office/powerpoint/2010/main" val="3444414520"/>
+      </p:ext>
+    </p:extLst>
+  </p:cSld>
+  <p:clrMapOvr>
+    <a:masterClrMapping/>
+  </p:clrMapOvr>
+</p:sld>
+</file>
+
+<file path=ppt/slides/slide3.xml><?xml version="1.0" encoding="utf-8"?>
+<p:sld xmlns:a="http://schemas.openxmlformats.org/drawingml/2006/main" xmlns:r="http://schemas.openxmlformats.org/officeDocument/2006/relationships" xmlns:p="http://schemas.openxmlformats.org/presentationml/2006/main">
+  <p:cSld>
+    <p:spTree>
+      <p:nvGrpSpPr>
+        <p:cNvPr id="1" name=""/>
+        <p:cNvGrpSpPr/>
+        <p:nvPr/>
+      </p:nvGrpSpPr>
+      <p:grpSpPr>
+        <a:xfrm>
+          <a:off x="0" y="0"/>
+          <a:ext cx="0" cy="0"/>
+          <a:chOff x="0" y="0"/>
+          <a:chExt cx="0" cy="0"/>
+        </a:xfrm>
+      </p:grpSpPr>
+      <p:sp>
+        <p:nvSpPr>
+          <p:cNvPr id="2" name="Title 1">
+            <a:extLst>
+              <a:ext uri="{FF2B5EF4-FFF2-40B4-BE49-F238E27FC236}">
+                <a16:creationId xmlns:a16="http://schemas.microsoft.com/office/drawing/2014/main" id="{74710D85-8C9D-388F-E1FC-561F624F73D8}"/>
+              </a:ext>
+            </a:extLst>
+          </p:cNvPr>
+          <p:cNvSpPr>
+            <a:spLocks noGrp="1"/>
+          </p:cNvSpPr>
+          <p:nvPr>
+            <p:ph type="ctrTitle"/>
+          </p:nvPr>
+        </p:nvSpPr>
+        <p:spPr/>
+        <p:txBody>
+          <a:bodyPr/>
+          <a:lstStyle/>
+          <a:p>
+            <a:r>
+              <a:rPr lang="en-US" dirty="0"/>
+              <a:t>Effective</a:t>
+            </a:r>
+            <a:br>
+              <a:rPr lang="en-US" dirty="0"/>
+            </a:br>
+            <a:r>
+              <a:rPr lang="en-US" dirty="0"/>
+              <a:t>Data Visualization</a:t>
+            </a:r>
+            <a:br>
+              <a:rPr lang="en-US" dirty="0"/>
+            </a:br>
+            <a:r>
+              <a:rPr lang="en-US" dirty="0"/>
+              <a:t>for Actuaries</a:t>
+            </a:r>
+          </a:p>
+        </p:txBody>
+      </p:sp>
+      <p:sp>
+        <p:nvSpPr>
+          <p:cNvPr id="3" name="Subtitle 2">
+            <a:extLst>
+              <a:ext uri="{FF2B5EF4-FFF2-40B4-BE49-F238E27FC236}">
+                <a16:creationId xmlns:a16="http://schemas.microsoft.com/office/drawing/2014/main" id="{4053B939-82C6-7883-3378-EEEF2C23A74B}"/>
+              </a:ext>
+            </a:extLst>
+          </p:cNvPr>
+          <p:cNvSpPr>
+            <a:spLocks noGrp="1"/>
+          </p:cNvSpPr>
+          <p:nvPr>
+            <p:ph type="subTitle" idx="1"/>
+          </p:nvPr>
+        </p:nvSpPr>
+        <p:spPr/>
+        <p:txBody>
+          <a:bodyPr/>
+          <a:lstStyle/>
+          <a:p>
+            <a:r>
+              <a:rPr lang="en-US" dirty="0"/>
+              <a:t>Brian Fannin</a:t>
+            </a:r>
+          </a:p>
+          <a:p>
+            <a:r>
+              <a:rPr lang="en-US" dirty="0"/>
+              <a:t>Jordan Bonner</a:t>
+            </a:r>
+          </a:p>
+        </p:txBody>
+      </p:sp>
+    </p:spTree>
+    <p:extLst>
+      <p:ext uri="{BB962C8B-B14F-4D97-AF65-F5344CB8AC3E}">
+        <p14:creationId xmlns:p14="http://schemas.microsoft.com/office/powerpoint/2010/main" val="3925388622"/>
+      </p:ext>
+    </p:extLst>
+  </p:cSld>
+  <p:clrMapOvr>
+    <a:masterClrMapping/>
+  </p:clrMapOvr>
+</p:sld>
+</file>
+
+<file path=ppt/slides/slide4.xml><?xml version="1.0" encoding="utf-8"?>
+<p:sld xmlns:a="http://schemas.openxmlformats.org/drawingml/2006/main" xmlns:r="http://schemas.openxmlformats.org/officeDocument/2006/relationships" xmlns:p="http://schemas.openxmlformats.org/presentationml/2006/main">
+  <p:cSld>
+    <p:spTree>
+      <p:nvGrpSpPr>
+        <p:cNvPr id="1" name=""/>
+        <p:cNvGrpSpPr/>
+        <p:nvPr/>
+      </p:nvGrpSpPr>
+      <p:grpSpPr>
+        <a:xfrm>
+          <a:off x="0" y="0"/>
+          <a:ext cx="0" cy="0"/>
+          <a:chOff x="0" y="0"/>
+          <a:chExt cx="0" cy="0"/>
+        </a:xfrm>
+      </p:grpSpPr>
+      <p:sp>
+        <p:nvSpPr>
+          <p:cNvPr id="2" name="Title 1"/>
+          <p:cNvSpPr>
+            <a:spLocks noGrp="1"/>
+          </p:cNvSpPr>
+          <p:nvPr>
+            <p:ph type="title"/>
+          </p:nvPr>
+        </p:nvSpPr>
+        <p:spPr/>
+        <p:txBody>
+          <a:bodyPr/>
+          <a:lstStyle/>
+          <a:p>
+            <a:pPr algn="ctr"/>
+            <a:r>
+              <a:rPr lang="en-US" altLang="en-US" dirty="0"/>
+              <a:t>Antitrust Notice</a:t>
+            </a:r>
+            <a:endParaRPr lang="en-US" dirty="0"/>
+          </a:p>
+        </p:txBody>
+      </p:sp>
+      <p:sp>
+        <p:nvSpPr>
+          <p:cNvPr id="3" name="Content Placeholder 2"/>
+          <p:cNvSpPr>
+            <a:spLocks noGrp="1"/>
+          </p:cNvSpPr>
+          <p:nvPr>
+            <p:ph idx="1"/>
+          </p:nvPr>
+        </p:nvSpPr>
+        <p:spPr>
+          <a:xfrm>
+            <a:off x="1143000" y="1600200"/>
+            <a:ext cx="7543800" cy="3962399"/>
+          </a:xfrm>
+        </p:spPr>
+        <p:txBody>
+          <a:bodyPr/>
+          <a:lstStyle/>
+          <a:p>
+            <a:pPr>
+              <a:lnSpc>
+                <a:spcPct val="80000"/>
+              </a:lnSpc>
+            </a:pPr>
+            <a:r>
+              <a:rPr lang="en-US" altLang="en-US" sz="1800" b="1" dirty="0"/>
+              <a:t>The Casualty Actuarial Society is committed to adhering strictly to the letter and spirit of the antitrust laws.  Seminars conducted under the auspices of the CAS are designed solely to provide a forum for the expression of various points of view on topics described in the programs or agendas for such meetings.</a:t>
+            </a:r>
+            <a:r>
+              <a:rPr lang="en-US" altLang="en-US" sz="1800" dirty="0"/>
+              <a:t>  </a:t>
+            </a:r>
+          </a:p>
+          <a:p>
+            <a:pPr>
+              <a:lnSpc>
+                <a:spcPct val="80000"/>
+              </a:lnSpc>
+            </a:pPr>
+            <a:endParaRPr lang="en-US" altLang="en-US" sz="1800" dirty="0"/>
+          </a:p>
+          <a:p>
+            <a:pPr>
+              <a:lnSpc>
+                <a:spcPct val="80000"/>
+              </a:lnSpc>
+            </a:pPr>
+            <a:r>
+              <a:rPr lang="en-US" altLang="en-US" sz="1800" b="1" dirty="0"/>
+              <a:t>Under no circumstances shall CAS seminars be used as a means for competing companies or firms to reach any understanding – expressed or implied – that restricts competition or in any way impairs the ability of members to exercise independent business judgment regarding matters affecting competition.</a:t>
+            </a:r>
+            <a:r>
+              <a:rPr lang="en-US" altLang="en-US" sz="1800" dirty="0"/>
+              <a:t>  </a:t>
+            </a:r>
+          </a:p>
+          <a:p>
+            <a:pPr>
+              <a:lnSpc>
+                <a:spcPct val="80000"/>
+              </a:lnSpc>
+            </a:pPr>
+            <a:endParaRPr lang="en-US" altLang="en-US" sz="1800" dirty="0"/>
+          </a:p>
+          <a:p>
+            <a:pPr>
+              <a:lnSpc>
+                <a:spcPct val="80000"/>
+              </a:lnSpc>
+            </a:pPr>
+            <a:r>
+              <a:rPr lang="en-US" altLang="en-US" sz="1800" b="1" dirty="0"/>
+              <a:t>It is the responsibility of all seminar participants to be aware of antitrust regulations, to prevent any written or verbal discussions that appear to violate these laws, and to adhere in every respect to the CAS antitrust compliance policy.</a:t>
+            </a:r>
+          </a:p>
+          <a:p>
+            <a:endParaRPr lang="en-US" dirty="0"/>
+          </a:p>
+        </p:txBody>
+      </p:sp>
+    </p:spTree>
+  </p:cSld>
+  <p:clrMapOvr>
+    <a:masterClrMapping/>
+  </p:clrMapOvr>
+</p:sld>
+</file>
+
+<file path=ppt/slides/slide5.xml><?xml version="1.0" encoding="utf-8"?>
+<p:sld xmlns:a="http://schemas.openxmlformats.org/drawingml/2006/main" xmlns:r="http://schemas.openxmlformats.org/officeDocument/2006/relationships" xmlns:p="http://schemas.openxmlformats.org/presentationml/2006/main">
+  <p:cSld>
+    <p:spTree>
+      <p:nvGrpSpPr>
+        <p:cNvPr id="1" name=""/>
+        <p:cNvGrpSpPr/>
+        <p:nvPr/>
+      </p:nvGrpSpPr>
+      <p:grpSpPr>
+        <a:xfrm>
+          <a:off x="0" y="0"/>
+          <a:ext cx="0" cy="0"/>
+          <a:chOff x="0" y="0"/>
+          <a:chExt cx="0" cy="0"/>
+        </a:xfrm>
+      </p:grpSpPr>
+      <p:sp>
+        <p:nvSpPr>
+          <p:cNvPr id="2" name="Title 1">
+            <a:extLst>
+              <a:ext uri="{FF2B5EF4-FFF2-40B4-BE49-F238E27FC236}">
+                <a16:creationId xmlns:a16="http://schemas.microsoft.com/office/drawing/2014/main" id="{10B17ABD-BE88-D042-5997-22F660D5947A}"/>
+              </a:ext>
+            </a:extLst>
+          </p:cNvPr>
+          <p:cNvSpPr>
+            <a:spLocks noGrp="1"/>
+          </p:cNvSpPr>
+          <p:nvPr>
+            <p:ph type="title"/>
+          </p:nvPr>
+        </p:nvSpPr>
+        <p:spPr/>
+        <p:txBody>
+          <a:bodyPr/>
+          <a:lstStyle/>
+          <a:p>
+            <a:r>
+              <a:rPr lang="en-US" dirty="0"/>
+              <a:t>Visualizations should:</a:t>
+            </a:r>
+          </a:p>
+        </p:txBody>
+      </p:sp>
+      <p:sp>
+        <p:nvSpPr>
+          <p:cNvPr id="3" name="Content Placeholder 2">
+            <a:extLst>
+              <a:ext uri="{FF2B5EF4-FFF2-40B4-BE49-F238E27FC236}">
+                <a16:creationId xmlns:a16="http://schemas.microsoft.com/office/drawing/2014/main" id="{F33662A3-4DD5-0500-C0E1-EA5CF57A5ABC}"/>
+              </a:ext>
+            </a:extLst>
+          </p:cNvPr>
+          <p:cNvSpPr>
+            <a:spLocks noGrp="1"/>
+          </p:cNvSpPr>
+          <p:nvPr>
+            <p:ph idx="1"/>
+          </p:nvPr>
+        </p:nvSpPr>
+        <p:spPr/>
+        <p:txBody>
+          <a:bodyPr/>
+          <a:lstStyle/>
+          <a:p>
+            <a:pPr marL="0" indent="0">
+              <a:buNone/>
+            </a:pPr>
+            <a:endParaRPr lang="en-US" sz="4000" dirty="0"/>
+          </a:p>
+          <a:p>
+            <a:r>
+              <a:rPr lang="en-US" sz="4000" b="1" dirty="0"/>
+              <a:t>Be Easily Interpreted</a:t>
+            </a:r>
+          </a:p>
+          <a:p>
+            <a:endParaRPr lang="en-US" sz="2400" b="1" dirty="0"/>
+          </a:p>
+          <a:p>
+            <a:r>
+              <a:rPr lang="en-US" sz="4000" b="1" dirty="0"/>
+              <a:t>Tell a Story</a:t>
+            </a:r>
+          </a:p>
+        </p:txBody>
+      </p:sp>
+    </p:spTree>
+    <p:extLst>
+      <p:ext uri="{BB962C8B-B14F-4D97-AF65-F5344CB8AC3E}">
+        <p14:creationId xmlns:p14="http://schemas.microsoft.com/office/powerpoint/2010/main" val="2741569399"/>
+      </p:ext>
+    </p:extLst>
+  </p:cSld>
+  <p:clrMapOvr>
+    <a:masterClrMapping/>
+  </p:clrMapOvr>
+</p:sld>
+</file>
+
+<file path=ppt/slides/slide6.xml><?xml version="1.0" encoding="utf-8"?>
+<p:sld xmlns:a="http://schemas.openxmlformats.org/drawingml/2006/main" xmlns:r="http://schemas.openxmlformats.org/officeDocument/2006/relationships" xmlns:p="http://schemas.openxmlformats.org/presentationml/2006/main">
+  <p:cSld>
+    <p:spTree>
+      <p:nvGrpSpPr>
+        <p:cNvPr id="1" name=""/>
+        <p:cNvGrpSpPr/>
+        <p:nvPr/>
+      </p:nvGrpSpPr>
+      <p:grpSpPr>
+        <a:xfrm>
+          <a:off x="0" y="0"/>
+          <a:ext cx="0" cy="0"/>
+          <a:chOff x="0" y="0"/>
+          <a:chExt cx="0" cy="0"/>
+        </a:xfrm>
+      </p:grpSpPr>
+      <p:sp>
+        <p:nvSpPr>
+          <p:cNvPr id="2" name="Title 1">
+            <a:extLst>
+              <a:ext uri="{FF2B5EF4-FFF2-40B4-BE49-F238E27FC236}">
+                <a16:creationId xmlns:a16="http://schemas.microsoft.com/office/drawing/2014/main" id="{10B17ABD-BE88-D042-5997-22F660D5947A}"/>
+              </a:ext>
+            </a:extLst>
+          </p:cNvPr>
+          <p:cNvSpPr>
+            <a:spLocks noGrp="1"/>
+          </p:cNvSpPr>
+          <p:nvPr>
+            <p:ph type="title"/>
+          </p:nvPr>
+        </p:nvSpPr>
+        <p:spPr/>
+        <p:txBody>
+          <a:bodyPr/>
+          <a:lstStyle/>
+          <a:p>
+            <a:r>
+              <a:rPr lang="en-US" dirty="0"/>
+              <a:t>Icebreaker Examples</a:t>
+            </a:r>
+          </a:p>
+        </p:txBody>
+      </p:sp>
+      <p:sp>
+        <p:nvSpPr>
+          <p:cNvPr id="3" name="Content Placeholder 2">
+            <a:extLst>
+              <a:ext uri="{FF2B5EF4-FFF2-40B4-BE49-F238E27FC236}">
+                <a16:creationId xmlns:a16="http://schemas.microsoft.com/office/drawing/2014/main" id="{F33662A3-4DD5-0500-C0E1-EA5CF57A5ABC}"/>
+              </a:ext>
+            </a:extLst>
+          </p:cNvPr>
+          <p:cNvSpPr>
+            <a:spLocks noGrp="1"/>
+          </p:cNvSpPr>
+          <p:nvPr>
+            <p:ph idx="1"/>
+          </p:nvPr>
+        </p:nvSpPr>
+        <p:spPr/>
+        <p:txBody>
+          <a:bodyPr/>
+          <a:lstStyle/>
+          <a:p>
+            <a:pPr marL="0" indent="0">
+              <a:buNone/>
+            </a:pPr>
+            <a:r>
+              <a:rPr lang="en-US" dirty="0"/>
+              <a:t>A slide or two that are difficult to interpret, then a slide or two that are easy to interpret?</a:t>
+            </a:r>
+          </a:p>
+        </p:txBody>
+      </p:sp>
+    </p:spTree>
+    <p:extLst>
+      <p:ext uri="{BB962C8B-B14F-4D97-AF65-F5344CB8AC3E}">
+        <p14:creationId xmlns:p14="http://schemas.microsoft.com/office/powerpoint/2010/main" val="330312104"/>
+      </p:ext>
+    </p:extLst>
+  </p:cSld>
+  <p:clrMapOvr>
+    <a:masterClrMapping/>
+  </p:clrMapOvr>
+</p:sld>
+</file>
+
+<file path=ppt/slides/slide7.xml><?xml version="1.0" encoding="utf-8"?>
+<p:sld xmlns:a="http://schemas.openxmlformats.org/drawingml/2006/main" xmlns:r="http://schemas.openxmlformats.org/officeDocument/2006/relationships" xmlns:p="http://schemas.openxmlformats.org/presentationml/2006/main">
+  <p:cSld>
+    <p:spTree>
+      <p:nvGrpSpPr>
+        <p:cNvPr id="1" name=""/>
+        <p:cNvGrpSpPr/>
+        <p:nvPr/>
+      </p:nvGrpSpPr>
+      <p:grpSpPr>
+        <a:xfrm>
+          <a:off x="0" y="0"/>
+          <a:ext cx="0" cy="0"/>
+          <a:chOff x="0" y="0"/>
+          <a:chExt cx="0" cy="0"/>
+        </a:xfrm>
+      </p:grpSpPr>
+      <p:sp>
+        <p:nvSpPr>
+          <p:cNvPr id="2" name="Title 1">
+            <a:extLst>
+              <a:ext uri="{FF2B5EF4-FFF2-40B4-BE49-F238E27FC236}">
+                <a16:creationId xmlns:a16="http://schemas.microsoft.com/office/drawing/2014/main" id="{FB164A08-7CBF-A761-E02D-33DAFF697330}"/>
+              </a:ext>
+            </a:extLst>
+          </p:cNvPr>
+          <p:cNvSpPr>
+            <a:spLocks noGrp="1"/>
+          </p:cNvSpPr>
+          <p:nvPr>
+            <p:ph type="title"/>
+          </p:nvPr>
+        </p:nvSpPr>
+        <p:spPr/>
+        <p:txBody>
+          <a:bodyPr/>
+          <a:lstStyle/>
+          <a:p>
+            <a:r>
+              <a:rPr lang="en-US" dirty="0"/>
+              <a:t>Revisiting common Actuarial Exhibits</a:t>
+            </a:r>
+          </a:p>
+        </p:txBody>
+      </p:sp>
+      <p:sp>
+        <p:nvSpPr>
+          <p:cNvPr id="3" name="Text Placeholder 2">
+            <a:extLst>
+              <a:ext uri="{FF2B5EF4-FFF2-40B4-BE49-F238E27FC236}">
+                <a16:creationId xmlns:a16="http://schemas.microsoft.com/office/drawing/2014/main" id="{4B1F8AE9-444E-BC75-AA22-A6E4BADDFFA8}"/>
+              </a:ext>
+            </a:extLst>
+          </p:cNvPr>
+          <p:cNvSpPr>
+            <a:spLocks noGrp="1"/>
+          </p:cNvSpPr>
+          <p:nvPr>
+            <p:ph type="body" idx="1"/>
+          </p:nvPr>
+        </p:nvSpPr>
+        <p:spPr/>
+        <p:txBody>
+          <a:bodyPr/>
+          <a:lstStyle/>
+          <a:p>
+            <a:endParaRPr lang="en-US"/>
+          </a:p>
+        </p:txBody>
+      </p:sp>
+    </p:spTree>
+    <p:extLst>
+      <p:ext uri="{BB962C8B-B14F-4D97-AF65-F5344CB8AC3E}">
+        <p14:creationId xmlns:p14="http://schemas.microsoft.com/office/powerpoint/2010/main" val="755335451"/>
+      </p:ext>
+    </p:extLst>
+  </p:cSld>
+  <p:clrMapOvr>
+    <a:masterClrMapping/>
+  </p:clrMapOvr>
+</p:sld>
+</file>
+
+<file path=ppt/slides/slide8.xml><?xml version="1.0" encoding="utf-8"?>
+<p:sld xmlns:a="http://schemas.openxmlformats.org/drawingml/2006/main" xmlns:r="http://schemas.openxmlformats.org/officeDocument/2006/relationships" xmlns:p="http://schemas.openxmlformats.org/presentationml/2006/main">
+  <p:cSld>
+    <p:spTree>
+      <p:nvGrpSpPr>
+        <p:cNvPr id="1" name=""/>
+        <p:cNvGrpSpPr/>
+        <p:nvPr/>
+      </p:nvGrpSpPr>
+      <p:grpSpPr>
+        <a:xfrm>
+          <a:off x="0" y="0"/>
+          <a:ext cx="0" cy="0"/>
+          <a:chOff x="0" y="0"/>
+          <a:chExt cx="0" cy="0"/>
+        </a:xfrm>
+      </p:grpSpPr>
+      <p:sp>
+        <p:nvSpPr>
+          <p:cNvPr id="2" name="Title 1">
+            <a:extLst>
+              <a:ext uri="{FF2B5EF4-FFF2-40B4-BE49-F238E27FC236}">
+                <a16:creationId xmlns:a16="http://schemas.microsoft.com/office/drawing/2014/main" id="{18969BF5-0288-FD7C-1739-0C8672F3D7F8}"/>
+              </a:ext>
+            </a:extLst>
+          </p:cNvPr>
+          <p:cNvSpPr>
+            <a:spLocks noGrp="1"/>
+          </p:cNvSpPr>
+          <p:nvPr>
+            <p:ph type="title"/>
+          </p:nvPr>
+        </p:nvSpPr>
+        <p:spPr/>
+        <p:txBody>
+          <a:bodyPr/>
+          <a:lstStyle/>
+          <a:p>
+            <a:r>
+              <a:rPr lang="en-US" dirty="0"/>
+              <a:t>Common Actuarial Exhibits</a:t>
+            </a:r>
+          </a:p>
+        </p:txBody>
+      </p:sp>
+      <p:sp>
+        <p:nvSpPr>
+          <p:cNvPr id="3" name="Content Placeholder 2">
+            <a:extLst>
+              <a:ext uri="{FF2B5EF4-FFF2-40B4-BE49-F238E27FC236}">
+                <a16:creationId xmlns:a16="http://schemas.microsoft.com/office/drawing/2014/main" id="{39176E43-0115-E50B-D268-5E00760022A7}"/>
+              </a:ext>
+            </a:extLst>
+          </p:cNvPr>
+          <p:cNvSpPr>
+            <a:spLocks noGrp="1"/>
+          </p:cNvSpPr>
+          <p:nvPr>
+            <p:ph idx="1"/>
+          </p:nvPr>
+        </p:nvSpPr>
+        <p:spPr/>
+        <p:txBody>
+          <a:bodyPr/>
+          <a:lstStyle/>
+          <a:p>
+            <a:r>
+              <a:rPr lang="en-US" dirty="0"/>
+              <a:t>Loss Development Triangles</a:t>
+            </a:r>
+          </a:p>
+          <a:p>
+            <a:r>
+              <a:rPr lang="en-US" dirty="0"/>
+              <a:t>Trend Selection</a:t>
+            </a:r>
+          </a:p>
+          <a:p>
+            <a:r>
+              <a:rPr lang="en-US" dirty="0"/>
+              <a:t>Rate Indications</a:t>
+            </a:r>
+          </a:p>
+          <a:p>
+            <a:r>
+              <a:rPr lang="en-US" dirty="0"/>
+              <a:t>Mix Shift Exhibits</a:t>
+            </a:r>
+          </a:p>
+          <a:p>
+            <a:r>
+              <a:rPr lang="en-US" dirty="0"/>
+              <a:t>Model Diagnostics</a:t>
+            </a:r>
+          </a:p>
+        </p:txBody>
+      </p:sp>
+    </p:spTree>
+    <p:extLst>
+      <p:ext uri="{BB962C8B-B14F-4D97-AF65-F5344CB8AC3E}">
+        <p14:creationId xmlns:p14="http://schemas.microsoft.com/office/powerpoint/2010/main" val="1365436568"/>
+      </p:ext>
+    </p:extLst>
+  </p:cSld>
+  <p:clrMapOvr>
+    <a:masterClrMapping/>
+  </p:clrMapOvr>
+</p:sld>
+</file>
+
+<file path=ppt/slides/slide9.xml><?xml version="1.0" encoding="utf-8"?>
+<p:sld xmlns:a="http://schemas.openxmlformats.org/drawingml/2006/main" xmlns:r="http://schemas.openxmlformats.org/officeDocument/2006/relationships" xmlns:p="http://schemas.openxmlformats.org/presentationml/2006/main">
+  <p:cSld>
+    <p:spTree>
+      <p:nvGrpSpPr>
+        <p:cNvPr id="1" name=""/>
+        <p:cNvGrpSpPr/>
+        <p:nvPr/>
+      </p:nvGrpSpPr>
+      <p:grpSpPr>
+        <a:xfrm>
+          <a:off x="0" y="0"/>
+          <a:ext cx="0" cy="0"/>
+          <a:chOff x="0" y="0"/>
+          <a:chExt cx="0" cy="0"/>
+        </a:xfrm>
+      </p:grpSpPr>
+      <p:sp>
+        <p:nvSpPr>
+          <p:cNvPr id="2" name="Title 1">
+            <a:extLst>
+              <a:ext uri="{FF2B5EF4-FFF2-40B4-BE49-F238E27FC236}">
+                <a16:creationId xmlns:a16="http://schemas.microsoft.com/office/drawing/2014/main" id="{18969BF5-0288-FD7C-1739-0C8672F3D7F8}"/>
+              </a:ext>
+            </a:extLst>
+          </p:cNvPr>
+          <p:cNvSpPr>
+            <a:spLocks noGrp="1"/>
+          </p:cNvSpPr>
+          <p:nvPr>
+            <p:ph type="title"/>
+          </p:nvPr>
+        </p:nvSpPr>
+        <p:spPr/>
+        <p:txBody>
+          <a:bodyPr/>
+          <a:lstStyle/>
+          <a:p>
+            <a:r>
+              <a:rPr lang="en-US" dirty="0"/>
+              <a:t>Loss Development Triangles</a:t>
+            </a:r>
+          </a:p>
+        </p:txBody>
+      </p:sp>
+      <p:sp>
+        <p:nvSpPr>
+          <p:cNvPr id="3" name="Content Placeholder 2">
+            <a:extLst>
+              <a:ext uri="{FF2B5EF4-FFF2-40B4-BE49-F238E27FC236}">
+                <a16:creationId xmlns:a16="http://schemas.microsoft.com/office/drawing/2014/main" id="{39176E43-0115-E50B-D268-5E00760022A7}"/>
+              </a:ext>
+            </a:extLst>
+          </p:cNvPr>
+          <p:cNvSpPr>
+            <a:spLocks noGrp="1"/>
+          </p:cNvSpPr>
+          <p:nvPr>
+            <p:ph idx="1"/>
+          </p:nvPr>
+        </p:nvSpPr>
+        <p:spPr/>
+        <p:txBody>
+          <a:bodyPr/>
+          <a:lstStyle/>
+          <a:p>
+            <a:endParaRPr lang="en-US" dirty="0"/>
+          </a:p>
+        </p:txBody>
+      </p:sp>
+    </p:spTree>
+    <p:extLst>
+      <p:ext uri="{BB962C8B-B14F-4D97-AF65-F5344CB8AC3E}">
+        <p14:creationId xmlns:p14="http://schemas.microsoft.com/office/powerpoint/2010/main" val="48610386"/>
       </p:ext>
     </p:extLst>
   </p:cSld>

</xml_diff>

<commit_message>
Adding Severity Plots & Plots with 2 Axes
</commit_message>
<xml_diff>
--- a/Presentation Slides/Effective Data Visualization for Actuaries.pptx
+++ b/Presentation Slides/Effective Data Visualization for Actuaries.pptx
@@ -8,7 +8,7 @@
     <p:sldMasterId id="2147483701" r:id="rId4"/>
   </p:sldMasterIdLst>
   <p:notesMasterIdLst>
-    <p:notesMasterId r:id="rId31"/>
+    <p:notesMasterId r:id="rId40"/>
   </p:notesMasterIdLst>
   <p:sldIdLst>
     <p:sldId id="262" r:id="rId5"/>
@@ -16,27 +16,36 @@
     <p:sldId id="268" r:id="rId7"/>
     <p:sldId id="256" r:id="rId8"/>
     <p:sldId id="265" r:id="rId9"/>
-    <p:sldId id="264" r:id="rId10"/>
-    <p:sldId id="281" r:id="rId11"/>
-    <p:sldId id="270" r:id="rId12"/>
-    <p:sldId id="271" r:id="rId13"/>
-    <p:sldId id="272" r:id="rId14"/>
-    <p:sldId id="273" r:id="rId15"/>
-    <p:sldId id="274" r:id="rId16"/>
-    <p:sldId id="275" r:id="rId17"/>
-    <p:sldId id="276" r:id="rId18"/>
-    <p:sldId id="277" r:id="rId19"/>
-    <p:sldId id="278" r:id="rId20"/>
-    <p:sldId id="279" r:id="rId21"/>
-    <p:sldId id="280" r:id="rId22"/>
-    <p:sldId id="283" r:id="rId23"/>
-    <p:sldId id="285" r:id="rId24"/>
-    <p:sldId id="284" r:id="rId25"/>
-    <p:sldId id="286" r:id="rId26"/>
-    <p:sldId id="267" r:id="rId27"/>
-    <p:sldId id="259" r:id="rId28"/>
-    <p:sldId id="260" r:id="rId29"/>
-    <p:sldId id="261" r:id="rId30"/>
+    <p:sldId id="294" r:id="rId10"/>
+    <p:sldId id="264" r:id="rId11"/>
+    <p:sldId id="281" r:id="rId12"/>
+    <p:sldId id="270" r:id="rId13"/>
+    <p:sldId id="271" r:id="rId14"/>
+    <p:sldId id="272" r:id="rId15"/>
+    <p:sldId id="273" r:id="rId16"/>
+    <p:sldId id="274" r:id="rId17"/>
+    <p:sldId id="275" r:id="rId18"/>
+    <p:sldId id="276" r:id="rId19"/>
+    <p:sldId id="277" r:id="rId20"/>
+    <p:sldId id="278" r:id="rId21"/>
+    <p:sldId id="279" r:id="rId22"/>
+    <p:sldId id="280" r:id="rId23"/>
+    <p:sldId id="287" r:id="rId24"/>
+    <p:sldId id="288" r:id="rId25"/>
+    <p:sldId id="283" r:id="rId26"/>
+    <p:sldId id="285" r:id="rId27"/>
+    <p:sldId id="289" r:id="rId28"/>
+    <p:sldId id="291" r:id="rId29"/>
+    <p:sldId id="292" r:id="rId30"/>
+    <p:sldId id="293" r:id="rId31"/>
+    <p:sldId id="298" r:id="rId32"/>
+    <p:sldId id="295" r:id="rId33"/>
+    <p:sldId id="296" r:id="rId34"/>
+    <p:sldId id="297" r:id="rId35"/>
+    <p:sldId id="267" r:id="rId36"/>
+    <p:sldId id="259" r:id="rId37"/>
+    <p:sldId id="260" r:id="rId38"/>
+    <p:sldId id="261" r:id="rId39"/>
   </p:sldIdLst>
   <p:sldSz cx="9144000" cy="6858000" type="screen4x3"/>
   <p:notesSz cx="6858000" cy="9144000"/>
@@ -198,6 +207,497 @@
 </p:presentation>
 </file>
 
+<file path=ppt/changesInfos/changesInfo1.xml><?xml version="1.0" encoding="utf-8"?>
+<pc:chgInfo xmlns:a="http://schemas.openxmlformats.org/drawingml/2006/main" xmlns:r="http://schemas.openxmlformats.org/officeDocument/2006/relationships" xmlns:ac="http://schemas.microsoft.com/office/drawing/2013/main/command" xmlns:pc="http://schemas.microsoft.com/office/powerpoint/2013/main/command">
+  <pc:docChgLst>
+    <pc:chgData name="Bonner Jordan - Hartford-Remote-HSB" userId="e82d229e-6edb-4e20-9ecc-a487e5c63362" providerId="ADAL" clId="{28A72D4B-4855-4526-8442-D42DD59588DA}"/>
+    <pc:docChg chg="undo custSel addSld delSld modSld sldOrd">
+      <pc:chgData name="Bonner Jordan - Hartford-Remote-HSB" userId="e82d229e-6edb-4e20-9ecc-a487e5c63362" providerId="ADAL" clId="{28A72D4B-4855-4526-8442-D42DD59588DA}" dt="2023-03-01T19:52:50.233" v="874" actId="47"/>
+      <pc:docMkLst>
+        <pc:docMk/>
+      </pc:docMkLst>
+      <pc:sldChg chg="modSp mod">
+        <pc:chgData name="Bonner Jordan - Hartford-Remote-HSB" userId="e82d229e-6edb-4e20-9ecc-a487e5c63362" providerId="ADAL" clId="{28A72D4B-4855-4526-8442-D42DD59588DA}" dt="2023-03-01T04:43:55.007" v="244" actId="1035"/>
+        <pc:sldMkLst>
+          <pc:docMk/>
+          <pc:sldMk cId="265096747" sldId="259"/>
+        </pc:sldMkLst>
+        <pc:picChg chg="mod">
+          <ac:chgData name="Bonner Jordan - Hartford-Remote-HSB" userId="e82d229e-6edb-4e20-9ecc-a487e5c63362" providerId="ADAL" clId="{28A72D4B-4855-4526-8442-D42DD59588DA}" dt="2023-03-01T04:43:55.007" v="244" actId="1035"/>
+          <ac:picMkLst>
+            <pc:docMk/>
+            <pc:sldMk cId="265096747" sldId="259"/>
+            <ac:picMk id="5" creationId="{D06BE20D-1734-A4E5-07FB-1D8F60C84269}"/>
+          </ac:picMkLst>
+        </pc:picChg>
+      </pc:sldChg>
+      <pc:sldChg chg="modSp mod">
+        <pc:chgData name="Bonner Jordan - Hartford-Remote-HSB" userId="e82d229e-6edb-4e20-9ecc-a487e5c63362" providerId="ADAL" clId="{28A72D4B-4855-4526-8442-D42DD59588DA}" dt="2023-03-01T19:47:38.873" v="845" actId="20577"/>
+        <pc:sldMkLst>
+          <pc:docMk/>
+          <pc:sldMk cId="177268762" sldId="283"/>
+        </pc:sldMkLst>
+        <pc:spChg chg="mod">
+          <ac:chgData name="Bonner Jordan - Hartford-Remote-HSB" userId="e82d229e-6edb-4e20-9ecc-a487e5c63362" providerId="ADAL" clId="{28A72D4B-4855-4526-8442-D42DD59588DA}" dt="2023-03-01T19:47:38.873" v="845" actId="20577"/>
+          <ac:spMkLst>
+            <pc:docMk/>
+            <pc:sldMk cId="177268762" sldId="283"/>
+            <ac:spMk id="2" creationId="{FABAA41A-77E6-2FBA-A297-38D8E88EA1EE}"/>
+          </ac:spMkLst>
+        </pc:spChg>
+      </pc:sldChg>
+      <pc:sldChg chg="modSp del mod">
+        <pc:chgData name="Bonner Jordan - Hartford-Remote-HSB" userId="e82d229e-6edb-4e20-9ecc-a487e5c63362" providerId="ADAL" clId="{28A72D4B-4855-4526-8442-D42DD59588DA}" dt="2023-03-01T04:45:05.497" v="266" actId="47"/>
+        <pc:sldMkLst>
+          <pc:docMk/>
+          <pc:sldMk cId="1481048253" sldId="284"/>
+        </pc:sldMkLst>
+        <pc:spChg chg="mod">
+          <ac:chgData name="Bonner Jordan - Hartford-Remote-HSB" userId="e82d229e-6edb-4e20-9ecc-a487e5c63362" providerId="ADAL" clId="{28A72D4B-4855-4526-8442-D42DD59588DA}" dt="2023-03-01T03:54:08.200" v="238" actId="20577"/>
+          <ac:spMkLst>
+            <pc:docMk/>
+            <pc:sldMk cId="1481048253" sldId="284"/>
+            <ac:spMk id="2" creationId="{18969BF5-0288-FD7C-1739-0C8672F3D7F8}"/>
+          </ac:spMkLst>
+        </pc:spChg>
+      </pc:sldChg>
+      <pc:sldChg chg="addSp delSp modSp mod">
+        <pc:chgData name="Bonner Jordan - Hartford-Remote-HSB" userId="e82d229e-6edb-4e20-9ecc-a487e5c63362" providerId="ADAL" clId="{28A72D4B-4855-4526-8442-D42DD59588DA}" dt="2023-03-01T12:57:12.337" v="345" actId="20577"/>
+        <pc:sldMkLst>
+          <pc:docMk/>
+          <pc:sldMk cId="3241427914" sldId="285"/>
+        </pc:sldMkLst>
+        <pc:spChg chg="mod">
+          <ac:chgData name="Bonner Jordan - Hartford-Remote-HSB" userId="e82d229e-6edb-4e20-9ecc-a487e5c63362" providerId="ADAL" clId="{28A72D4B-4855-4526-8442-D42DD59588DA}" dt="2023-03-01T03:48:04.301" v="142" actId="14100"/>
+          <ac:spMkLst>
+            <pc:docMk/>
+            <pc:sldMk cId="3241427914" sldId="285"/>
+            <ac:spMk id="2" creationId="{18969BF5-0288-FD7C-1739-0C8672F3D7F8}"/>
+          </ac:spMkLst>
+        </pc:spChg>
+        <pc:spChg chg="del">
+          <ac:chgData name="Bonner Jordan - Hartford-Remote-HSB" userId="e82d229e-6edb-4e20-9ecc-a487e5c63362" providerId="ADAL" clId="{28A72D4B-4855-4526-8442-D42DD59588DA}" dt="2023-03-01T03:48:08.235" v="143" actId="478"/>
+          <ac:spMkLst>
+            <pc:docMk/>
+            <pc:sldMk cId="3241427914" sldId="285"/>
+            <ac:spMk id="3" creationId="{39176E43-0115-E50B-D268-5E00760022A7}"/>
+          </ac:spMkLst>
+        </pc:spChg>
+        <pc:spChg chg="add mod">
+          <ac:chgData name="Bonner Jordan - Hartford-Remote-HSB" userId="e82d229e-6edb-4e20-9ecc-a487e5c63362" providerId="ADAL" clId="{28A72D4B-4855-4526-8442-D42DD59588DA}" dt="2023-03-01T12:57:12.337" v="345" actId="20577"/>
+          <ac:spMkLst>
+            <pc:docMk/>
+            <pc:sldMk cId="3241427914" sldId="285"/>
+            <ac:spMk id="3" creationId="{D90ECCA0-06AB-B8AB-4B22-AA383E47AE34}"/>
+          </ac:spMkLst>
+        </pc:spChg>
+        <pc:spChg chg="add mod">
+          <ac:chgData name="Bonner Jordan - Hartford-Remote-HSB" userId="e82d229e-6edb-4e20-9ecc-a487e5c63362" providerId="ADAL" clId="{28A72D4B-4855-4526-8442-D42DD59588DA}" dt="2023-03-01T03:49:48.792" v="203" actId="1076"/>
+          <ac:spMkLst>
+            <pc:docMk/>
+            <pc:sldMk cId="3241427914" sldId="285"/>
+            <ac:spMk id="5" creationId="{2CA6CE52-CDE9-6BD5-D02A-0B9CDE177F35}"/>
+          </ac:spMkLst>
+        </pc:spChg>
+        <pc:picChg chg="add mod">
+          <ac:chgData name="Bonner Jordan - Hartford-Remote-HSB" userId="e82d229e-6edb-4e20-9ecc-a487e5c63362" providerId="ADAL" clId="{28A72D4B-4855-4526-8442-D42DD59588DA}" dt="2023-03-01T12:49:46.711" v="289" actId="14826"/>
+          <ac:picMkLst>
+            <pc:docMk/>
+            <pc:sldMk cId="3241427914" sldId="285"/>
+            <ac:picMk id="4" creationId="{E725ABD2-C6D9-F502-2921-0DC1A1664FD0}"/>
+          </ac:picMkLst>
+        </pc:picChg>
+      </pc:sldChg>
+      <pc:sldChg chg="del">
+        <pc:chgData name="Bonner Jordan - Hartford-Remote-HSB" userId="e82d229e-6edb-4e20-9ecc-a487e5c63362" providerId="ADAL" clId="{28A72D4B-4855-4526-8442-D42DD59588DA}" dt="2023-03-01T12:51:30.435" v="302" actId="47"/>
+        <pc:sldMkLst>
+          <pc:docMk/>
+          <pc:sldMk cId="2002468093" sldId="286"/>
+        </pc:sldMkLst>
+      </pc:sldChg>
+      <pc:sldChg chg="addSp delSp modSp add mod">
+        <pc:chgData name="Bonner Jordan - Hartford-Remote-HSB" userId="e82d229e-6edb-4e20-9ecc-a487e5c63362" providerId="ADAL" clId="{28A72D4B-4855-4526-8442-D42DD59588DA}" dt="2023-03-01T02:49:17.425" v="52" actId="14826"/>
+        <pc:sldMkLst>
+          <pc:docMk/>
+          <pc:sldMk cId="913523918" sldId="287"/>
+        </pc:sldMkLst>
+        <pc:spChg chg="mod">
+          <ac:chgData name="Bonner Jordan - Hartford-Remote-HSB" userId="e82d229e-6edb-4e20-9ecc-a487e5c63362" providerId="ADAL" clId="{28A72D4B-4855-4526-8442-D42DD59588DA}" dt="2023-03-01T02:47:26.214" v="33" actId="20577"/>
+          <ac:spMkLst>
+            <pc:docMk/>
+            <pc:sldMk cId="913523918" sldId="287"/>
+            <ac:spMk id="2" creationId="{18969BF5-0288-FD7C-1739-0C8672F3D7F8}"/>
+          </ac:spMkLst>
+        </pc:spChg>
+        <pc:spChg chg="del mod">
+          <ac:chgData name="Bonner Jordan - Hartford-Remote-HSB" userId="e82d229e-6edb-4e20-9ecc-a487e5c63362" providerId="ADAL" clId="{28A72D4B-4855-4526-8442-D42DD59588DA}" dt="2023-03-01T02:47:33.434" v="35" actId="478"/>
+          <ac:spMkLst>
+            <pc:docMk/>
+            <pc:sldMk cId="913523918" sldId="287"/>
+            <ac:spMk id="3" creationId="{39176E43-0115-E50B-D268-5E00760022A7}"/>
+          </ac:spMkLst>
+        </pc:spChg>
+        <pc:picChg chg="add mod">
+          <ac:chgData name="Bonner Jordan - Hartford-Remote-HSB" userId="e82d229e-6edb-4e20-9ecc-a487e5c63362" providerId="ADAL" clId="{28A72D4B-4855-4526-8442-D42DD59588DA}" dt="2023-03-01T02:48:50.214" v="50" actId="14826"/>
+          <ac:picMkLst>
+            <pc:docMk/>
+            <pc:sldMk cId="913523918" sldId="287"/>
+            <ac:picMk id="4" creationId="{A2EC8706-13D3-34C0-88D2-7EFE786C048F}"/>
+          </ac:picMkLst>
+        </pc:picChg>
+        <pc:picChg chg="add mod">
+          <ac:chgData name="Bonner Jordan - Hartford-Remote-HSB" userId="e82d229e-6edb-4e20-9ecc-a487e5c63362" providerId="ADAL" clId="{28A72D4B-4855-4526-8442-D42DD59588DA}" dt="2023-03-01T02:49:17.425" v="52" actId="14826"/>
+          <ac:picMkLst>
+            <pc:docMk/>
+            <pc:sldMk cId="913523918" sldId="287"/>
+            <ac:picMk id="5" creationId="{0183E975-398D-49AA-4FFE-0DD7A11833F4}"/>
+          </ac:picMkLst>
+        </pc:picChg>
+      </pc:sldChg>
+      <pc:sldChg chg="addSp delSp modSp add mod">
+        <pc:chgData name="Bonner Jordan - Hartford-Remote-HSB" userId="e82d229e-6edb-4e20-9ecc-a487e5c63362" providerId="ADAL" clId="{28A72D4B-4855-4526-8442-D42DD59588DA}" dt="2023-03-01T02:50:04.593" v="62" actId="1036"/>
+        <pc:sldMkLst>
+          <pc:docMk/>
+          <pc:sldMk cId="2704861902" sldId="288"/>
+        </pc:sldMkLst>
+        <pc:picChg chg="add mod">
+          <ac:chgData name="Bonner Jordan - Hartford-Remote-HSB" userId="e82d229e-6edb-4e20-9ecc-a487e5c63362" providerId="ADAL" clId="{28A72D4B-4855-4526-8442-D42DD59588DA}" dt="2023-03-01T02:50:04.593" v="62" actId="1036"/>
+          <ac:picMkLst>
+            <pc:docMk/>
+            <pc:sldMk cId="2704861902" sldId="288"/>
+            <ac:picMk id="3" creationId="{A7EF95ED-D8F3-6D8A-77DF-8B91594C2B97}"/>
+          </ac:picMkLst>
+        </pc:picChg>
+        <pc:picChg chg="del">
+          <ac:chgData name="Bonner Jordan - Hartford-Remote-HSB" userId="e82d229e-6edb-4e20-9ecc-a487e5c63362" providerId="ADAL" clId="{28A72D4B-4855-4526-8442-D42DD59588DA}" dt="2023-03-01T02:49:25.719" v="54" actId="478"/>
+          <ac:picMkLst>
+            <pc:docMk/>
+            <pc:sldMk cId="2704861902" sldId="288"/>
+            <ac:picMk id="4" creationId="{A2EC8706-13D3-34C0-88D2-7EFE786C048F}"/>
+          </ac:picMkLst>
+        </pc:picChg>
+        <pc:picChg chg="del">
+          <ac:chgData name="Bonner Jordan - Hartford-Remote-HSB" userId="e82d229e-6edb-4e20-9ecc-a487e5c63362" providerId="ADAL" clId="{28A72D4B-4855-4526-8442-D42DD59588DA}" dt="2023-03-01T02:49:25.719" v="54" actId="478"/>
+          <ac:picMkLst>
+            <pc:docMk/>
+            <pc:sldMk cId="2704861902" sldId="288"/>
+            <ac:picMk id="5" creationId="{0183E975-398D-49AA-4FFE-0DD7A11833F4}"/>
+          </ac:picMkLst>
+        </pc:picChg>
+      </pc:sldChg>
+      <pc:sldChg chg="addSp delSp modSp add mod">
+        <pc:chgData name="Bonner Jordan - Hartford-Remote-HSB" userId="e82d229e-6edb-4e20-9ecc-a487e5c63362" providerId="ADAL" clId="{28A72D4B-4855-4526-8442-D42DD59588DA}" dt="2023-03-01T13:01:44.279" v="506" actId="20577"/>
+        <pc:sldMkLst>
+          <pc:docMk/>
+          <pc:sldMk cId="2442441093" sldId="289"/>
+        </pc:sldMkLst>
+        <pc:spChg chg="del">
+          <ac:chgData name="Bonner Jordan - Hartford-Remote-HSB" userId="e82d229e-6edb-4e20-9ecc-a487e5c63362" providerId="ADAL" clId="{28A72D4B-4855-4526-8442-D42DD59588DA}" dt="2023-03-01T04:44:06.255" v="246" actId="478"/>
+          <ac:spMkLst>
+            <pc:docMk/>
+            <pc:sldMk cId="2442441093" sldId="289"/>
+            <ac:spMk id="3" creationId="{39176E43-0115-E50B-D268-5E00760022A7}"/>
+          </ac:spMkLst>
+        </pc:spChg>
+        <pc:spChg chg="add mod">
+          <ac:chgData name="Bonner Jordan - Hartford-Remote-HSB" userId="e82d229e-6edb-4e20-9ecc-a487e5c63362" providerId="ADAL" clId="{28A72D4B-4855-4526-8442-D42DD59588DA}" dt="2023-03-01T12:58:45.789" v="373" actId="20577"/>
+          <ac:spMkLst>
+            <pc:docMk/>
+            <pc:sldMk cId="2442441093" sldId="289"/>
+            <ac:spMk id="3" creationId="{5CA26C35-36C9-ADDC-3107-CF1F9C4ABAD9}"/>
+          </ac:spMkLst>
+        </pc:spChg>
+        <pc:spChg chg="add mod">
+          <ac:chgData name="Bonner Jordan - Hartford-Remote-HSB" userId="e82d229e-6edb-4e20-9ecc-a487e5c63362" providerId="ADAL" clId="{28A72D4B-4855-4526-8442-D42DD59588DA}" dt="2023-03-01T13:01:44.279" v="506" actId="20577"/>
+          <ac:spMkLst>
+            <pc:docMk/>
+            <pc:sldMk cId="2442441093" sldId="289"/>
+            <ac:spMk id="5" creationId="{04AF6261-B4B1-D761-810B-AACA39E89170}"/>
+          </ac:spMkLst>
+        </pc:spChg>
+        <pc:picChg chg="add mod">
+          <ac:chgData name="Bonner Jordan - Hartford-Remote-HSB" userId="e82d229e-6edb-4e20-9ecc-a487e5c63362" providerId="ADAL" clId="{28A72D4B-4855-4526-8442-D42DD59588DA}" dt="2023-03-01T12:50:04.045" v="291" actId="14826"/>
+          <ac:picMkLst>
+            <pc:docMk/>
+            <pc:sldMk cId="2442441093" sldId="289"/>
+            <ac:picMk id="4" creationId="{4A0037C9-EB90-2900-D4EC-DF813BC908A7}"/>
+          </ac:picMkLst>
+        </pc:picChg>
+      </pc:sldChg>
+      <pc:sldChg chg="add del">
+        <pc:chgData name="Bonner Jordan - Hartford-Remote-HSB" userId="e82d229e-6edb-4e20-9ecc-a487e5c63362" providerId="ADAL" clId="{28A72D4B-4855-4526-8442-D42DD59588DA}" dt="2023-03-01T12:51:11.396" v="294" actId="47"/>
+        <pc:sldMkLst>
+          <pc:docMk/>
+          <pc:sldMk cId="1280462283" sldId="290"/>
+        </pc:sldMkLst>
+      </pc:sldChg>
+      <pc:sldChg chg="addSp delSp modSp add mod">
+        <pc:chgData name="Bonner Jordan - Hartford-Remote-HSB" userId="e82d229e-6edb-4e20-9ecc-a487e5c63362" providerId="ADAL" clId="{28A72D4B-4855-4526-8442-D42DD59588DA}" dt="2023-03-01T13:02:17.551" v="584" actId="1076"/>
+        <pc:sldMkLst>
+          <pc:docMk/>
+          <pc:sldMk cId="2236211018" sldId="291"/>
+        </pc:sldMkLst>
+        <pc:spChg chg="mod">
+          <ac:chgData name="Bonner Jordan - Hartford-Remote-HSB" userId="e82d229e-6edb-4e20-9ecc-a487e5c63362" providerId="ADAL" clId="{28A72D4B-4855-4526-8442-D42DD59588DA}" dt="2023-03-01T04:44:32.899" v="264" actId="20577"/>
+          <ac:spMkLst>
+            <pc:docMk/>
+            <pc:sldMk cId="2236211018" sldId="291"/>
+            <ac:spMk id="2" creationId="{18969BF5-0288-FD7C-1739-0C8672F3D7F8}"/>
+          </ac:spMkLst>
+        </pc:spChg>
+        <pc:spChg chg="add del mod">
+          <ac:chgData name="Bonner Jordan - Hartford-Remote-HSB" userId="e82d229e-6edb-4e20-9ecc-a487e5c63362" providerId="ADAL" clId="{28A72D4B-4855-4526-8442-D42DD59588DA}" dt="2023-03-01T12:58:30.106" v="360" actId="478"/>
+          <ac:spMkLst>
+            <pc:docMk/>
+            <pc:sldMk cId="2236211018" sldId="291"/>
+            <ac:spMk id="3" creationId="{43D5C90E-B532-652C-4B65-FBC34DD549F8}"/>
+          </ac:spMkLst>
+        </pc:spChg>
+        <pc:spChg chg="mod">
+          <ac:chgData name="Bonner Jordan - Hartford-Remote-HSB" userId="e82d229e-6edb-4e20-9ecc-a487e5c63362" providerId="ADAL" clId="{28A72D4B-4855-4526-8442-D42DD59588DA}" dt="2023-03-01T13:02:17.551" v="584" actId="1076"/>
+          <ac:spMkLst>
+            <pc:docMk/>
+            <pc:sldMk cId="2236211018" sldId="291"/>
+            <ac:spMk id="5" creationId="{04AF6261-B4B1-D761-810B-AACA39E89170}"/>
+          </ac:spMkLst>
+        </pc:spChg>
+        <pc:spChg chg="add mod ord">
+          <ac:chgData name="Bonner Jordan - Hartford-Remote-HSB" userId="e82d229e-6edb-4e20-9ecc-a487e5c63362" providerId="ADAL" clId="{28A72D4B-4855-4526-8442-D42DD59588DA}" dt="2023-03-01T12:58:54.562" v="378" actId="20577"/>
+          <ac:spMkLst>
+            <pc:docMk/>
+            <pc:sldMk cId="2236211018" sldId="291"/>
+            <ac:spMk id="6" creationId="{5B20AD6F-D343-29FB-9824-B7DD8F4A2DDB}"/>
+          </ac:spMkLst>
+        </pc:spChg>
+        <pc:picChg chg="mod">
+          <ac:chgData name="Bonner Jordan - Hartford-Remote-HSB" userId="e82d229e-6edb-4e20-9ecc-a487e5c63362" providerId="ADAL" clId="{28A72D4B-4855-4526-8442-D42DD59588DA}" dt="2023-03-01T12:50:15.343" v="292" actId="14826"/>
+          <ac:picMkLst>
+            <pc:docMk/>
+            <pc:sldMk cId="2236211018" sldId="291"/>
+            <ac:picMk id="4" creationId="{4A0037C9-EB90-2900-D4EC-DF813BC908A7}"/>
+          </ac:picMkLst>
+        </pc:picChg>
+      </pc:sldChg>
+      <pc:sldChg chg="addSp modSp add mod">
+        <pc:chgData name="Bonner Jordan - Hartford-Remote-HSB" userId="e82d229e-6edb-4e20-9ecc-a487e5c63362" providerId="ADAL" clId="{28A72D4B-4855-4526-8442-D42DD59588DA}" dt="2023-03-01T13:02:37.594" v="644" actId="1076"/>
+        <pc:sldMkLst>
+          <pc:docMk/>
+          <pc:sldMk cId="3053040336" sldId="292"/>
+        </pc:sldMkLst>
+        <pc:spChg chg="mod">
+          <ac:chgData name="Bonner Jordan - Hartford-Remote-HSB" userId="e82d229e-6edb-4e20-9ecc-a487e5c63362" providerId="ADAL" clId="{28A72D4B-4855-4526-8442-D42DD59588DA}" dt="2023-03-01T12:45:29.789" v="288" actId="20577"/>
+          <ac:spMkLst>
+            <pc:docMk/>
+            <pc:sldMk cId="3053040336" sldId="292"/>
+            <ac:spMk id="2" creationId="{18969BF5-0288-FD7C-1739-0C8672F3D7F8}"/>
+          </ac:spMkLst>
+        </pc:spChg>
+        <pc:spChg chg="add mod">
+          <ac:chgData name="Bonner Jordan - Hartford-Remote-HSB" userId="e82d229e-6edb-4e20-9ecc-a487e5c63362" providerId="ADAL" clId="{28A72D4B-4855-4526-8442-D42DD59588DA}" dt="2023-03-01T12:59:38.779" v="393" actId="20577"/>
+          <ac:spMkLst>
+            <pc:docMk/>
+            <pc:sldMk cId="3053040336" sldId="292"/>
+            <ac:spMk id="3" creationId="{6C6ADEAB-5768-68AB-60CA-2FE1BC43C7E3}"/>
+          </ac:spMkLst>
+        </pc:spChg>
+        <pc:spChg chg="mod">
+          <ac:chgData name="Bonner Jordan - Hartford-Remote-HSB" userId="e82d229e-6edb-4e20-9ecc-a487e5c63362" providerId="ADAL" clId="{28A72D4B-4855-4526-8442-D42DD59588DA}" dt="2023-03-01T13:02:37.594" v="644" actId="1076"/>
+          <ac:spMkLst>
+            <pc:docMk/>
+            <pc:sldMk cId="3053040336" sldId="292"/>
+            <ac:spMk id="5" creationId="{04AF6261-B4B1-D761-810B-AACA39E89170}"/>
+          </ac:spMkLst>
+        </pc:spChg>
+        <pc:picChg chg="mod">
+          <ac:chgData name="Bonner Jordan - Hartford-Remote-HSB" userId="e82d229e-6edb-4e20-9ecc-a487e5c63362" providerId="ADAL" clId="{28A72D4B-4855-4526-8442-D42DD59588DA}" dt="2023-03-01T12:50:34.730" v="293" actId="14826"/>
+          <ac:picMkLst>
+            <pc:docMk/>
+            <pc:sldMk cId="3053040336" sldId="292"/>
+            <ac:picMk id="4" creationId="{4A0037C9-EB90-2900-D4EC-DF813BC908A7}"/>
+          </ac:picMkLst>
+        </pc:picChg>
+      </pc:sldChg>
+      <pc:sldChg chg="addSp modSp add mod">
+        <pc:chgData name="Bonner Jordan - Hartford-Remote-HSB" userId="e82d229e-6edb-4e20-9ecc-a487e5c63362" providerId="ADAL" clId="{28A72D4B-4855-4526-8442-D42DD59588DA}" dt="2023-03-01T13:02:49.107" v="686" actId="20577"/>
+        <pc:sldMkLst>
+          <pc:docMk/>
+          <pc:sldMk cId="1956384913" sldId="293"/>
+        </pc:sldMkLst>
+        <pc:spChg chg="mod">
+          <ac:chgData name="Bonner Jordan - Hartford-Remote-HSB" userId="e82d229e-6edb-4e20-9ecc-a487e5c63362" providerId="ADAL" clId="{28A72D4B-4855-4526-8442-D42DD59588DA}" dt="2023-03-01T12:51:16.233" v="300" actId="20577"/>
+          <ac:spMkLst>
+            <pc:docMk/>
+            <pc:sldMk cId="1956384913" sldId="293"/>
+            <ac:spMk id="2" creationId="{18969BF5-0288-FD7C-1739-0C8672F3D7F8}"/>
+          </ac:spMkLst>
+        </pc:spChg>
+        <pc:spChg chg="add mod">
+          <ac:chgData name="Bonner Jordan - Hartford-Remote-HSB" userId="e82d229e-6edb-4e20-9ecc-a487e5c63362" providerId="ADAL" clId="{28A72D4B-4855-4526-8442-D42DD59588DA}" dt="2023-03-01T13:01:17.103" v="438" actId="20577"/>
+          <ac:spMkLst>
+            <pc:docMk/>
+            <pc:sldMk cId="1956384913" sldId="293"/>
+            <ac:spMk id="3" creationId="{4FD38AA8-E08D-AFDB-588A-1A0A6FD4205A}"/>
+          </ac:spMkLst>
+        </pc:spChg>
+        <pc:spChg chg="mod">
+          <ac:chgData name="Bonner Jordan - Hartford-Remote-HSB" userId="e82d229e-6edb-4e20-9ecc-a487e5c63362" providerId="ADAL" clId="{28A72D4B-4855-4526-8442-D42DD59588DA}" dt="2023-03-01T13:02:49.107" v="686" actId="20577"/>
+          <ac:spMkLst>
+            <pc:docMk/>
+            <pc:sldMk cId="1956384913" sldId="293"/>
+            <ac:spMk id="5" creationId="{04AF6261-B4B1-D761-810B-AACA39E89170}"/>
+          </ac:spMkLst>
+        </pc:spChg>
+        <pc:picChg chg="mod">
+          <ac:chgData name="Bonner Jordan - Hartford-Remote-HSB" userId="e82d229e-6edb-4e20-9ecc-a487e5c63362" providerId="ADAL" clId="{28A72D4B-4855-4526-8442-D42DD59588DA}" dt="2023-03-01T12:51:26.489" v="301" actId="14826"/>
+          <ac:picMkLst>
+            <pc:docMk/>
+            <pc:sldMk cId="1956384913" sldId="293"/>
+            <ac:picMk id="4" creationId="{4A0037C9-EB90-2900-D4EC-DF813BC908A7}"/>
+          </ac:picMkLst>
+        </pc:picChg>
+      </pc:sldChg>
+      <pc:sldChg chg="modSp add mod">
+        <pc:chgData name="Bonner Jordan - Hartford-Remote-HSB" userId="e82d229e-6edb-4e20-9ecc-a487e5c63362" providerId="ADAL" clId="{28A72D4B-4855-4526-8442-D42DD59588DA}" dt="2023-03-01T19:46:58.361" v="809" actId="404"/>
+        <pc:sldMkLst>
+          <pc:docMk/>
+          <pc:sldMk cId="1338125014" sldId="294"/>
+        </pc:sldMkLst>
+        <pc:spChg chg="mod">
+          <ac:chgData name="Bonner Jordan - Hartford-Remote-HSB" userId="e82d229e-6edb-4e20-9ecc-a487e5c63362" providerId="ADAL" clId="{28A72D4B-4855-4526-8442-D42DD59588DA}" dt="2023-03-01T19:45:52.833" v="693" actId="20577"/>
+          <ac:spMkLst>
+            <pc:docMk/>
+            <pc:sldMk cId="1338125014" sldId="294"/>
+            <ac:spMk id="2" creationId="{10B17ABD-BE88-D042-5997-22F660D5947A}"/>
+          </ac:spMkLst>
+        </pc:spChg>
+        <pc:spChg chg="mod">
+          <ac:chgData name="Bonner Jordan - Hartford-Remote-HSB" userId="e82d229e-6edb-4e20-9ecc-a487e5c63362" providerId="ADAL" clId="{28A72D4B-4855-4526-8442-D42DD59588DA}" dt="2023-03-01T19:46:58.361" v="809" actId="404"/>
+          <ac:spMkLst>
+            <pc:docMk/>
+            <pc:sldMk cId="1338125014" sldId="294"/>
+            <ac:spMk id="3" creationId="{F33662A3-4DD5-0500-C0E1-EA5CF57A5ABC}"/>
+          </ac:spMkLst>
+        </pc:spChg>
+      </pc:sldChg>
+      <pc:sldChg chg="add">
+        <pc:chgData name="Bonner Jordan - Hartford-Remote-HSB" userId="e82d229e-6edb-4e20-9ecc-a487e5c63362" providerId="ADAL" clId="{28A72D4B-4855-4526-8442-D42DD59588DA}" dt="2023-03-01T19:47:23.621" v="810"/>
+        <pc:sldMkLst>
+          <pc:docMk/>
+          <pc:sldMk cId="4002762296" sldId="295"/>
+        </pc:sldMkLst>
+      </pc:sldChg>
+      <pc:sldChg chg="add">
+        <pc:chgData name="Bonner Jordan - Hartford-Remote-HSB" userId="e82d229e-6edb-4e20-9ecc-a487e5c63362" providerId="ADAL" clId="{28A72D4B-4855-4526-8442-D42DD59588DA}" dt="2023-03-01T19:47:23.621" v="810"/>
+        <pc:sldMkLst>
+          <pc:docMk/>
+          <pc:sldMk cId="1608165928" sldId="296"/>
+        </pc:sldMkLst>
+      </pc:sldChg>
+      <pc:sldChg chg="add">
+        <pc:chgData name="Bonner Jordan - Hartford-Remote-HSB" userId="e82d229e-6edb-4e20-9ecc-a487e5c63362" providerId="ADAL" clId="{28A72D4B-4855-4526-8442-D42DD59588DA}" dt="2023-03-01T19:47:23.621" v="810"/>
+        <pc:sldMkLst>
+          <pc:docMk/>
+          <pc:sldMk cId="1443684485" sldId="297"/>
+        </pc:sldMkLst>
+      </pc:sldChg>
+      <pc:sldChg chg="add del ord">
+        <pc:chgData name="Bonner Jordan - Hartford-Remote-HSB" userId="e82d229e-6edb-4e20-9ecc-a487e5c63362" providerId="ADAL" clId="{28A72D4B-4855-4526-8442-D42DD59588DA}" dt="2023-03-01T19:47:31.540" v="814" actId="47"/>
+        <pc:sldMkLst>
+          <pc:docMk/>
+          <pc:sldMk cId="1702470165" sldId="298"/>
+        </pc:sldMkLst>
+      </pc:sldChg>
+      <pc:sldChg chg="addSp delSp modSp add mod">
+        <pc:chgData name="Bonner Jordan - Hartford-Remote-HSB" userId="e82d229e-6edb-4e20-9ecc-a487e5c63362" providerId="ADAL" clId="{28A72D4B-4855-4526-8442-D42DD59588DA}" dt="2023-03-01T19:52:39.395" v="873" actId="478"/>
+        <pc:sldMkLst>
+          <pc:docMk/>
+          <pc:sldMk cId="2934773690" sldId="298"/>
+        </pc:sldMkLst>
+        <pc:spChg chg="mod">
+          <ac:chgData name="Bonner Jordan - Hartford-Remote-HSB" userId="e82d229e-6edb-4e20-9ecc-a487e5c63362" providerId="ADAL" clId="{28A72D4B-4855-4526-8442-D42DD59588DA}" dt="2023-03-01T19:51:26.010" v="856" actId="20577"/>
+          <ac:spMkLst>
+            <pc:docMk/>
+            <pc:sldMk cId="2934773690" sldId="298"/>
+            <ac:spMk id="2" creationId="{18969BF5-0288-FD7C-1739-0C8672F3D7F8}"/>
+          </ac:spMkLst>
+        </pc:spChg>
+        <pc:spChg chg="del">
+          <ac:chgData name="Bonner Jordan - Hartford-Remote-HSB" userId="e82d229e-6edb-4e20-9ecc-a487e5c63362" providerId="ADAL" clId="{28A72D4B-4855-4526-8442-D42DD59588DA}" dt="2023-03-01T19:51:30.187" v="858" actId="478"/>
+          <ac:spMkLst>
+            <pc:docMk/>
+            <pc:sldMk cId="2934773690" sldId="298"/>
+            <ac:spMk id="3" creationId="{4FD38AA8-E08D-AFDB-588A-1A0A6FD4205A}"/>
+          </ac:spMkLst>
+        </pc:spChg>
+        <pc:spChg chg="del">
+          <ac:chgData name="Bonner Jordan - Hartford-Remote-HSB" userId="e82d229e-6edb-4e20-9ecc-a487e5c63362" providerId="ADAL" clId="{28A72D4B-4855-4526-8442-D42DD59588DA}" dt="2023-03-01T19:51:28.375" v="857" actId="478"/>
+          <ac:spMkLst>
+            <pc:docMk/>
+            <pc:sldMk cId="2934773690" sldId="298"/>
+            <ac:spMk id="5" creationId="{04AF6261-B4B1-D761-810B-AACA39E89170}"/>
+          </ac:spMkLst>
+        </pc:spChg>
+        <pc:picChg chg="mod">
+          <ac:chgData name="Bonner Jordan - Hartford-Remote-HSB" userId="e82d229e-6edb-4e20-9ecc-a487e5c63362" providerId="ADAL" clId="{28A72D4B-4855-4526-8442-D42DD59588DA}" dt="2023-03-01T19:52:35.863" v="871" actId="555"/>
+          <ac:picMkLst>
+            <pc:docMk/>
+            <pc:sldMk cId="2934773690" sldId="298"/>
+            <ac:picMk id="4" creationId="{4A0037C9-EB90-2900-D4EC-DF813BC908A7}"/>
+          </ac:picMkLst>
+        </pc:picChg>
+        <pc:picChg chg="add mod">
+          <ac:chgData name="Bonner Jordan - Hartford-Remote-HSB" userId="e82d229e-6edb-4e20-9ecc-a487e5c63362" providerId="ADAL" clId="{28A72D4B-4855-4526-8442-D42DD59588DA}" dt="2023-03-01T19:52:30.565" v="870" actId="555"/>
+          <ac:picMkLst>
+            <pc:docMk/>
+            <pc:sldMk cId="2934773690" sldId="298"/>
+            <ac:picMk id="6" creationId="{D8447591-D830-A3F2-DC0D-858B0C9B5E06}"/>
+          </ac:picMkLst>
+        </pc:picChg>
+        <pc:picChg chg="add del mod">
+          <ac:chgData name="Bonner Jordan - Hartford-Remote-HSB" userId="e82d229e-6edb-4e20-9ecc-a487e5c63362" providerId="ADAL" clId="{28A72D4B-4855-4526-8442-D42DD59588DA}" dt="2023-03-01T19:52:39.395" v="873" actId="478"/>
+          <ac:picMkLst>
+            <pc:docMk/>
+            <pc:sldMk cId="2934773690" sldId="298"/>
+            <ac:picMk id="7" creationId="{1BA4302A-0527-65BF-65A8-F122A0EFB3C6}"/>
+          </ac:picMkLst>
+        </pc:picChg>
+        <pc:picChg chg="add del mod">
+          <ac:chgData name="Bonner Jordan - Hartford-Remote-HSB" userId="e82d229e-6edb-4e20-9ecc-a487e5c63362" providerId="ADAL" clId="{28A72D4B-4855-4526-8442-D42DD59588DA}" dt="2023-03-01T19:52:39.395" v="873" actId="478"/>
+          <ac:picMkLst>
+            <pc:docMk/>
+            <pc:sldMk cId="2934773690" sldId="298"/>
+            <ac:picMk id="8" creationId="{28361197-4891-DE0D-3D52-E5B55D2D7BD8}"/>
+          </ac:picMkLst>
+        </pc:picChg>
+      </pc:sldChg>
+      <pc:sldChg chg="modSp add del mod">
+        <pc:chgData name="Bonner Jordan - Hartford-Remote-HSB" userId="e82d229e-6edb-4e20-9ecc-a487e5c63362" providerId="ADAL" clId="{28A72D4B-4855-4526-8442-D42DD59588DA}" dt="2023-03-01T19:52:50.233" v="874" actId="47"/>
+        <pc:sldMkLst>
+          <pc:docMk/>
+          <pc:sldMk cId="2514743276" sldId="299"/>
+        </pc:sldMkLst>
+        <pc:picChg chg="mod">
+          <ac:chgData name="Bonner Jordan - Hartford-Remote-HSB" userId="e82d229e-6edb-4e20-9ecc-a487e5c63362" providerId="ADAL" clId="{28A72D4B-4855-4526-8442-D42DD59588DA}" dt="2023-03-01T19:52:10.063" v="866" actId="1582"/>
+          <ac:picMkLst>
+            <pc:docMk/>
+            <pc:sldMk cId="2514743276" sldId="299"/>
+            <ac:picMk id="4" creationId="{A2EC8706-13D3-34C0-88D2-7EFE786C048F}"/>
+          </ac:picMkLst>
+        </pc:picChg>
+        <pc:picChg chg="mod">
+          <ac:chgData name="Bonner Jordan - Hartford-Remote-HSB" userId="e82d229e-6edb-4e20-9ecc-a487e5c63362" providerId="ADAL" clId="{28A72D4B-4855-4526-8442-D42DD59588DA}" dt="2023-03-01T19:52:10.063" v="866" actId="1582"/>
+          <ac:picMkLst>
+            <pc:docMk/>
+            <pc:sldMk cId="2514743276" sldId="299"/>
+            <ac:picMk id="5" creationId="{0183E975-398D-49AA-4FFE-0DD7A11833F4}"/>
+          </ac:picMkLst>
+        </pc:picChg>
+      </pc:sldChg>
+    </pc:docChg>
+  </pc:docChgLst>
+</pc:chgInfo>
+</file>
+
 <file path=ppt/notesMasters/notesMaster1.xml><?xml version="1.0" encoding="utf-8"?>
 <p:notesMaster xmlns:a="http://schemas.openxmlformats.org/drawingml/2006/main" xmlns:r="http://schemas.openxmlformats.org/officeDocument/2006/relationships" xmlns:p="http://schemas.openxmlformats.org/presentationml/2006/main">
   <p:cSld>
@@ -1536,7 +2036,7 @@
               <a:pPr>
                 <a:defRPr/>
               </a:pPr>
-              <a:t>2/23/2023</a:t>
+              <a:t>3/1/2023</a:t>
             </a:fld>
             <a:endParaRPr lang="en-US"/>
           </a:p>
@@ -1735,7 +2235,7 @@
               <a:pPr>
                 <a:defRPr/>
               </a:pPr>
-              <a:t>2/23/2023</a:t>
+              <a:t>3/1/2023</a:t>
             </a:fld>
             <a:endParaRPr lang="en-US"/>
           </a:p>
@@ -2002,7 +2502,7 @@
               <a:pPr>
                 <a:defRPr/>
               </a:pPr>
-              <a:t>2/23/2023</a:t>
+              <a:t>3/1/2023</a:t>
             </a:fld>
             <a:endParaRPr lang="en-US"/>
           </a:p>
@@ -2309,7 +2809,7 @@
               <a:pPr>
                 <a:defRPr/>
               </a:pPr>
-              <a:t>2/23/2023</a:t>
+              <a:t>3/1/2023</a:t>
             </a:fld>
             <a:endParaRPr lang="en-US"/>
           </a:p>
@@ -2750,7 +3250,7 @@
               <a:pPr>
                 <a:defRPr/>
               </a:pPr>
-              <a:t>2/23/2023</a:t>
+              <a:t>3/1/2023</a:t>
             </a:fld>
             <a:endParaRPr lang="en-US"/>
           </a:p>
@@ -2889,7 +3389,7 @@
               <a:pPr>
                 <a:defRPr/>
               </a:pPr>
-              <a:t>2/23/2023</a:t>
+              <a:t>3/1/2023</a:t>
             </a:fld>
             <a:endParaRPr lang="en-US"/>
           </a:p>
@@ -3006,7 +3506,7 @@
               <a:pPr>
                 <a:defRPr/>
               </a:pPr>
-              <a:t>2/23/2023</a:t>
+              <a:t>3/1/2023</a:t>
             </a:fld>
             <a:endParaRPr lang="en-US"/>
           </a:p>
@@ -3303,7 +3803,7 @@
               <a:pPr>
                 <a:defRPr/>
               </a:pPr>
-              <a:t>2/23/2023</a:t>
+              <a:t>3/1/2023</a:t>
             </a:fld>
             <a:endParaRPr lang="en-US"/>
           </a:p>
@@ -3769,7 +4269,7 @@
               <a:pPr>
                 <a:defRPr/>
               </a:pPr>
-              <a:t>2/23/2023</a:t>
+              <a:t>3/1/2023</a:t>
             </a:fld>
             <a:endParaRPr lang="en-US"/>
           </a:p>
@@ -3959,7 +4459,7 @@
               <a:pPr>
                 <a:defRPr/>
               </a:pPr>
-              <a:t>2/23/2023</a:t>
+              <a:t>3/1/2023</a:t>
             </a:fld>
             <a:endParaRPr lang="en-US"/>
           </a:p>
@@ -4159,7 +4659,7 @@
               <a:pPr>
                 <a:defRPr/>
               </a:pPr>
-              <a:t>2/23/2023</a:t>
+              <a:t>3/1/2023</a:t>
             </a:fld>
             <a:endParaRPr lang="en-US"/>
           </a:p>
@@ -4421,7 +4921,7 @@
               <a:pPr>
                 <a:defRPr/>
               </a:pPr>
-              <a:t>2/23/2023</a:t>
+              <a:t>3/1/2023</a:t>
             </a:fld>
             <a:endParaRPr lang="en-US"/>
           </a:p>
@@ -4620,7 +5120,7 @@
               <a:pPr>
                 <a:defRPr/>
               </a:pPr>
-              <a:t>2/23/2023</a:t>
+              <a:t>3/1/2023</a:t>
             </a:fld>
             <a:endParaRPr lang="en-US"/>
           </a:p>
@@ -4887,7 +5387,7 @@
               <a:pPr>
                 <a:defRPr/>
               </a:pPr>
-              <a:t>2/23/2023</a:t>
+              <a:t>3/1/2023</a:t>
             </a:fld>
             <a:endParaRPr lang="en-US"/>
           </a:p>
@@ -5194,7 +5694,7 @@
               <a:pPr>
                 <a:defRPr/>
               </a:pPr>
-              <a:t>2/23/2023</a:t>
+              <a:t>3/1/2023</a:t>
             </a:fld>
             <a:endParaRPr lang="en-US"/>
           </a:p>
@@ -5635,7 +6135,7 @@
               <a:pPr>
                 <a:defRPr/>
               </a:pPr>
-              <a:t>2/23/2023</a:t>
+              <a:t>3/1/2023</a:t>
             </a:fld>
             <a:endParaRPr lang="en-US"/>
           </a:p>
@@ -5774,7 +6274,7 @@
               <a:pPr>
                 <a:defRPr/>
               </a:pPr>
-              <a:t>2/23/2023</a:t>
+              <a:t>3/1/2023</a:t>
             </a:fld>
             <a:endParaRPr lang="en-US"/>
           </a:p>
@@ -5891,7 +6391,7 @@
               <a:pPr>
                 <a:defRPr/>
               </a:pPr>
-              <a:t>2/23/2023</a:t>
+              <a:t>3/1/2023</a:t>
             </a:fld>
             <a:endParaRPr lang="en-US"/>
           </a:p>
@@ -6400,7 +6900,7 @@
               <a:pPr>
                 <a:defRPr/>
               </a:pPr>
-              <a:t>2/23/2023</a:t>
+              <a:t>3/1/2023</a:t>
             </a:fld>
             <a:endParaRPr lang="en-US"/>
           </a:p>
@@ -6677,7 +7177,7 @@
               <a:pPr>
                 <a:defRPr/>
               </a:pPr>
-              <a:t>2/23/2023</a:t>
+              <a:t>3/1/2023</a:t>
             </a:fld>
             <a:endParaRPr lang="en-US"/>
           </a:p>
@@ -6867,7 +7367,7 @@
               <a:pPr>
                 <a:defRPr/>
               </a:pPr>
-              <a:t>2/23/2023</a:t>
+              <a:t>3/1/2023</a:t>
             </a:fld>
             <a:endParaRPr lang="en-US"/>
           </a:p>
@@ -7067,7 +7567,7 @@
               <a:pPr>
                 <a:defRPr/>
               </a:pPr>
-              <a:t>2/23/2023</a:t>
+              <a:t>3/1/2023</a:t>
             </a:fld>
             <a:endParaRPr lang="en-US"/>
           </a:p>
@@ -7329,7 +7829,7 @@
               <a:pPr>
                 <a:defRPr/>
               </a:pPr>
-              <a:t>2/23/2023</a:t>
+              <a:t>3/1/2023</a:t>
             </a:fld>
             <a:endParaRPr lang="en-US"/>
           </a:p>
@@ -7519,7 +8019,7 @@
               <a:pPr>
                 <a:defRPr/>
               </a:pPr>
-              <a:t>2/23/2023</a:t>
+              <a:t>3/1/2023</a:t>
             </a:fld>
             <a:endParaRPr lang="en-US"/>
           </a:p>
@@ -7786,7 +8286,7 @@
               <a:pPr>
                 <a:defRPr/>
               </a:pPr>
-              <a:t>2/23/2023</a:t>
+              <a:t>3/1/2023</a:t>
             </a:fld>
             <a:endParaRPr lang="en-US"/>
           </a:p>
@@ -8093,7 +8593,7 @@
               <a:pPr>
                 <a:defRPr/>
               </a:pPr>
-              <a:t>2/23/2023</a:t>
+              <a:t>3/1/2023</a:t>
             </a:fld>
             <a:endParaRPr lang="en-US"/>
           </a:p>
@@ -8534,7 +9034,7 @@
               <a:pPr>
                 <a:defRPr/>
               </a:pPr>
-              <a:t>2/23/2023</a:t>
+              <a:t>3/1/2023</a:t>
             </a:fld>
             <a:endParaRPr lang="en-US"/>
           </a:p>
@@ -8673,7 +9173,7 @@
               <a:pPr>
                 <a:defRPr/>
               </a:pPr>
-              <a:t>2/23/2023</a:t>
+              <a:t>3/1/2023</a:t>
             </a:fld>
             <a:endParaRPr lang="en-US"/>
           </a:p>
@@ -9096,7 +9596,7 @@
               <a:pPr>
                 <a:defRPr/>
               </a:pPr>
-              <a:t>2/23/2023</a:t>
+              <a:t>3/1/2023</a:t>
             </a:fld>
             <a:endParaRPr lang="en-US"/>
           </a:p>
@@ -9393,7 +9893,7 @@
               <a:pPr>
                 <a:defRPr/>
               </a:pPr>
-              <a:t>2/23/2023</a:t>
+              <a:t>3/1/2023</a:t>
             </a:fld>
             <a:endParaRPr lang="en-US"/>
           </a:p>
@@ -9670,7 +10170,7 @@
               <a:pPr>
                 <a:defRPr/>
               </a:pPr>
-              <a:t>2/23/2023</a:t>
+              <a:t>3/1/2023</a:t>
             </a:fld>
             <a:endParaRPr lang="en-US"/>
           </a:p>
@@ -9860,7 +10360,7 @@
               <a:pPr>
                 <a:defRPr/>
               </a:pPr>
-              <a:t>2/23/2023</a:t>
+              <a:t>3/1/2023</a:t>
             </a:fld>
             <a:endParaRPr lang="en-US"/>
           </a:p>
@@ -10060,7 +10560,7 @@
               <a:pPr>
                 <a:defRPr/>
               </a:pPr>
-              <a:t>2/23/2023</a:t>
+              <a:t>3/1/2023</a:t>
             </a:fld>
             <a:endParaRPr lang="en-US"/>
           </a:p>
@@ -12264,7 +12764,7 @@
               <a:pPr>
                 <a:defRPr/>
               </a:pPr>
-              <a:t>2/23/2023</a:t>
+              <a:t>3/1/2023</a:t>
             </a:fld>
             <a:endParaRPr lang="en-US"/>
           </a:p>
@@ -12943,7 +13443,7 @@
               <a:pPr>
                 <a:defRPr/>
               </a:pPr>
-              <a:t>2/23/2023</a:t>
+              <a:t>3/1/2023</a:t>
             </a:fld>
             <a:endParaRPr lang="en-US"/>
           </a:p>
@@ -13629,7 +14129,7 @@
               <a:pPr>
                 <a:defRPr/>
               </a:pPr>
-              <a:t>2/23/2023</a:t>
+              <a:t>3/1/2023</a:t>
             </a:fld>
             <a:endParaRPr lang="en-US"/>
           </a:p>
@@ -14996,7 +15496,7 @@
     </p:spTree>
     <p:extLst>
       <p:ext uri="{BB962C8B-B14F-4D97-AF65-F5344CB8AC3E}">
-        <p14:creationId xmlns:p14="http://schemas.microsoft.com/office/powerpoint/2010/main" val="2988560573"/>
+        <p14:creationId xmlns:p14="http://schemas.microsoft.com/office/powerpoint/2010/main" val="48610386"/>
       </p:ext>
     </p:extLst>
   </p:cSld>
@@ -15046,7 +15546,7 @@
           <a:p>
             <a:r>
               <a:rPr lang="en-US" dirty="0"/>
-              <a:t>Trend Selection</a:t>
+              <a:t>Loss Development Triangles</a:t>
             </a:r>
           </a:p>
         </p:txBody>
@@ -15079,7 +15579,7 @@
     </p:spTree>
     <p:extLst>
       <p:ext uri="{BB962C8B-B14F-4D97-AF65-F5344CB8AC3E}">
-        <p14:creationId xmlns:p14="http://schemas.microsoft.com/office/powerpoint/2010/main" val="3996687486"/>
+        <p14:creationId xmlns:p14="http://schemas.microsoft.com/office/powerpoint/2010/main" val="2988560573"/>
       </p:ext>
     </p:extLst>
   </p:cSld>
@@ -15162,7 +15662,7 @@
     </p:spTree>
     <p:extLst>
       <p:ext uri="{BB962C8B-B14F-4D97-AF65-F5344CB8AC3E}">
-        <p14:creationId xmlns:p14="http://schemas.microsoft.com/office/powerpoint/2010/main" val="2234546495"/>
+        <p14:creationId xmlns:p14="http://schemas.microsoft.com/office/powerpoint/2010/main" val="3996687486"/>
       </p:ext>
     </p:extLst>
   </p:cSld>
@@ -15212,7 +15712,7 @@
           <a:p>
             <a:r>
               <a:rPr lang="en-US" dirty="0"/>
-              <a:t>Rate Indications</a:t>
+              <a:t>Trend Selection</a:t>
             </a:r>
           </a:p>
         </p:txBody>
@@ -15245,7 +15745,7 @@
     </p:spTree>
     <p:extLst>
       <p:ext uri="{BB962C8B-B14F-4D97-AF65-F5344CB8AC3E}">
-        <p14:creationId xmlns:p14="http://schemas.microsoft.com/office/powerpoint/2010/main" val="3744326896"/>
+        <p14:creationId xmlns:p14="http://schemas.microsoft.com/office/powerpoint/2010/main" val="2234546495"/>
       </p:ext>
     </p:extLst>
   </p:cSld>
@@ -15294,10 +15794,9 @@
           <a:lstStyle/>
           <a:p>
             <a:r>
-              <a:rPr lang="en-US"/>
+              <a:rPr lang="en-US" dirty="0"/>
               <a:t>Rate Indications</a:t>
             </a:r>
-            <a:endParaRPr lang="en-US" dirty="0"/>
           </a:p>
         </p:txBody>
       </p:sp>
@@ -15329,7 +15828,7 @@
     </p:spTree>
     <p:extLst>
       <p:ext uri="{BB962C8B-B14F-4D97-AF65-F5344CB8AC3E}">
-        <p14:creationId xmlns:p14="http://schemas.microsoft.com/office/powerpoint/2010/main" val="2037117755"/>
+        <p14:creationId xmlns:p14="http://schemas.microsoft.com/office/powerpoint/2010/main" val="3744326896"/>
       </p:ext>
     </p:extLst>
   </p:cSld>
@@ -15378,9 +15877,10 @@
           <a:lstStyle/>
           <a:p>
             <a:r>
-              <a:rPr lang="en-US" dirty="0"/>
-              <a:t>Mix Shift</a:t>
-            </a:r>
+              <a:rPr lang="en-US"/>
+              <a:t>Rate Indications</a:t>
+            </a:r>
+            <a:endParaRPr lang="en-US" dirty="0"/>
           </a:p>
         </p:txBody>
       </p:sp>
@@ -15412,7 +15912,7 @@
     </p:spTree>
     <p:extLst>
       <p:ext uri="{BB962C8B-B14F-4D97-AF65-F5344CB8AC3E}">
-        <p14:creationId xmlns:p14="http://schemas.microsoft.com/office/powerpoint/2010/main" val="233457934"/>
+        <p14:creationId xmlns:p14="http://schemas.microsoft.com/office/powerpoint/2010/main" val="2037117755"/>
       </p:ext>
     </p:extLst>
   </p:cSld>
@@ -15495,7 +15995,7 @@
     </p:spTree>
     <p:extLst>
       <p:ext uri="{BB962C8B-B14F-4D97-AF65-F5344CB8AC3E}">
-        <p14:creationId xmlns:p14="http://schemas.microsoft.com/office/powerpoint/2010/main" val="3695907033"/>
+        <p14:creationId xmlns:p14="http://schemas.microsoft.com/office/powerpoint/2010/main" val="233457934"/>
       </p:ext>
     </p:extLst>
   </p:cSld>
@@ -15545,7 +16045,7 @@
           <a:p>
             <a:r>
               <a:rPr lang="en-US" dirty="0"/>
-              <a:t>Model Diagnostics</a:t>
+              <a:t>Mix Shift</a:t>
             </a:r>
           </a:p>
         </p:txBody>
@@ -15578,7 +16078,7 @@
     </p:spTree>
     <p:extLst>
       <p:ext uri="{BB962C8B-B14F-4D97-AF65-F5344CB8AC3E}">
-        <p14:creationId xmlns:p14="http://schemas.microsoft.com/office/powerpoint/2010/main" val="3026868623"/>
+        <p14:creationId xmlns:p14="http://schemas.microsoft.com/office/powerpoint/2010/main" val="3695907033"/>
       </p:ext>
     </p:extLst>
   </p:cSld>
@@ -15627,10 +16127,9 @@
           <a:lstStyle/>
           <a:p>
             <a:r>
-              <a:rPr lang="en-US"/>
+              <a:rPr lang="en-US" dirty="0"/>
               <a:t>Model Diagnostics</a:t>
             </a:r>
-            <a:endParaRPr lang="en-US" dirty="0"/>
           </a:p>
         </p:txBody>
       </p:sp>
@@ -15662,7 +16161,7 @@
     </p:spTree>
     <p:extLst>
       <p:ext uri="{BB962C8B-B14F-4D97-AF65-F5344CB8AC3E}">
-        <p14:creationId xmlns:p14="http://schemas.microsoft.com/office/powerpoint/2010/main" val="1881759498"/>
+        <p14:creationId xmlns:p14="http://schemas.microsoft.com/office/powerpoint/2010/main" val="3026868623"/>
       </p:ext>
     </p:extLst>
   </p:cSld>
@@ -15694,7 +16193,7 @@
           <p:cNvPr id="2" name="Title 1">
             <a:extLst>
               <a:ext uri="{FF2B5EF4-FFF2-40B4-BE49-F238E27FC236}">
-                <a16:creationId xmlns:a16="http://schemas.microsoft.com/office/drawing/2014/main" id="{FABAA41A-77E6-2FBA-A297-38D8E88EA1EE}"/>
+                <a16:creationId xmlns:a16="http://schemas.microsoft.com/office/drawing/2014/main" id="{18969BF5-0288-FD7C-1739-0C8672F3D7F8}"/>
               </a:ext>
             </a:extLst>
           </p:cNvPr>
@@ -15711,18 +16210,19 @@
           <a:lstStyle/>
           <a:p>
             <a:r>
-              <a:rPr lang="en-US" dirty="0"/>
-              <a:t>Practical formatting tricks</a:t>
-            </a:r>
-          </a:p>
-        </p:txBody>
-      </p:sp>
-      <p:sp>
-        <p:nvSpPr>
-          <p:cNvPr id="3" name="Text Placeholder 2">
+              <a:rPr lang="en-US"/>
+              <a:t>Model Diagnostics</a:t>
+            </a:r>
+            <a:endParaRPr lang="en-US" dirty="0"/>
+          </a:p>
+        </p:txBody>
+      </p:sp>
+      <p:sp>
+        <p:nvSpPr>
+          <p:cNvPr id="3" name="Content Placeholder 2">
             <a:extLst>
               <a:ext uri="{FF2B5EF4-FFF2-40B4-BE49-F238E27FC236}">
-                <a16:creationId xmlns:a16="http://schemas.microsoft.com/office/drawing/2014/main" id="{CC58DA01-D3BC-9504-0836-D49045D6C03A}"/>
+                <a16:creationId xmlns:a16="http://schemas.microsoft.com/office/drawing/2014/main" id="{39176E43-0115-E50B-D268-5E00760022A7}"/>
               </a:ext>
             </a:extLst>
           </p:cNvPr>
@@ -15730,7 +16230,7 @@
             <a:spLocks noGrp="1"/>
           </p:cNvSpPr>
           <p:nvPr>
-            <p:ph type="body" idx="1"/>
+            <p:ph idx="1"/>
           </p:nvPr>
         </p:nvSpPr>
         <p:spPr/>
@@ -15738,14 +16238,14 @@
           <a:bodyPr/>
           <a:lstStyle/>
           <a:p>
-            <a:endParaRPr lang="en-US"/>
+            <a:endParaRPr lang="en-US" dirty="0"/>
           </a:p>
         </p:txBody>
       </p:sp>
     </p:spTree>
     <p:extLst>
       <p:ext uri="{BB962C8B-B14F-4D97-AF65-F5344CB8AC3E}">
-        <p14:creationId xmlns:p14="http://schemas.microsoft.com/office/powerpoint/2010/main" val="177268762"/>
+        <p14:creationId xmlns:p14="http://schemas.microsoft.com/office/powerpoint/2010/main" val="1881759498"/>
       </p:ext>
     </p:extLst>
   </p:cSld>
@@ -15912,40 +16412,89 @@
           <a:p>
             <a:r>
               <a:rPr lang="en-US" dirty="0"/>
-              <a:t>Titles &amp; Renaming Variables</a:t>
-            </a:r>
-          </a:p>
-        </p:txBody>
-      </p:sp>
-      <p:sp>
-        <p:nvSpPr>
-          <p:cNvPr id="3" name="Content Placeholder 2">
+              <a:t>Two Axes vs Two Charts</a:t>
+            </a:r>
+          </a:p>
+        </p:txBody>
+      </p:sp>
+      <p:pic>
+        <p:nvPicPr>
+          <p:cNvPr id="4" name="Picture 3">
             <a:extLst>
               <a:ext uri="{FF2B5EF4-FFF2-40B4-BE49-F238E27FC236}">
-                <a16:creationId xmlns:a16="http://schemas.microsoft.com/office/drawing/2014/main" id="{39176E43-0115-E50B-D268-5E00760022A7}"/>
+                <a16:creationId xmlns:a16="http://schemas.microsoft.com/office/drawing/2014/main" id="{A2EC8706-13D3-34C0-88D2-7EFE786C048F}"/>
               </a:ext>
             </a:extLst>
           </p:cNvPr>
-          <p:cNvSpPr>
-            <a:spLocks noGrp="1"/>
-          </p:cNvSpPr>
-          <p:nvPr>
-            <p:ph idx="1"/>
-          </p:nvPr>
-        </p:nvSpPr>
-        <p:spPr/>
-        <p:txBody>
-          <a:bodyPr/>
-          <a:lstStyle/>
-          <a:p>
-            <a:endParaRPr lang="en-US" dirty="0"/>
-          </a:p>
-        </p:txBody>
-      </p:sp>
+          <p:cNvPicPr>
+            <a:picLocks noChangeAspect="1"/>
+          </p:cNvPicPr>
+          <p:nvPr/>
+        </p:nvPicPr>
+        <p:blipFill>
+          <a:blip r:embed="rId2" r:link="rId3">
+            <a:extLst>
+              <a:ext uri="{28A0092B-C50C-407E-A947-70E740481C1C}">
+                <a14:useLocalDpi xmlns:a14="http://schemas.microsoft.com/office/drawing/2010/main" val="0"/>
+              </a:ext>
+            </a:extLst>
+          </a:blip>
+          <a:srcRect/>
+          <a:stretch>
+            <a:fillRect/>
+          </a:stretch>
+        </p:blipFill>
+        <p:spPr>
+          <a:xfrm>
+            <a:off x="152401" y="2209800"/>
+            <a:ext cx="4389118" cy="2926079"/>
+          </a:xfrm>
+          <a:prstGeom prst="rect">
+            <a:avLst/>
+          </a:prstGeom>
+        </p:spPr>
+      </p:pic>
+      <p:pic>
+        <p:nvPicPr>
+          <p:cNvPr id="5" name="Picture 4">
+            <a:extLst>
+              <a:ext uri="{FF2B5EF4-FFF2-40B4-BE49-F238E27FC236}">
+                <a16:creationId xmlns:a16="http://schemas.microsoft.com/office/drawing/2014/main" id="{0183E975-398D-49AA-4FFE-0DD7A11833F4}"/>
+              </a:ext>
+            </a:extLst>
+          </p:cNvPr>
+          <p:cNvPicPr>
+            <a:picLocks noChangeAspect="1"/>
+          </p:cNvPicPr>
+          <p:nvPr/>
+        </p:nvPicPr>
+        <p:blipFill>
+          <a:blip r:embed="rId4" r:link="rId5">
+            <a:extLst>
+              <a:ext uri="{28A0092B-C50C-407E-A947-70E740481C1C}">
+                <a14:useLocalDpi xmlns:a14="http://schemas.microsoft.com/office/drawing/2010/main" val="0"/>
+              </a:ext>
+            </a:extLst>
+          </a:blip>
+          <a:srcRect/>
+          <a:stretch>
+            <a:fillRect/>
+          </a:stretch>
+        </p:blipFill>
+        <p:spPr>
+          <a:xfrm>
+            <a:off x="4572001" y="2209800"/>
+            <a:ext cx="4389118" cy="2926079"/>
+          </a:xfrm>
+          <a:prstGeom prst="rect">
+            <a:avLst/>
+          </a:prstGeom>
+        </p:spPr>
+      </p:pic>
     </p:spTree>
     <p:extLst>
       <p:ext uri="{BB962C8B-B14F-4D97-AF65-F5344CB8AC3E}">
-        <p14:creationId xmlns:p14="http://schemas.microsoft.com/office/powerpoint/2010/main" val="3241427914"/>
+        <p14:creationId xmlns:p14="http://schemas.microsoft.com/office/powerpoint/2010/main" val="913523918"/>
       </p:ext>
     </p:extLst>
   </p:cSld>
@@ -15995,40 +16544,52 @@
           <a:p>
             <a:r>
               <a:rPr lang="en-US" dirty="0"/>
-              <a:t>Text Size</a:t>
-            </a:r>
-          </a:p>
-        </p:txBody>
-      </p:sp>
-      <p:sp>
-        <p:nvSpPr>
-          <p:cNvPr id="3" name="Content Placeholder 2">
+              <a:t>Two Axes vs Two Charts</a:t>
+            </a:r>
+          </a:p>
+        </p:txBody>
+      </p:sp>
+      <p:pic>
+        <p:nvPicPr>
+          <p:cNvPr id="3" name="Picture 2">
             <a:extLst>
               <a:ext uri="{FF2B5EF4-FFF2-40B4-BE49-F238E27FC236}">
-                <a16:creationId xmlns:a16="http://schemas.microsoft.com/office/drawing/2014/main" id="{39176E43-0115-E50B-D268-5E00760022A7}"/>
+                <a16:creationId xmlns:a16="http://schemas.microsoft.com/office/drawing/2014/main" id="{A7EF95ED-D8F3-6D8A-77DF-8B91594C2B97}"/>
               </a:ext>
             </a:extLst>
           </p:cNvPr>
-          <p:cNvSpPr>
-            <a:spLocks noGrp="1"/>
-          </p:cNvSpPr>
-          <p:nvPr>
-            <p:ph idx="1"/>
-          </p:nvPr>
-        </p:nvSpPr>
-        <p:spPr/>
-        <p:txBody>
-          <a:bodyPr/>
-          <a:lstStyle/>
-          <a:p>
-            <a:endParaRPr lang="en-US" dirty="0"/>
-          </a:p>
-        </p:txBody>
-      </p:sp>
+          <p:cNvPicPr>
+            <a:picLocks noChangeAspect="1"/>
+          </p:cNvPicPr>
+          <p:nvPr/>
+        </p:nvPicPr>
+        <p:blipFill>
+          <a:blip r:embed="rId2" r:link="rId3">
+            <a:extLst>
+              <a:ext uri="{28A0092B-C50C-407E-A947-70E740481C1C}">
+                <a14:useLocalDpi xmlns:a14="http://schemas.microsoft.com/office/drawing/2010/main" val="0"/>
+              </a:ext>
+            </a:extLst>
+          </a:blip>
+          <a:srcRect/>
+          <a:stretch>
+            <a:fillRect/>
+          </a:stretch>
+        </p:blipFill>
+        <p:spPr>
+          <a:xfrm>
+            <a:off x="1371600" y="1752602"/>
+            <a:ext cx="6400799" cy="4267198"/>
+          </a:xfrm>
+          <a:prstGeom prst="rect">
+            <a:avLst/>
+          </a:prstGeom>
+        </p:spPr>
+      </p:pic>
     </p:spTree>
     <p:extLst>
       <p:ext uri="{BB962C8B-B14F-4D97-AF65-F5344CB8AC3E}">
-        <p14:creationId xmlns:p14="http://schemas.microsoft.com/office/powerpoint/2010/main" val="1481048253"/>
+        <p14:creationId xmlns:p14="http://schemas.microsoft.com/office/powerpoint/2010/main" val="2704861902"/>
       </p:ext>
     </p:extLst>
   </p:cSld>
@@ -16060,7 +16621,7 @@
           <p:cNvPr id="2" name="Title 1">
             <a:extLst>
               <a:ext uri="{FF2B5EF4-FFF2-40B4-BE49-F238E27FC236}">
-                <a16:creationId xmlns:a16="http://schemas.microsoft.com/office/drawing/2014/main" id="{18969BF5-0288-FD7C-1739-0C8672F3D7F8}"/>
+                <a16:creationId xmlns:a16="http://schemas.microsoft.com/office/drawing/2014/main" id="{FABAA41A-77E6-2FBA-A297-38D8E88EA1EE}"/>
               </a:ext>
             </a:extLst>
           </p:cNvPr>
@@ -16078,17 +16639,24 @@
           <a:p>
             <a:r>
               <a:rPr lang="en-US" dirty="0"/>
-              <a:t>Colors</a:t>
-            </a:r>
-          </a:p>
-        </p:txBody>
-      </p:sp>
-      <p:sp>
-        <p:nvSpPr>
-          <p:cNvPr id="3" name="Content Placeholder 2">
+              <a:t>Automating</a:t>
+            </a:r>
+            <a:br>
+              <a:rPr lang="en-US" dirty="0"/>
+            </a:br>
+            <a:r>
+              <a:rPr lang="en-US" dirty="0"/>
+              <a:t>Actuarial Exhibits</a:t>
+            </a:r>
+          </a:p>
+        </p:txBody>
+      </p:sp>
+      <p:sp>
+        <p:nvSpPr>
+          <p:cNvPr id="3" name="Text Placeholder 2">
             <a:extLst>
               <a:ext uri="{FF2B5EF4-FFF2-40B4-BE49-F238E27FC236}">
-                <a16:creationId xmlns:a16="http://schemas.microsoft.com/office/drawing/2014/main" id="{39176E43-0115-E50B-D268-5E00760022A7}"/>
+                <a16:creationId xmlns:a16="http://schemas.microsoft.com/office/drawing/2014/main" id="{CC58DA01-D3BC-9504-0836-D49045D6C03A}"/>
               </a:ext>
             </a:extLst>
           </p:cNvPr>
@@ -16096,7 +16664,7 @@
             <a:spLocks noGrp="1"/>
           </p:cNvSpPr>
           <p:nvPr>
-            <p:ph idx="1"/>
+            <p:ph type="body" idx="1"/>
           </p:nvPr>
         </p:nvSpPr>
         <p:spPr/>
@@ -16104,14 +16672,14 @@
           <a:bodyPr/>
           <a:lstStyle/>
           <a:p>
-            <a:endParaRPr lang="en-US" dirty="0"/>
+            <a:endParaRPr lang="en-US"/>
           </a:p>
         </p:txBody>
       </p:sp>
     </p:spTree>
     <p:extLst>
       <p:ext uri="{BB962C8B-B14F-4D97-AF65-F5344CB8AC3E}">
-        <p14:creationId xmlns:p14="http://schemas.microsoft.com/office/powerpoint/2010/main" val="2002468093"/>
+        <p14:creationId xmlns:p14="http://schemas.microsoft.com/office/powerpoint/2010/main" val="177268762"/>
       </p:ext>
     </p:extLst>
   </p:cSld>
@@ -16143,6 +16711,2374 @@
           <p:cNvPr id="2" name="Title 1">
             <a:extLst>
               <a:ext uri="{FF2B5EF4-FFF2-40B4-BE49-F238E27FC236}">
+                <a16:creationId xmlns:a16="http://schemas.microsoft.com/office/drawing/2014/main" id="{18969BF5-0288-FD7C-1739-0C8672F3D7F8}"/>
+              </a:ext>
+            </a:extLst>
+          </p:cNvPr>
+          <p:cNvSpPr>
+            <a:spLocks noGrp="1"/>
+          </p:cNvSpPr>
+          <p:nvPr>
+            <p:ph type="title"/>
+          </p:nvPr>
+        </p:nvSpPr>
+        <p:spPr>
+          <a:xfrm>
+            <a:off x="1066800" y="274638"/>
+            <a:ext cx="7772400" cy="1143000"/>
+          </a:xfrm>
+        </p:spPr>
+        <p:txBody>
+          <a:bodyPr/>
+          <a:lstStyle/>
+          <a:p>
+            <a:r>
+              <a:rPr lang="en-US" dirty="0"/>
+              <a:t>Initial Example: Fitted Severity</a:t>
+            </a:r>
+          </a:p>
+        </p:txBody>
+      </p:sp>
+      <p:pic>
+        <p:nvPicPr>
+          <p:cNvPr id="4" name="Picture 3">
+            <a:extLst>
+              <a:ext uri="{FF2B5EF4-FFF2-40B4-BE49-F238E27FC236}">
+                <a16:creationId xmlns:a16="http://schemas.microsoft.com/office/drawing/2014/main" id="{E725ABD2-C6D9-F502-2921-0DC1A1664FD0}"/>
+              </a:ext>
+            </a:extLst>
+          </p:cNvPr>
+          <p:cNvPicPr>
+            <a:picLocks noChangeAspect="1"/>
+          </p:cNvPicPr>
+          <p:nvPr/>
+        </p:nvPicPr>
+        <p:blipFill>
+          <a:blip r:embed="rId2" r:link="rId3">
+            <a:extLst>
+              <a:ext uri="{28A0092B-C50C-407E-A947-70E740481C1C}">
+                <a14:useLocalDpi xmlns:a14="http://schemas.microsoft.com/office/drawing/2010/main" val="0"/>
+              </a:ext>
+            </a:extLst>
+          </a:blip>
+          <a:srcRect/>
+          <a:stretch>
+            <a:fillRect/>
+          </a:stretch>
+        </p:blipFill>
+        <p:spPr>
+          <a:xfrm>
+            <a:off x="2971801" y="1447801"/>
+            <a:ext cx="5943597" cy="3962398"/>
+          </a:xfrm>
+          <a:prstGeom prst="rect">
+            <a:avLst/>
+          </a:prstGeom>
+        </p:spPr>
+      </p:pic>
+      <p:sp>
+        <p:nvSpPr>
+          <p:cNvPr id="5" name="TextBox 4">
+            <a:extLst>
+              <a:ext uri="{FF2B5EF4-FFF2-40B4-BE49-F238E27FC236}">
+                <a16:creationId xmlns:a16="http://schemas.microsoft.com/office/drawing/2014/main" id="{2CA6CE52-CDE9-6BD5-D02A-0B9CDE177F35}"/>
+              </a:ext>
+            </a:extLst>
+          </p:cNvPr>
+          <p:cNvSpPr txBox="1"/>
+          <p:nvPr/>
+        </p:nvSpPr>
+        <p:spPr>
+          <a:xfrm>
+            <a:off x="228601" y="2514600"/>
+            <a:ext cx="2431673" cy="1384995"/>
+          </a:xfrm>
+          <a:prstGeom prst="rect">
+            <a:avLst/>
+          </a:prstGeom>
+          <a:noFill/>
+        </p:spPr>
+        <p:txBody>
+          <a:bodyPr wrap="square" rtlCol="0">
+            <a:spAutoFit/>
+          </a:bodyPr>
+          <a:lstStyle/>
+          <a:p>
+            <a:pPr algn="ctr"/>
+            <a:r>
+              <a:rPr lang="en-US" sz="2800" dirty="0">
+                <a:latin typeface="Arial" panose="020B0604020202020204" pitchFamily="34" charset="0"/>
+                <a:cs typeface="Arial" panose="020B0604020202020204" pitchFamily="34" charset="0"/>
+              </a:rPr>
+              <a:t>How can we improve upon this chart?</a:t>
+            </a:r>
+          </a:p>
+        </p:txBody>
+      </p:sp>
+      <p:sp>
+        <p:nvSpPr>
+          <p:cNvPr id="3" name="TextBox 2">
+            <a:extLst>
+              <a:ext uri="{FF2B5EF4-FFF2-40B4-BE49-F238E27FC236}">
+                <a16:creationId xmlns:a16="http://schemas.microsoft.com/office/drawing/2014/main" id="{D90ECCA0-06AB-B8AB-4B22-AA383E47AE34}"/>
+              </a:ext>
+            </a:extLst>
+          </p:cNvPr>
+          <p:cNvSpPr txBox="1"/>
+          <p:nvPr/>
+        </p:nvSpPr>
+        <p:spPr>
+          <a:xfrm>
+            <a:off x="260498" y="5181600"/>
+            <a:ext cx="7588101" cy="830997"/>
+          </a:xfrm>
+          <a:prstGeom prst="rect">
+            <a:avLst/>
+          </a:prstGeom>
+          <a:noFill/>
+        </p:spPr>
+        <p:txBody>
+          <a:bodyPr wrap="square" rtlCol="0">
+            <a:spAutoFit/>
+          </a:bodyPr>
+          <a:lstStyle/>
+          <a:p>
+            <a:r>
+              <a:rPr lang="en-US" sz="1200" dirty="0">
+                <a:latin typeface="Consolas" panose="020B0609020204030204" pitchFamily="49" charset="0"/>
+              </a:rPr>
+              <a:t>P &lt;- data |&gt;</a:t>
+            </a:r>
+          </a:p>
+          <a:p>
+            <a:r>
+              <a:rPr lang="en-US" sz="1200" dirty="0">
+                <a:latin typeface="Consolas" panose="020B0609020204030204" pitchFamily="49" charset="0"/>
+              </a:rPr>
+              <a:t>  </a:t>
+            </a:r>
+            <a:r>
+              <a:rPr lang="en-US" sz="1200" dirty="0" err="1">
+                <a:latin typeface="Consolas" panose="020B0609020204030204" pitchFamily="49" charset="0"/>
+              </a:rPr>
+              <a:t>geom_histogram</a:t>
+            </a:r>
+            <a:r>
+              <a:rPr lang="en-US" sz="1200" dirty="0">
+                <a:latin typeface="Consolas" panose="020B0609020204030204" pitchFamily="49" charset="0"/>
+              </a:rPr>
+              <a:t>(</a:t>
+            </a:r>
+            <a:r>
+              <a:rPr lang="en-US" sz="1200" dirty="0" err="1">
+                <a:latin typeface="Consolas" panose="020B0609020204030204" pitchFamily="49" charset="0"/>
+              </a:rPr>
+              <a:t>aes</a:t>
+            </a:r>
+            <a:r>
+              <a:rPr lang="en-US" sz="1200" dirty="0">
+                <a:latin typeface="Consolas" panose="020B0609020204030204" pitchFamily="49" charset="0"/>
+              </a:rPr>
+              <a:t>(x = loss, </a:t>
+            </a:r>
+            <a:r>
+              <a:rPr lang="en-US" sz="1200" dirty="0" err="1">
+                <a:latin typeface="Consolas" panose="020B0609020204030204" pitchFamily="49" charset="0"/>
+              </a:rPr>
+              <a:t>after_stat</a:t>
+            </a:r>
+            <a:r>
+              <a:rPr lang="en-US" sz="1200" dirty="0">
+                <a:latin typeface="Consolas" panose="020B0609020204030204" pitchFamily="49" charset="0"/>
+              </a:rPr>
+              <a:t>(density)) +</a:t>
+            </a:r>
+          </a:p>
+          <a:p>
+            <a:r>
+              <a:rPr lang="en-US" sz="1200" dirty="0">
+                <a:latin typeface="Consolas" panose="020B0609020204030204" pitchFamily="49" charset="0"/>
+              </a:rPr>
+              <a:t>  </a:t>
+            </a:r>
+            <a:r>
+              <a:rPr lang="en-US" sz="1200" dirty="0" err="1">
+                <a:latin typeface="Consolas" panose="020B0609020204030204" pitchFamily="49" charset="0"/>
+              </a:rPr>
+              <a:t>stat_function</a:t>
+            </a:r>
+            <a:r>
+              <a:rPr lang="en-US" sz="1200" dirty="0">
+                <a:latin typeface="Consolas" panose="020B0609020204030204" pitchFamily="49" charset="0"/>
+              </a:rPr>
+              <a:t>(fun = </a:t>
+            </a:r>
+            <a:r>
+              <a:rPr lang="en-US" sz="1200" dirty="0" err="1">
+                <a:latin typeface="Consolas" panose="020B0609020204030204" pitchFamily="49" charset="0"/>
+              </a:rPr>
+              <a:t>dlnorm</a:t>
+            </a:r>
+            <a:r>
+              <a:rPr lang="en-US" sz="1200" dirty="0">
+                <a:latin typeface="Consolas" panose="020B0609020204030204" pitchFamily="49" charset="0"/>
+              </a:rPr>
+              <a:t>,</a:t>
+            </a:r>
+          </a:p>
+          <a:p>
+            <a:r>
+              <a:rPr lang="en-US" sz="1200" dirty="0">
+                <a:latin typeface="Consolas" panose="020B0609020204030204" pitchFamily="49" charset="0"/>
+              </a:rPr>
+              <a:t>                </a:t>
+            </a:r>
+            <a:r>
+              <a:rPr lang="en-US" sz="1200" dirty="0" err="1">
+                <a:latin typeface="Consolas" panose="020B0609020204030204" pitchFamily="49" charset="0"/>
+              </a:rPr>
+              <a:t>args</a:t>
+            </a:r>
+            <a:r>
+              <a:rPr lang="en-US" sz="1200" dirty="0">
+                <a:latin typeface="Consolas" panose="020B0609020204030204" pitchFamily="49" charset="0"/>
+              </a:rPr>
+              <a:t> = list(</a:t>
+            </a:r>
+            <a:r>
+              <a:rPr lang="en-US" sz="1200" dirty="0" err="1">
+                <a:latin typeface="Consolas" panose="020B0609020204030204" pitchFamily="49" charset="0"/>
+              </a:rPr>
+              <a:t>meanlog</a:t>
+            </a:r>
+            <a:r>
+              <a:rPr lang="en-US" sz="1200" dirty="0">
+                <a:latin typeface="Consolas" panose="020B0609020204030204" pitchFamily="49" charset="0"/>
+              </a:rPr>
+              <a:t> = 10, </a:t>
+            </a:r>
+            <a:r>
+              <a:rPr lang="en-US" sz="1200" dirty="0" err="1">
+                <a:latin typeface="Consolas" panose="020B0609020204030204" pitchFamily="49" charset="0"/>
+              </a:rPr>
+              <a:t>sdlog</a:t>
+            </a:r>
+            <a:r>
+              <a:rPr lang="en-US" sz="1200" dirty="0">
+                <a:latin typeface="Consolas" panose="020B0609020204030204" pitchFamily="49" charset="0"/>
+              </a:rPr>
+              <a:t> = 1.0))</a:t>
+            </a:r>
+          </a:p>
+        </p:txBody>
+      </p:sp>
+    </p:spTree>
+    <p:extLst>
+      <p:ext uri="{BB962C8B-B14F-4D97-AF65-F5344CB8AC3E}">
+        <p14:creationId xmlns:p14="http://schemas.microsoft.com/office/powerpoint/2010/main" val="3241427914"/>
+      </p:ext>
+    </p:extLst>
+  </p:cSld>
+  <p:clrMapOvr>
+    <a:masterClrMapping/>
+  </p:clrMapOvr>
+</p:sld>
+</file>
+
+<file path=ppt/slides/slide24.xml><?xml version="1.0" encoding="utf-8"?>
+<p:sld xmlns:a="http://schemas.openxmlformats.org/drawingml/2006/main" xmlns:r="http://schemas.openxmlformats.org/officeDocument/2006/relationships" xmlns:p="http://schemas.openxmlformats.org/presentationml/2006/main">
+  <p:cSld>
+    <p:spTree>
+      <p:nvGrpSpPr>
+        <p:cNvPr id="1" name=""/>
+        <p:cNvGrpSpPr/>
+        <p:nvPr/>
+      </p:nvGrpSpPr>
+      <p:grpSpPr>
+        <a:xfrm>
+          <a:off x="0" y="0"/>
+          <a:ext cx="0" cy="0"/>
+          <a:chOff x="0" y="0"/>
+          <a:chExt cx="0" cy="0"/>
+        </a:xfrm>
+      </p:grpSpPr>
+      <p:sp>
+        <p:nvSpPr>
+          <p:cNvPr id="2" name="Title 1">
+            <a:extLst>
+              <a:ext uri="{FF2B5EF4-FFF2-40B4-BE49-F238E27FC236}">
+                <a16:creationId xmlns:a16="http://schemas.microsoft.com/office/drawing/2014/main" id="{18969BF5-0288-FD7C-1739-0C8672F3D7F8}"/>
+              </a:ext>
+            </a:extLst>
+          </p:cNvPr>
+          <p:cNvSpPr>
+            <a:spLocks noGrp="1"/>
+          </p:cNvSpPr>
+          <p:nvPr>
+            <p:ph type="title"/>
+          </p:nvPr>
+        </p:nvSpPr>
+        <p:spPr/>
+        <p:txBody>
+          <a:bodyPr/>
+          <a:lstStyle/>
+          <a:p>
+            <a:r>
+              <a:rPr lang="en-US" dirty="0"/>
+              <a:t>Titles &amp; Renaming Variables</a:t>
+            </a:r>
+          </a:p>
+        </p:txBody>
+      </p:sp>
+      <p:pic>
+        <p:nvPicPr>
+          <p:cNvPr id="4" name="Picture 3">
+            <a:extLst>
+              <a:ext uri="{FF2B5EF4-FFF2-40B4-BE49-F238E27FC236}">
+                <a16:creationId xmlns:a16="http://schemas.microsoft.com/office/drawing/2014/main" id="{4A0037C9-EB90-2900-D4EC-DF813BC908A7}"/>
+              </a:ext>
+            </a:extLst>
+          </p:cNvPr>
+          <p:cNvPicPr>
+            <a:picLocks noChangeAspect="1"/>
+          </p:cNvPicPr>
+          <p:nvPr/>
+        </p:nvPicPr>
+        <p:blipFill>
+          <a:blip r:embed="rId2" r:link="rId3">
+            <a:extLst>
+              <a:ext uri="{28A0092B-C50C-407E-A947-70E740481C1C}">
+                <a14:useLocalDpi xmlns:a14="http://schemas.microsoft.com/office/drawing/2010/main" val="0"/>
+              </a:ext>
+            </a:extLst>
+          </a:blip>
+          <a:srcRect/>
+          <a:stretch>
+            <a:fillRect/>
+          </a:stretch>
+        </p:blipFill>
+        <p:spPr>
+          <a:xfrm>
+            <a:off x="2971801" y="1447801"/>
+            <a:ext cx="5943597" cy="3962397"/>
+          </a:xfrm>
+          <a:prstGeom prst="rect">
+            <a:avLst/>
+          </a:prstGeom>
+        </p:spPr>
+      </p:pic>
+      <p:sp>
+        <p:nvSpPr>
+          <p:cNvPr id="5" name="TextBox 4">
+            <a:extLst>
+              <a:ext uri="{FF2B5EF4-FFF2-40B4-BE49-F238E27FC236}">
+                <a16:creationId xmlns:a16="http://schemas.microsoft.com/office/drawing/2014/main" id="{04AF6261-B4B1-D761-810B-AACA39E89170}"/>
+              </a:ext>
+            </a:extLst>
+          </p:cNvPr>
+          <p:cNvSpPr txBox="1"/>
+          <p:nvPr/>
+        </p:nvSpPr>
+        <p:spPr>
+          <a:xfrm>
+            <a:off x="228601" y="2514600"/>
+            <a:ext cx="2431673" cy="1815882"/>
+          </a:xfrm>
+          <a:prstGeom prst="rect">
+            <a:avLst/>
+          </a:prstGeom>
+          <a:noFill/>
+        </p:spPr>
+        <p:txBody>
+          <a:bodyPr wrap="square" rtlCol="0">
+            <a:spAutoFit/>
+          </a:bodyPr>
+          <a:lstStyle/>
+          <a:p>
+            <a:pPr algn="ctr"/>
+            <a:r>
+              <a:rPr lang="en-US" sz="2800" dirty="0">
+                <a:latin typeface="Arial" panose="020B0604020202020204" pitchFamily="34" charset="0"/>
+                <a:cs typeface="Arial" panose="020B0604020202020204" pitchFamily="34" charset="0"/>
+              </a:rPr>
+              <a:t>Adding a title and variable names goes a long way.</a:t>
+            </a:r>
+          </a:p>
+        </p:txBody>
+      </p:sp>
+      <p:sp>
+        <p:nvSpPr>
+          <p:cNvPr id="3" name="TextBox 2">
+            <a:extLst>
+              <a:ext uri="{FF2B5EF4-FFF2-40B4-BE49-F238E27FC236}">
+                <a16:creationId xmlns:a16="http://schemas.microsoft.com/office/drawing/2014/main" id="{5CA26C35-36C9-ADDC-3107-CF1F9C4ABAD9}"/>
+              </a:ext>
+            </a:extLst>
+          </p:cNvPr>
+          <p:cNvSpPr txBox="1"/>
+          <p:nvPr/>
+        </p:nvSpPr>
+        <p:spPr>
+          <a:xfrm>
+            <a:off x="260498" y="5181600"/>
+            <a:ext cx="7588101" cy="1200329"/>
+          </a:xfrm>
+          <a:prstGeom prst="rect">
+            <a:avLst/>
+          </a:prstGeom>
+          <a:noFill/>
+        </p:spPr>
+        <p:txBody>
+          <a:bodyPr wrap="square" rtlCol="0">
+            <a:spAutoFit/>
+          </a:bodyPr>
+          <a:lstStyle/>
+          <a:p>
+            <a:r>
+              <a:rPr lang="en-US" sz="1200" dirty="0">
+                <a:latin typeface="Consolas" panose="020B0609020204030204" pitchFamily="49" charset="0"/>
+              </a:rPr>
+              <a:t>P &lt;- p +</a:t>
+            </a:r>
+          </a:p>
+          <a:p>
+            <a:r>
+              <a:rPr lang="en-US" sz="1200" dirty="0">
+                <a:latin typeface="Consolas" panose="020B0609020204030204" pitchFamily="49" charset="0"/>
+              </a:rPr>
+              <a:t> labs(</a:t>
+            </a:r>
+          </a:p>
+          <a:p>
+            <a:r>
+              <a:rPr lang="en-US" sz="1200" dirty="0">
+                <a:latin typeface="Consolas" panose="020B0609020204030204" pitchFamily="49" charset="0"/>
+              </a:rPr>
+              <a:t>    x = "Severity",</a:t>
+            </a:r>
+          </a:p>
+          <a:p>
+            <a:r>
+              <a:rPr lang="en-US" sz="1200" dirty="0">
+                <a:latin typeface="Consolas" panose="020B0609020204030204" pitchFamily="49" charset="0"/>
+              </a:rPr>
+              <a:t>    y = "Density",</a:t>
+            </a:r>
+          </a:p>
+          <a:p>
+            <a:r>
+              <a:rPr lang="en-US" sz="1200" dirty="0">
+                <a:latin typeface="Consolas" panose="020B0609020204030204" pitchFamily="49" charset="0"/>
+              </a:rPr>
+              <a:t>    title = "Fitted Severity Curve"</a:t>
+            </a:r>
+          </a:p>
+          <a:p>
+            <a:r>
+              <a:rPr lang="en-US" sz="1200" dirty="0">
+                <a:latin typeface="Consolas" panose="020B0609020204030204" pitchFamily="49" charset="0"/>
+              </a:rPr>
+              <a:t>  )</a:t>
+            </a:r>
+          </a:p>
+        </p:txBody>
+      </p:sp>
+    </p:spTree>
+    <p:extLst>
+      <p:ext uri="{BB962C8B-B14F-4D97-AF65-F5344CB8AC3E}">
+        <p14:creationId xmlns:p14="http://schemas.microsoft.com/office/powerpoint/2010/main" val="2442441093"/>
+      </p:ext>
+    </p:extLst>
+  </p:cSld>
+  <p:clrMapOvr>
+    <a:masterClrMapping/>
+  </p:clrMapOvr>
+</p:sld>
+</file>
+
+<file path=ppt/slides/slide25.xml><?xml version="1.0" encoding="utf-8"?>
+<p:sld xmlns:a="http://schemas.openxmlformats.org/drawingml/2006/main" xmlns:r="http://schemas.openxmlformats.org/officeDocument/2006/relationships" xmlns:p="http://schemas.openxmlformats.org/presentationml/2006/main">
+  <p:cSld>
+    <p:spTree>
+      <p:nvGrpSpPr>
+        <p:cNvPr id="1" name=""/>
+        <p:cNvGrpSpPr/>
+        <p:nvPr/>
+      </p:nvGrpSpPr>
+      <p:grpSpPr>
+        <a:xfrm>
+          <a:off x="0" y="0"/>
+          <a:ext cx="0" cy="0"/>
+          <a:chOff x="0" y="0"/>
+          <a:chExt cx="0" cy="0"/>
+        </a:xfrm>
+      </p:grpSpPr>
+      <p:sp>
+        <p:nvSpPr>
+          <p:cNvPr id="6" name="TextBox 5">
+            <a:extLst>
+              <a:ext uri="{FF2B5EF4-FFF2-40B4-BE49-F238E27FC236}">
+                <a16:creationId xmlns:a16="http://schemas.microsoft.com/office/drawing/2014/main" id="{5B20AD6F-D343-29FB-9824-B7DD8F4A2DDB}"/>
+              </a:ext>
+            </a:extLst>
+          </p:cNvPr>
+          <p:cNvSpPr txBox="1"/>
+          <p:nvPr/>
+        </p:nvSpPr>
+        <p:spPr>
+          <a:xfrm>
+            <a:off x="260498" y="5181600"/>
+            <a:ext cx="7588101" cy="1015663"/>
+          </a:xfrm>
+          <a:prstGeom prst="rect">
+            <a:avLst/>
+          </a:prstGeom>
+          <a:noFill/>
+        </p:spPr>
+        <p:txBody>
+          <a:bodyPr wrap="square" rtlCol="0">
+            <a:spAutoFit/>
+          </a:bodyPr>
+          <a:lstStyle/>
+          <a:p>
+            <a:r>
+              <a:rPr lang="en-US" sz="1200" dirty="0">
+                <a:latin typeface="Consolas" panose="020B0609020204030204" pitchFamily="49" charset="0"/>
+              </a:rPr>
+              <a:t>P &lt;- p +</a:t>
+            </a:r>
+          </a:p>
+          <a:p>
+            <a:r>
+              <a:rPr lang="en-US" sz="1200" dirty="0">
+                <a:latin typeface="Consolas" panose="020B0609020204030204" pitchFamily="49" charset="0"/>
+              </a:rPr>
+              <a:t>  </a:t>
+            </a:r>
+            <a:r>
+              <a:rPr lang="en-US" sz="1200" dirty="0" err="1">
+                <a:latin typeface="Consolas" panose="020B0609020204030204" pitchFamily="49" charset="0"/>
+              </a:rPr>
+              <a:t>scale_x_continuous</a:t>
+            </a:r>
+            <a:r>
+              <a:rPr lang="en-US" sz="1200" dirty="0">
+                <a:latin typeface="Consolas" panose="020B0609020204030204" pitchFamily="49" charset="0"/>
+              </a:rPr>
+              <a:t>(labels = scales::comma) +</a:t>
+            </a:r>
+          </a:p>
+          <a:p>
+            <a:r>
+              <a:rPr lang="en-US" sz="1200" dirty="0">
+                <a:latin typeface="Consolas" panose="020B0609020204030204" pitchFamily="49" charset="0"/>
+              </a:rPr>
+              <a:t>  theme(</a:t>
+            </a:r>
+            <a:r>
+              <a:rPr lang="en-US" sz="1200" dirty="0" err="1">
+                <a:latin typeface="Consolas" panose="020B0609020204030204" pitchFamily="49" charset="0"/>
+              </a:rPr>
+              <a:t>axis.text.y</a:t>
+            </a:r>
+            <a:r>
+              <a:rPr lang="en-US" sz="1200" dirty="0">
+                <a:latin typeface="Consolas" panose="020B0609020204030204" pitchFamily="49" charset="0"/>
+              </a:rPr>
+              <a:t> = </a:t>
+            </a:r>
+            <a:r>
+              <a:rPr lang="en-US" sz="1200" dirty="0" err="1">
+                <a:latin typeface="Consolas" panose="020B0609020204030204" pitchFamily="49" charset="0"/>
+              </a:rPr>
+              <a:t>element_blank</a:t>
+            </a:r>
+            <a:r>
+              <a:rPr lang="en-US" sz="1200" dirty="0">
+                <a:latin typeface="Consolas" panose="020B0609020204030204" pitchFamily="49" charset="0"/>
+              </a:rPr>
+              <a:t>(),</a:t>
+            </a:r>
+          </a:p>
+          <a:p>
+            <a:r>
+              <a:rPr lang="en-US" sz="1200" dirty="0">
+                <a:latin typeface="Consolas" panose="020B0609020204030204" pitchFamily="49" charset="0"/>
+              </a:rPr>
+              <a:t>        </a:t>
+            </a:r>
+            <a:r>
+              <a:rPr lang="en-US" sz="1200" dirty="0" err="1">
+                <a:latin typeface="Consolas" panose="020B0609020204030204" pitchFamily="49" charset="0"/>
+              </a:rPr>
+              <a:t>axis.ticks.y</a:t>
+            </a:r>
+            <a:r>
+              <a:rPr lang="en-US" sz="1200" dirty="0">
+                <a:latin typeface="Consolas" panose="020B0609020204030204" pitchFamily="49" charset="0"/>
+              </a:rPr>
+              <a:t> = </a:t>
+            </a:r>
+            <a:r>
+              <a:rPr lang="en-US" sz="1200" dirty="0" err="1">
+                <a:latin typeface="Consolas" panose="020B0609020204030204" pitchFamily="49" charset="0"/>
+              </a:rPr>
+              <a:t>element_blank</a:t>
+            </a:r>
+            <a:r>
+              <a:rPr lang="en-US" sz="1200" dirty="0">
+                <a:latin typeface="Consolas" panose="020B0609020204030204" pitchFamily="49" charset="0"/>
+              </a:rPr>
+              <a:t>(),</a:t>
+            </a:r>
+          </a:p>
+          <a:p>
+            <a:r>
+              <a:rPr lang="en-US" sz="1200" dirty="0">
+                <a:latin typeface="Consolas" panose="020B0609020204030204" pitchFamily="49" charset="0"/>
+              </a:rPr>
+              <a:t>        </a:t>
+            </a:r>
+            <a:r>
+              <a:rPr lang="en-US" sz="1200" dirty="0" err="1">
+                <a:latin typeface="Consolas" panose="020B0609020204030204" pitchFamily="49" charset="0"/>
+              </a:rPr>
+              <a:t>axis.title.y</a:t>
+            </a:r>
+            <a:r>
+              <a:rPr lang="en-US" sz="1200" dirty="0">
+                <a:latin typeface="Consolas" panose="020B0609020204030204" pitchFamily="49" charset="0"/>
+              </a:rPr>
+              <a:t> = </a:t>
+            </a:r>
+            <a:r>
+              <a:rPr lang="en-US" sz="1200" dirty="0" err="1">
+                <a:latin typeface="Consolas" panose="020B0609020204030204" pitchFamily="49" charset="0"/>
+              </a:rPr>
+              <a:t>element_blank</a:t>
+            </a:r>
+            <a:r>
+              <a:rPr lang="en-US" sz="1200" dirty="0">
+                <a:latin typeface="Consolas" panose="020B0609020204030204" pitchFamily="49" charset="0"/>
+              </a:rPr>
+              <a:t>())</a:t>
+            </a:r>
+          </a:p>
+        </p:txBody>
+      </p:sp>
+      <p:sp>
+        <p:nvSpPr>
+          <p:cNvPr id="2" name="Title 1">
+            <a:extLst>
+              <a:ext uri="{FF2B5EF4-FFF2-40B4-BE49-F238E27FC236}">
+                <a16:creationId xmlns:a16="http://schemas.microsoft.com/office/drawing/2014/main" id="{18969BF5-0288-FD7C-1739-0C8672F3D7F8}"/>
+              </a:ext>
+            </a:extLst>
+          </p:cNvPr>
+          <p:cNvSpPr>
+            <a:spLocks noGrp="1"/>
+          </p:cNvSpPr>
+          <p:nvPr>
+            <p:ph type="title"/>
+          </p:nvPr>
+        </p:nvSpPr>
+        <p:spPr/>
+        <p:txBody>
+          <a:bodyPr/>
+          <a:lstStyle/>
+          <a:p>
+            <a:r>
+              <a:rPr lang="en-US" dirty="0"/>
+              <a:t>Cleaning Axes</a:t>
+            </a:r>
+          </a:p>
+        </p:txBody>
+      </p:sp>
+      <p:pic>
+        <p:nvPicPr>
+          <p:cNvPr id="4" name="Picture 3">
+            <a:extLst>
+              <a:ext uri="{FF2B5EF4-FFF2-40B4-BE49-F238E27FC236}">
+                <a16:creationId xmlns:a16="http://schemas.microsoft.com/office/drawing/2014/main" id="{4A0037C9-EB90-2900-D4EC-DF813BC908A7}"/>
+              </a:ext>
+            </a:extLst>
+          </p:cNvPr>
+          <p:cNvPicPr>
+            <a:picLocks noChangeAspect="1"/>
+          </p:cNvPicPr>
+          <p:nvPr/>
+        </p:nvPicPr>
+        <p:blipFill>
+          <a:blip r:embed="rId2" r:link="rId3">
+            <a:extLst>
+              <a:ext uri="{28A0092B-C50C-407E-A947-70E740481C1C}">
+                <a14:useLocalDpi xmlns:a14="http://schemas.microsoft.com/office/drawing/2010/main" val="0"/>
+              </a:ext>
+            </a:extLst>
+          </a:blip>
+          <a:srcRect/>
+          <a:stretch>
+            <a:fillRect/>
+          </a:stretch>
+        </p:blipFill>
+        <p:spPr>
+          <a:xfrm>
+            <a:off x="2971801" y="1447801"/>
+            <a:ext cx="5943596" cy="3962397"/>
+          </a:xfrm>
+          <a:prstGeom prst="rect">
+            <a:avLst/>
+          </a:prstGeom>
+        </p:spPr>
+      </p:pic>
+      <p:sp>
+        <p:nvSpPr>
+          <p:cNvPr id="5" name="TextBox 4">
+            <a:extLst>
+              <a:ext uri="{FF2B5EF4-FFF2-40B4-BE49-F238E27FC236}">
+                <a16:creationId xmlns:a16="http://schemas.microsoft.com/office/drawing/2014/main" id="{04AF6261-B4B1-D761-810B-AACA39E89170}"/>
+              </a:ext>
+            </a:extLst>
+          </p:cNvPr>
+          <p:cNvSpPr txBox="1"/>
+          <p:nvPr/>
+        </p:nvSpPr>
+        <p:spPr>
+          <a:xfrm>
+            <a:off x="228601" y="2176234"/>
+            <a:ext cx="2431673" cy="2246769"/>
+          </a:xfrm>
+          <a:prstGeom prst="rect">
+            <a:avLst/>
+          </a:prstGeom>
+          <a:noFill/>
+        </p:spPr>
+        <p:txBody>
+          <a:bodyPr wrap="square" rtlCol="0">
+            <a:spAutoFit/>
+          </a:bodyPr>
+          <a:lstStyle/>
+          <a:p>
+            <a:pPr algn="ctr"/>
+            <a:r>
+              <a:rPr lang="en-US" sz="2800" dirty="0">
+                <a:latin typeface="Arial" panose="020B0604020202020204" pitchFamily="34" charset="0"/>
+                <a:cs typeface="Arial" panose="020B0604020202020204" pitchFamily="34" charset="0"/>
+              </a:rPr>
+              <a:t>We can change the x-axis labels and remove the y-axis.</a:t>
+            </a:r>
+          </a:p>
+        </p:txBody>
+      </p:sp>
+    </p:spTree>
+    <p:extLst>
+      <p:ext uri="{BB962C8B-B14F-4D97-AF65-F5344CB8AC3E}">
+        <p14:creationId xmlns:p14="http://schemas.microsoft.com/office/powerpoint/2010/main" val="2236211018"/>
+      </p:ext>
+    </p:extLst>
+  </p:cSld>
+  <p:clrMapOvr>
+    <a:masterClrMapping/>
+  </p:clrMapOvr>
+</p:sld>
+</file>
+
+<file path=ppt/slides/slide26.xml><?xml version="1.0" encoding="utf-8"?>
+<p:sld xmlns:a="http://schemas.openxmlformats.org/drawingml/2006/main" xmlns:r="http://schemas.openxmlformats.org/officeDocument/2006/relationships" xmlns:p="http://schemas.openxmlformats.org/presentationml/2006/main">
+  <p:cSld>
+    <p:spTree>
+      <p:nvGrpSpPr>
+        <p:cNvPr id="1" name=""/>
+        <p:cNvGrpSpPr/>
+        <p:nvPr/>
+      </p:nvGrpSpPr>
+      <p:grpSpPr>
+        <a:xfrm>
+          <a:off x="0" y="0"/>
+          <a:ext cx="0" cy="0"/>
+          <a:chOff x="0" y="0"/>
+          <a:chExt cx="0" cy="0"/>
+        </a:xfrm>
+      </p:grpSpPr>
+      <p:sp>
+        <p:nvSpPr>
+          <p:cNvPr id="2" name="Title 1">
+            <a:extLst>
+              <a:ext uri="{FF2B5EF4-FFF2-40B4-BE49-F238E27FC236}">
+                <a16:creationId xmlns:a16="http://schemas.microsoft.com/office/drawing/2014/main" id="{18969BF5-0288-FD7C-1739-0C8672F3D7F8}"/>
+              </a:ext>
+            </a:extLst>
+          </p:cNvPr>
+          <p:cNvSpPr>
+            <a:spLocks noGrp="1"/>
+          </p:cNvSpPr>
+          <p:nvPr>
+            <p:ph type="title"/>
+          </p:nvPr>
+        </p:nvSpPr>
+        <p:spPr/>
+        <p:txBody>
+          <a:bodyPr/>
+          <a:lstStyle/>
+          <a:p>
+            <a:r>
+              <a:rPr lang="en-US" dirty="0"/>
+              <a:t>Text Size &amp; Theme</a:t>
+            </a:r>
+          </a:p>
+        </p:txBody>
+      </p:sp>
+      <p:pic>
+        <p:nvPicPr>
+          <p:cNvPr id="4" name="Picture 3">
+            <a:extLst>
+              <a:ext uri="{FF2B5EF4-FFF2-40B4-BE49-F238E27FC236}">
+                <a16:creationId xmlns:a16="http://schemas.microsoft.com/office/drawing/2014/main" id="{4A0037C9-EB90-2900-D4EC-DF813BC908A7}"/>
+              </a:ext>
+            </a:extLst>
+          </p:cNvPr>
+          <p:cNvPicPr>
+            <a:picLocks noChangeAspect="1"/>
+          </p:cNvPicPr>
+          <p:nvPr/>
+        </p:nvPicPr>
+        <p:blipFill>
+          <a:blip r:embed="rId2" r:link="rId3">
+            <a:extLst>
+              <a:ext uri="{28A0092B-C50C-407E-A947-70E740481C1C}">
+                <a14:useLocalDpi xmlns:a14="http://schemas.microsoft.com/office/drawing/2010/main" val="0"/>
+              </a:ext>
+            </a:extLst>
+          </a:blip>
+          <a:srcRect/>
+          <a:stretch>
+            <a:fillRect/>
+          </a:stretch>
+        </p:blipFill>
+        <p:spPr>
+          <a:xfrm>
+            <a:off x="2971802" y="1447801"/>
+            <a:ext cx="5943594" cy="3962396"/>
+          </a:xfrm>
+          <a:prstGeom prst="rect">
+            <a:avLst/>
+          </a:prstGeom>
+        </p:spPr>
+      </p:pic>
+      <p:sp>
+        <p:nvSpPr>
+          <p:cNvPr id="5" name="TextBox 4">
+            <a:extLst>
+              <a:ext uri="{FF2B5EF4-FFF2-40B4-BE49-F238E27FC236}">
+                <a16:creationId xmlns:a16="http://schemas.microsoft.com/office/drawing/2014/main" id="{04AF6261-B4B1-D761-810B-AACA39E89170}"/>
+              </a:ext>
+            </a:extLst>
+          </p:cNvPr>
+          <p:cNvSpPr txBox="1"/>
+          <p:nvPr/>
+        </p:nvSpPr>
+        <p:spPr>
+          <a:xfrm>
+            <a:off x="228601" y="1975873"/>
+            <a:ext cx="2431673" cy="2677656"/>
+          </a:xfrm>
+          <a:prstGeom prst="rect">
+            <a:avLst/>
+          </a:prstGeom>
+          <a:noFill/>
+        </p:spPr>
+        <p:txBody>
+          <a:bodyPr wrap="square" rtlCol="0">
+            <a:spAutoFit/>
+          </a:bodyPr>
+          <a:lstStyle/>
+          <a:p>
+            <a:pPr algn="ctr"/>
+            <a:r>
+              <a:rPr lang="en-US" sz="2800" dirty="0">
+                <a:latin typeface="Arial" panose="020B0604020202020204" pitchFamily="34" charset="0"/>
+                <a:cs typeface="Arial" panose="020B0604020202020204" pitchFamily="34" charset="0"/>
+              </a:rPr>
+              <a:t>We can increase text size and select a simpler theme.</a:t>
+            </a:r>
+          </a:p>
+        </p:txBody>
+      </p:sp>
+      <p:sp>
+        <p:nvSpPr>
+          <p:cNvPr id="3" name="TextBox 2">
+            <a:extLst>
+              <a:ext uri="{FF2B5EF4-FFF2-40B4-BE49-F238E27FC236}">
+                <a16:creationId xmlns:a16="http://schemas.microsoft.com/office/drawing/2014/main" id="{6C6ADEAB-5768-68AB-60CA-2FE1BC43C7E3}"/>
+              </a:ext>
+            </a:extLst>
+          </p:cNvPr>
+          <p:cNvSpPr txBox="1"/>
+          <p:nvPr/>
+        </p:nvSpPr>
+        <p:spPr>
+          <a:xfrm>
+            <a:off x="260498" y="5181600"/>
+            <a:ext cx="7588101" cy="1569660"/>
+          </a:xfrm>
+          <a:prstGeom prst="rect">
+            <a:avLst/>
+          </a:prstGeom>
+          <a:noFill/>
+        </p:spPr>
+        <p:txBody>
+          <a:bodyPr wrap="square" rtlCol="0">
+            <a:spAutoFit/>
+          </a:bodyPr>
+          <a:lstStyle/>
+          <a:p>
+            <a:r>
+              <a:rPr lang="en-US" sz="1200" dirty="0">
+                <a:latin typeface="Consolas" panose="020B0609020204030204" pitchFamily="49" charset="0"/>
+              </a:rPr>
+              <a:t>P &lt;- p +</a:t>
+            </a:r>
+          </a:p>
+          <a:p>
+            <a:r>
+              <a:rPr lang="en-US" sz="1200" dirty="0">
+                <a:latin typeface="Consolas" panose="020B0609020204030204" pitchFamily="49" charset="0"/>
+              </a:rPr>
+              <a:t>  </a:t>
+            </a:r>
+            <a:r>
+              <a:rPr lang="en-US" sz="1200" dirty="0" err="1">
+                <a:latin typeface="Consolas" panose="020B0609020204030204" pitchFamily="49" charset="0"/>
+              </a:rPr>
+              <a:t>theme_minimal</a:t>
+            </a:r>
+            <a:r>
+              <a:rPr lang="en-US" sz="1200" dirty="0">
+                <a:latin typeface="Consolas" panose="020B0609020204030204" pitchFamily="49" charset="0"/>
+              </a:rPr>
+              <a:t>(</a:t>
+            </a:r>
+            <a:r>
+              <a:rPr lang="en-US" sz="1200" dirty="0" err="1">
+                <a:latin typeface="Consolas" panose="020B0609020204030204" pitchFamily="49" charset="0"/>
+              </a:rPr>
+              <a:t>base_size</a:t>
+            </a:r>
+            <a:r>
+              <a:rPr lang="en-US" sz="1200" dirty="0">
+                <a:latin typeface="Consolas" panose="020B0609020204030204" pitchFamily="49" charset="0"/>
+              </a:rPr>
+              <a:t> = 20) +</a:t>
+            </a:r>
+          </a:p>
+          <a:p>
+            <a:r>
+              <a:rPr lang="en-US" sz="1200" dirty="0">
+                <a:latin typeface="Consolas" panose="020B0609020204030204" pitchFamily="49" charset="0"/>
+              </a:rPr>
+              <a:t>  theme(</a:t>
+            </a:r>
+            <a:r>
+              <a:rPr lang="en-US" sz="1200" dirty="0" err="1">
+                <a:latin typeface="Consolas" panose="020B0609020204030204" pitchFamily="49" charset="0"/>
+              </a:rPr>
+              <a:t>panel.grid.major</a:t>
+            </a:r>
+            <a:r>
+              <a:rPr lang="en-US" sz="1200" dirty="0">
+                <a:latin typeface="Consolas" panose="020B0609020204030204" pitchFamily="49" charset="0"/>
+              </a:rPr>
+              <a:t> = </a:t>
+            </a:r>
+            <a:r>
+              <a:rPr lang="en-US" sz="1200" dirty="0" err="1">
+                <a:latin typeface="Consolas" panose="020B0609020204030204" pitchFamily="49" charset="0"/>
+              </a:rPr>
+              <a:t>element_blank</a:t>
+            </a:r>
+            <a:r>
+              <a:rPr lang="en-US" sz="1200" dirty="0">
+                <a:latin typeface="Consolas" panose="020B0609020204030204" pitchFamily="49" charset="0"/>
+              </a:rPr>
+              <a:t>(),</a:t>
+            </a:r>
+          </a:p>
+          <a:p>
+            <a:r>
+              <a:rPr lang="en-US" sz="1200" dirty="0">
+                <a:latin typeface="Consolas" panose="020B0609020204030204" pitchFamily="49" charset="0"/>
+              </a:rPr>
+              <a:t>        </a:t>
+            </a:r>
+            <a:r>
+              <a:rPr lang="en-US" sz="1200" dirty="0" err="1">
+                <a:latin typeface="Consolas" panose="020B0609020204030204" pitchFamily="49" charset="0"/>
+              </a:rPr>
+              <a:t>panel.grid.minor</a:t>
+            </a:r>
+            <a:r>
+              <a:rPr lang="en-US" sz="1200" dirty="0">
+                <a:latin typeface="Consolas" panose="020B0609020204030204" pitchFamily="49" charset="0"/>
+              </a:rPr>
+              <a:t> = </a:t>
+            </a:r>
+            <a:r>
+              <a:rPr lang="en-US" sz="1200" dirty="0" err="1">
+                <a:latin typeface="Consolas" panose="020B0609020204030204" pitchFamily="49" charset="0"/>
+              </a:rPr>
+              <a:t>element_blank</a:t>
+            </a:r>
+            <a:r>
+              <a:rPr lang="en-US" sz="1200" dirty="0">
+                <a:latin typeface="Consolas" panose="020B0609020204030204" pitchFamily="49" charset="0"/>
+              </a:rPr>
+              <a:t>()) +</a:t>
+            </a:r>
+          </a:p>
+          <a:p>
+            <a:r>
+              <a:rPr lang="en-US" sz="1200" dirty="0">
+                <a:latin typeface="Consolas" panose="020B0609020204030204" pitchFamily="49" charset="0"/>
+              </a:rPr>
+              <a:t>  </a:t>
+            </a:r>
+            <a:r>
+              <a:rPr lang="en-US" sz="1200" dirty="0" err="1">
+                <a:latin typeface="Consolas" panose="020B0609020204030204" pitchFamily="49" charset="0"/>
+              </a:rPr>
+              <a:t>scale_x_continuous</a:t>
+            </a:r>
+            <a:r>
+              <a:rPr lang="en-US" sz="1200" dirty="0">
+                <a:latin typeface="Consolas" panose="020B0609020204030204" pitchFamily="49" charset="0"/>
+              </a:rPr>
+              <a:t>(labels = scales::comma) +</a:t>
+            </a:r>
+          </a:p>
+          <a:p>
+            <a:r>
+              <a:rPr lang="en-US" sz="1200" dirty="0">
+                <a:latin typeface="Consolas" panose="020B0609020204030204" pitchFamily="49" charset="0"/>
+              </a:rPr>
+              <a:t>  theme(</a:t>
+            </a:r>
+            <a:r>
+              <a:rPr lang="en-US" sz="1200" dirty="0" err="1">
+                <a:latin typeface="Consolas" panose="020B0609020204030204" pitchFamily="49" charset="0"/>
+              </a:rPr>
+              <a:t>axis.text.y</a:t>
+            </a:r>
+            <a:r>
+              <a:rPr lang="en-US" sz="1200" dirty="0">
+                <a:latin typeface="Consolas" panose="020B0609020204030204" pitchFamily="49" charset="0"/>
+              </a:rPr>
+              <a:t> = </a:t>
+            </a:r>
+            <a:r>
+              <a:rPr lang="en-US" sz="1200" dirty="0" err="1">
+                <a:latin typeface="Consolas" panose="020B0609020204030204" pitchFamily="49" charset="0"/>
+              </a:rPr>
+              <a:t>element_blank</a:t>
+            </a:r>
+            <a:r>
+              <a:rPr lang="en-US" sz="1200" dirty="0">
+                <a:latin typeface="Consolas" panose="020B0609020204030204" pitchFamily="49" charset="0"/>
+              </a:rPr>
+              <a:t>(),</a:t>
+            </a:r>
+          </a:p>
+          <a:p>
+            <a:r>
+              <a:rPr lang="en-US" sz="1200" dirty="0">
+                <a:latin typeface="Consolas" panose="020B0609020204030204" pitchFamily="49" charset="0"/>
+              </a:rPr>
+              <a:t>        </a:t>
+            </a:r>
+            <a:r>
+              <a:rPr lang="en-US" sz="1200" dirty="0" err="1">
+                <a:latin typeface="Consolas" panose="020B0609020204030204" pitchFamily="49" charset="0"/>
+              </a:rPr>
+              <a:t>axis.ticks.y</a:t>
+            </a:r>
+            <a:r>
+              <a:rPr lang="en-US" sz="1200" dirty="0">
+                <a:latin typeface="Consolas" panose="020B0609020204030204" pitchFamily="49" charset="0"/>
+              </a:rPr>
+              <a:t> = </a:t>
+            </a:r>
+            <a:r>
+              <a:rPr lang="en-US" sz="1200" dirty="0" err="1">
+                <a:latin typeface="Consolas" panose="020B0609020204030204" pitchFamily="49" charset="0"/>
+              </a:rPr>
+              <a:t>element_blank</a:t>
+            </a:r>
+            <a:r>
+              <a:rPr lang="en-US" sz="1200" dirty="0">
+                <a:latin typeface="Consolas" panose="020B0609020204030204" pitchFamily="49" charset="0"/>
+              </a:rPr>
+              <a:t>(),</a:t>
+            </a:r>
+          </a:p>
+          <a:p>
+            <a:r>
+              <a:rPr lang="en-US" sz="1200" dirty="0">
+                <a:latin typeface="Consolas" panose="020B0609020204030204" pitchFamily="49" charset="0"/>
+              </a:rPr>
+              <a:t>        </a:t>
+            </a:r>
+            <a:r>
+              <a:rPr lang="en-US" sz="1200" dirty="0" err="1">
+                <a:latin typeface="Consolas" panose="020B0609020204030204" pitchFamily="49" charset="0"/>
+              </a:rPr>
+              <a:t>axis.title.y</a:t>
+            </a:r>
+            <a:r>
+              <a:rPr lang="en-US" sz="1200" dirty="0">
+                <a:latin typeface="Consolas" panose="020B0609020204030204" pitchFamily="49" charset="0"/>
+              </a:rPr>
+              <a:t> = </a:t>
+            </a:r>
+            <a:r>
+              <a:rPr lang="en-US" sz="1200" dirty="0" err="1">
+                <a:latin typeface="Consolas" panose="020B0609020204030204" pitchFamily="49" charset="0"/>
+              </a:rPr>
+              <a:t>element_blank</a:t>
+            </a:r>
+            <a:r>
+              <a:rPr lang="en-US" sz="1200" dirty="0">
+                <a:latin typeface="Consolas" panose="020B0609020204030204" pitchFamily="49" charset="0"/>
+              </a:rPr>
+              <a:t>())</a:t>
+            </a:r>
+          </a:p>
+        </p:txBody>
+      </p:sp>
+    </p:spTree>
+    <p:extLst>
+      <p:ext uri="{BB962C8B-B14F-4D97-AF65-F5344CB8AC3E}">
+        <p14:creationId xmlns:p14="http://schemas.microsoft.com/office/powerpoint/2010/main" val="3053040336"/>
+      </p:ext>
+    </p:extLst>
+  </p:cSld>
+  <p:clrMapOvr>
+    <a:masterClrMapping/>
+  </p:clrMapOvr>
+</p:sld>
+</file>
+
+<file path=ppt/slides/slide27.xml><?xml version="1.0" encoding="utf-8"?>
+<p:sld xmlns:a="http://schemas.openxmlformats.org/drawingml/2006/main" xmlns:r="http://schemas.openxmlformats.org/officeDocument/2006/relationships" xmlns:p="http://schemas.openxmlformats.org/presentationml/2006/main">
+  <p:cSld>
+    <p:spTree>
+      <p:nvGrpSpPr>
+        <p:cNvPr id="1" name=""/>
+        <p:cNvGrpSpPr/>
+        <p:nvPr/>
+      </p:nvGrpSpPr>
+      <p:grpSpPr>
+        <a:xfrm>
+          <a:off x="0" y="0"/>
+          <a:ext cx="0" cy="0"/>
+          <a:chOff x="0" y="0"/>
+          <a:chExt cx="0" cy="0"/>
+        </a:xfrm>
+      </p:grpSpPr>
+      <p:sp>
+        <p:nvSpPr>
+          <p:cNvPr id="2" name="Title 1">
+            <a:extLst>
+              <a:ext uri="{FF2B5EF4-FFF2-40B4-BE49-F238E27FC236}">
+                <a16:creationId xmlns:a16="http://schemas.microsoft.com/office/drawing/2014/main" id="{18969BF5-0288-FD7C-1739-0C8672F3D7F8}"/>
+              </a:ext>
+            </a:extLst>
+          </p:cNvPr>
+          <p:cNvSpPr>
+            <a:spLocks noGrp="1"/>
+          </p:cNvSpPr>
+          <p:nvPr>
+            <p:ph type="title"/>
+          </p:nvPr>
+        </p:nvSpPr>
+        <p:spPr/>
+        <p:txBody>
+          <a:bodyPr/>
+          <a:lstStyle/>
+          <a:p>
+            <a:r>
+              <a:rPr lang="en-US" dirty="0"/>
+              <a:t>Color</a:t>
+            </a:r>
+          </a:p>
+        </p:txBody>
+      </p:sp>
+      <p:pic>
+        <p:nvPicPr>
+          <p:cNvPr id="4" name="Picture 3">
+            <a:extLst>
+              <a:ext uri="{FF2B5EF4-FFF2-40B4-BE49-F238E27FC236}">
+                <a16:creationId xmlns:a16="http://schemas.microsoft.com/office/drawing/2014/main" id="{4A0037C9-EB90-2900-D4EC-DF813BC908A7}"/>
+              </a:ext>
+            </a:extLst>
+          </p:cNvPr>
+          <p:cNvPicPr>
+            <a:picLocks noChangeAspect="1"/>
+          </p:cNvPicPr>
+          <p:nvPr/>
+        </p:nvPicPr>
+        <p:blipFill>
+          <a:blip r:embed="rId2" r:link="rId3">
+            <a:extLst>
+              <a:ext uri="{28A0092B-C50C-407E-A947-70E740481C1C}">
+                <a14:useLocalDpi xmlns:a14="http://schemas.microsoft.com/office/drawing/2010/main" val="0"/>
+              </a:ext>
+            </a:extLst>
+          </a:blip>
+          <a:srcRect/>
+          <a:stretch>
+            <a:fillRect/>
+          </a:stretch>
+        </p:blipFill>
+        <p:spPr>
+          <a:xfrm>
+            <a:off x="2971802" y="1447801"/>
+            <a:ext cx="5943594" cy="3962395"/>
+          </a:xfrm>
+          <a:prstGeom prst="rect">
+            <a:avLst/>
+          </a:prstGeom>
+        </p:spPr>
+      </p:pic>
+      <p:sp>
+        <p:nvSpPr>
+          <p:cNvPr id="5" name="TextBox 4">
+            <a:extLst>
+              <a:ext uri="{FF2B5EF4-FFF2-40B4-BE49-F238E27FC236}">
+                <a16:creationId xmlns:a16="http://schemas.microsoft.com/office/drawing/2014/main" id="{04AF6261-B4B1-D761-810B-AACA39E89170}"/>
+              </a:ext>
+            </a:extLst>
+          </p:cNvPr>
+          <p:cNvSpPr txBox="1"/>
+          <p:nvPr/>
+        </p:nvSpPr>
+        <p:spPr>
+          <a:xfrm>
+            <a:off x="228601" y="2514600"/>
+            <a:ext cx="2431673" cy="1815882"/>
+          </a:xfrm>
+          <a:prstGeom prst="rect">
+            <a:avLst/>
+          </a:prstGeom>
+          <a:noFill/>
+        </p:spPr>
+        <p:txBody>
+          <a:bodyPr wrap="square" rtlCol="0">
+            <a:spAutoFit/>
+          </a:bodyPr>
+          <a:lstStyle/>
+          <a:p>
+            <a:pPr algn="ctr"/>
+            <a:r>
+              <a:rPr lang="en-US" sz="2800" dirty="0">
+                <a:latin typeface="Arial" panose="020B0604020202020204" pitchFamily="34" charset="0"/>
+                <a:cs typeface="Arial" panose="020B0604020202020204" pitchFamily="34" charset="0"/>
+              </a:rPr>
+              <a:t>We can also update the color, if desired.</a:t>
+            </a:r>
+          </a:p>
+        </p:txBody>
+      </p:sp>
+      <p:sp>
+        <p:nvSpPr>
+          <p:cNvPr id="3" name="TextBox 2">
+            <a:extLst>
+              <a:ext uri="{FF2B5EF4-FFF2-40B4-BE49-F238E27FC236}">
+                <a16:creationId xmlns:a16="http://schemas.microsoft.com/office/drawing/2014/main" id="{4FD38AA8-E08D-AFDB-588A-1A0A6FD4205A}"/>
+              </a:ext>
+            </a:extLst>
+          </p:cNvPr>
+          <p:cNvSpPr txBox="1"/>
+          <p:nvPr/>
+        </p:nvSpPr>
+        <p:spPr>
+          <a:xfrm>
+            <a:off x="260498" y="5181600"/>
+            <a:ext cx="7588101" cy="1384995"/>
+          </a:xfrm>
+          <a:prstGeom prst="rect">
+            <a:avLst/>
+          </a:prstGeom>
+          <a:noFill/>
+        </p:spPr>
+        <p:txBody>
+          <a:bodyPr wrap="square" rtlCol="0">
+            <a:spAutoFit/>
+          </a:bodyPr>
+          <a:lstStyle/>
+          <a:p>
+            <a:r>
+              <a:rPr lang="en-US" sz="1200" dirty="0">
+                <a:latin typeface="Consolas" panose="020B0609020204030204" pitchFamily="49" charset="0"/>
+              </a:rPr>
+              <a:t>...</a:t>
+            </a:r>
+          </a:p>
+          <a:p>
+            <a:r>
+              <a:rPr lang="en-US" sz="1200" dirty="0">
+                <a:latin typeface="Consolas" panose="020B0609020204030204" pitchFamily="49" charset="0"/>
+              </a:rPr>
+              <a:t>  </a:t>
+            </a:r>
+            <a:r>
+              <a:rPr lang="en-US" sz="1200" dirty="0" err="1">
+                <a:latin typeface="Consolas" panose="020B0609020204030204" pitchFamily="49" charset="0"/>
+              </a:rPr>
+              <a:t>geom_histogram</a:t>
+            </a:r>
+            <a:r>
+              <a:rPr lang="en-US" sz="1200" dirty="0">
+                <a:latin typeface="Consolas" panose="020B0609020204030204" pitchFamily="49" charset="0"/>
+              </a:rPr>
+              <a:t>(</a:t>
+            </a:r>
+            <a:r>
+              <a:rPr lang="en-US" sz="1200" dirty="0" err="1">
+                <a:latin typeface="Consolas" panose="020B0609020204030204" pitchFamily="49" charset="0"/>
+              </a:rPr>
+              <a:t>aes</a:t>
+            </a:r>
+            <a:r>
+              <a:rPr lang="en-US" sz="1200" dirty="0">
+                <a:latin typeface="Consolas" panose="020B0609020204030204" pitchFamily="49" charset="0"/>
+              </a:rPr>
+              <a:t>(x = loss, </a:t>
+            </a:r>
+            <a:r>
+              <a:rPr lang="en-US" sz="1200" dirty="0" err="1">
+                <a:latin typeface="Consolas" panose="020B0609020204030204" pitchFamily="49" charset="0"/>
+              </a:rPr>
+              <a:t>after_stat</a:t>
+            </a:r>
+            <a:r>
+              <a:rPr lang="en-US" sz="1200" dirty="0">
+                <a:latin typeface="Consolas" panose="020B0609020204030204" pitchFamily="49" charset="0"/>
+              </a:rPr>
+              <a:t>(density)),</a:t>
+            </a:r>
+          </a:p>
+          <a:p>
+            <a:r>
+              <a:rPr lang="en-US" sz="1200" dirty="0">
+                <a:latin typeface="Consolas" panose="020B0609020204030204" pitchFamily="49" charset="0"/>
+              </a:rPr>
+              <a:t>                 fill = </a:t>
+            </a:r>
+            <a:r>
+              <a:rPr lang="en-US" sz="1200" dirty="0" err="1">
+                <a:latin typeface="Consolas" panose="020B0609020204030204" pitchFamily="49" charset="0"/>
+              </a:rPr>
+              <a:t>pal_CAS</a:t>
+            </a:r>
+            <a:r>
+              <a:rPr lang="en-US" sz="1200" dirty="0">
+                <a:latin typeface="Consolas" panose="020B0609020204030204" pitchFamily="49" charset="0"/>
+              </a:rPr>
+              <a:t>["</a:t>
+            </a:r>
+            <a:r>
+              <a:rPr lang="en-US" sz="1200" dirty="0" err="1">
+                <a:latin typeface="Consolas" panose="020B0609020204030204" pitchFamily="49" charset="0"/>
+              </a:rPr>
+              <a:t>light_blue</a:t>
+            </a:r>
+            <a:r>
+              <a:rPr lang="en-US" sz="1200" dirty="0">
+                <a:latin typeface="Consolas" panose="020B0609020204030204" pitchFamily="49" charset="0"/>
+              </a:rPr>
+              <a:t>"]) +</a:t>
+            </a:r>
+          </a:p>
+          <a:p>
+            <a:r>
+              <a:rPr lang="en-US" sz="1200" dirty="0">
+                <a:latin typeface="Consolas" panose="020B0609020204030204" pitchFamily="49" charset="0"/>
+              </a:rPr>
+              <a:t>  </a:t>
+            </a:r>
+            <a:r>
+              <a:rPr lang="en-US" sz="1200" dirty="0" err="1">
+                <a:latin typeface="Consolas" panose="020B0609020204030204" pitchFamily="49" charset="0"/>
+              </a:rPr>
+              <a:t>stat_function</a:t>
+            </a:r>
+            <a:r>
+              <a:rPr lang="en-US" sz="1200" dirty="0">
+                <a:latin typeface="Consolas" panose="020B0609020204030204" pitchFamily="49" charset="0"/>
+              </a:rPr>
+              <a:t>(fun = </a:t>
+            </a:r>
+            <a:r>
+              <a:rPr lang="en-US" sz="1200" dirty="0" err="1">
+                <a:latin typeface="Consolas" panose="020B0609020204030204" pitchFamily="49" charset="0"/>
+              </a:rPr>
+              <a:t>dlnorm</a:t>
+            </a:r>
+            <a:r>
+              <a:rPr lang="en-US" sz="1200" dirty="0">
+                <a:latin typeface="Consolas" panose="020B0609020204030204" pitchFamily="49" charset="0"/>
+              </a:rPr>
+              <a:t>,</a:t>
+            </a:r>
+          </a:p>
+          <a:p>
+            <a:r>
+              <a:rPr lang="en-US" sz="1200" dirty="0">
+                <a:latin typeface="Consolas" panose="020B0609020204030204" pitchFamily="49" charset="0"/>
+              </a:rPr>
+              <a:t>                </a:t>
+            </a:r>
+            <a:r>
+              <a:rPr lang="en-US" sz="1200" dirty="0" err="1">
+                <a:latin typeface="Consolas" panose="020B0609020204030204" pitchFamily="49" charset="0"/>
+              </a:rPr>
+              <a:t>args</a:t>
+            </a:r>
+            <a:r>
+              <a:rPr lang="en-US" sz="1200" dirty="0">
+                <a:latin typeface="Consolas" panose="020B0609020204030204" pitchFamily="49" charset="0"/>
+              </a:rPr>
+              <a:t> = list(</a:t>
+            </a:r>
+            <a:r>
+              <a:rPr lang="en-US" sz="1200" dirty="0" err="1">
+                <a:latin typeface="Consolas" panose="020B0609020204030204" pitchFamily="49" charset="0"/>
+              </a:rPr>
+              <a:t>meanlog</a:t>
+            </a:r>
+            <a:r>
+              <a:rPr lang="en-US" sz="1200" dirty="0">
+                <a:latin typeface="Consolas" panose="020B0609020204030204" pitchFamily="49" charset="0"/>
+              </a:rPr>
+              <a:t> = 10, </a:t>
+            </a:r>
+            <a:r>
+              <a:rPr lang="en-US" sz="1200" dirty="0" err="1">
+                <a:latin typeface="Consolas" panose="020B0609020204030204" pitchFamily="49" charset="0"/>
+              </a:rPr>
+              <a:t>sdlog</a:t>
+            </a:r>
+            <a:r>
+              <a:rPr lang="en-US" sz="1200" dirty="0">
+                <a:latin typeface="Consolas" panose="020B0609020204030204" pitchFamily="49" charset="0"/>
+              </a:rPr>
+              <a:t> = 1.0),</a:t>
+            </a:r>
+          </a:p>
+          <a:p>
+            <a:r>
+              <a:rPr lang="en-US" sz="1200" dirty="0">
+                <a:latin typeface="Consolas" panose="020B0609020204030204" pitchFamily="49" charset="0"/>
+              </a:rPr>
+              <a:t>                color = </a:t>
+            </a:r>
+            <a:r>
+              <a:rPr lang="en-US" sz="1200" dirty="0" err="1">
+                <a:latin typeface="Consolas" panose="020B0609020204030204" pitchFamily="49" charset="0"/>
+              </a:rPr>
+              <a:t>pal_CAS</a:t>
+            </a:r>
+            <a:r>
+              <a:rPr lang="en-US" sz="1200" dirty="0">
+                <a:latin typeface="Consolas" panose="020B0609020204030204" pitchFamily="49" charset="0"/>
+              </a:rPr>
+              <a:t>["</a:t>
+            </a:r>
+            <a:r>
+              <a:rPr lang="en-US" sz="1200" dirty="0" err="1">
+                <a:latin typeface="Consolas" panose="020B0609020204030204" pitchFamily="49" charset="0"/>
+              </a:rPr>
+              <a:t>dark_blue</a:t>
+            </a:r>
+            <a:r>
+              <a:rPr lang="en-US" sz="1200" dirty="0">
+                <a:latin typeface="Consolas" panose="020B0609020204030204" pitchFamily="49" charset="0"/>
+              </a:rPr>
+              <a:t>"]) +</a:t>
+            </a:r>
+          </a:p>
+          <a:p>
+            <a:r>
+              <a:rPr lang="en-US" sz="1200" dirty="0">
+                <a:latin typeface="Consolas" panose="020B0609020204030204" pitchFamily="49" charset="0"/>
+              </a:rPr>
+              <a:t>...</a:t>
+            </a:r>
+          </a:p>
+        </p:txBody>
+      </p:sp>
+    </p:spTree>
+    <p:extLst>
+      <p:ext uri="{BB962C8B-B14F-4D97-AF65-F5344CB8AC3E}">
+        <p14:creationId xmlns:p14="http://schemas.microsoft.com/office/powerpoint/2010/main" val="1956384913"/>
+      </p:ext>
+    </p:extLst>
+  </p:cSld>
+  <p:clrMapOvr>
+    <a:masterClrMapping/>
+  </p:clrMapOvr>
+</p:sld>
+</file>
+
+<file path=ppt/slides/slide28.xml><?xml version="1.0" encoding="utf-8"?>
+<p:sld xmlns:a="http://schemas.openxmlformats.org/drawingml/2006/main" xmlns:r="http://schemas.openxmlformats.org/officeDocument/2006/relationships" xmlns:p="http://schemas.openxmlformats.org/presentationml/2006/main">
+  <p:cSld>
+    <p:spTree>
+      <p:nvGrpSpPr>
+        <p:cNvPr id="1" name=""/>
+        <p:cNvGrpSpPr/>
+        <p:nvPr/>
+      </p:nvGrpSpPr>
+      <p:grpSpPr>
+        <a:xfrm>
+          <a:off x="0" y="0"/>
+          <a:ext cx="0" cy="0"/>
+          <a:chOff x="0" y="0"/>
+          <a:chExt cx="0" cy="0"/>
+        </a:xfrm>
+      </p:grpSpPr>
+      <p:sp>
+        <p:nvSpPr>
+          <p:cNvPr id="2" name="Title 1">
+            <a:extLst>
+              <a:ext uri="{FF2B5EF4-FFF2-40B4-BE49-F238E27FC236}">
+                <a16:creationId xmlns:a16="http://schemas.microsoft.com/office/drawing/2014/main" id="{18969BF5-0288-FD7C-1739-0C8672F3D7F8}"/>
+              </a:ext>
+            </a:extLst>
+          </p:cNvPr>
+          <p:cNvSpPr>
+            <a:spLocks noGrp="1"/>
+          </p:cNvSpPr>
+          <p:nvPr>
+            <p:ph type="title"/>
+          </p:nvPr>
+        </p:nvSpPr>
+        <p:spPr/>
+        <p:txBody>
+          <a:bodyPr/>
+          <a:lstStyle/>
+          <a:p>
+            <a:r>
+              <a:rPr lang="en-US" dirty="0"/>
+              <a:t>Comparison</a:t>
+            </a:r>
+          </a:p>
+        </p:txBody>
+      </p:sp>
+      <p:pic>
+        <p:nvPicPr>
+          <p:cNvPr id="4" name="Picture 3">
+            <a:extLst>
+              <a:ext uri="{FF2B5EF4-FFF2-40B4-BE49-F238E27FC236}">
+                <a16:creationId xmlns:a16="http://schemas.microsoft.com/office/drawing/2014/main" id="{4A0037C9-EB90-2900-D4EC-DF813BC908A7}"/>
+              </a:ext>
+            </a:extLst>
+          </p:cNvPr>
+          <p:cNvPicPr>
+            <a:picLocks noChangeAspect="1"/>
+          </p:cNvPicPr>
+          <p:nvPr/>
+        </p:nvPicPr>
+        <p:blipFill>
+          <a:blip r:embed="rId2" r:link="rId3">
+            <a:extLst>
+              <a:ext uri="{28A0092B-C50C-407E-A947-70E740481C1C}">
+                <a14:useLocalDpi xmlns:a14="http://schemas.microsoft.com/office/drawing/2010/main" val="0"/>
+              </a:ext>
+            </a:extLst>
+          </a:blip>
+          <a:srcRect/>
+          <a:stretch>
+            <a:fillRect/>
+          </a:stretch>
+        </p:blipFill>
+        <p:spPr>
+          <a:xfrm>
+            <a:off x="4571998" y="2209799"/>
+            <a:ext cx="4389121" cy="2926080"/>
+          </a:xfrm>
+          <a:prstGeom prst="rect">
+            <a:avLst/>
+          </a:prstGeom>
+        </p:spPr>
+      </p:pic>
+      <p:pic>
+        <p:nvPicPr>
+          <p:cNvPr id="6" name="Picture 5">
+            <a:extLst>
+              <a:ext uri="{FF2B5EF4-FFF2-40B4-BE49-F238E27FC236}">
+                <a16:creationId xmlns:a16="http://schemas.microsoft.com/office/drawing/2014/main" id="{D8447591-D830-A3F2-DC0D-858B0C9B5E06}"/>
+              </a:ext>
+            </a:extLst>
+          </p:cNvPr>
+          <p:cNvPicPr>
+            <a:picLocks noChangeAspect="1"/>
+          </p:cNvPicPr>
+          <p:nvPr/>
+        </p:nvPicPr>
+        <p:blipFill>
+          <a:blip r:embed="rId4" r:link="rId5">
+            <a:extLst>
+              <a:ext uri="{28A0092B-C50C-407E-A947-70E740481C1C}">
+                <a14:useLocalDpi xmlns:a14="http://schemas.microsoft.com/office/drawing/2010/main" val="0"/>
+              </a:ext>
+            </a:extLst>
+          </a:blip>
+          <a:srcRect/>
+          <a:stretch>
+            <a:fillRect/>
+          </a:stretch>
+        </p:blipFill>
+        <p:spPr>
+          <a:xfrm>
+            <a:off x="152401" y="2209799"/>
+            <a:ext cx="4389120" cy="2926080"/>
+          </a:xfrm>
+          <a:prstGeom prst="rect">
+            <a:avLst/>
+          </a:prstGeom>
+        </p:spPr>
+      </p:pic>
+    </p:spTree>
+    <p:extLst>
+      <p:ext uri="{BB962C8B-B14F-4D97-AF65-F5344CB8AC3E}">
+        <p14:creationId xmlns:p14="http://schemas.microsoft.com/office/powerpoint/2010/main" val="2934773690"/>
+      </p:ext>
+    </p:extLst>
+  </p:cSld>
+  <p:clrMapOvr>
+    <a:masterClrMapping/>
+  </p:clrMapOvr>
+</p:sld>
+</file>
+
+<file path=ppt/slides/slide29.xml><?xml version="1.0" encoding="utf-8"?>
+<p:sld xmlns:a="http://schemas.openxmlformats.org/drawingml/2006/main" xmlns:r="http://schemas.openxmlformats.org/officeDocument/2006/relationships" xmlns:p="http://schemas.openxmlformats.org/presentationml/2006/main">
+  <p:cSld>
+    <p:spTree>
+      <p:nvGrpSpPr>
+        <p:cNvPr id="1" name=""/>
+        <p:cNvGrpSpPr/>
+        <p:nvPr/>
+      </p:nvGrpSpPr>
+      <p:grpSpPr>
+        <a:xfrm>
+          <a:off x="0" y="0"/>
+          <a:ext cx="0" cy="0"/>
+          <a:chOff x="0" y="0"/>
+          <a:chExt cx="0" cy="0"/>
+        </a:xfrm>
+      </p:grpSpPr>
+      <p:sp>
+        <p:nvSpPr>
+          <p:cNvPr id="2" name="Title 1">
+            <a:extLst>
+              <a:ext uri="{FF2B5EF4-FFF2-40B4-BE49-F238E27FC236}">
+                <a16:creationId xmlns:a16="http://schemas.microsoft.com/office/drawing/2014/main" id="{FABAA41A-77E6-2FBA-A297-38D8E88EA1EE}"/>
+              </a:ext>
+            </a:extLst>
+          </p:cNvPr>
+          <p:cNvSpPr>
+            <a:spLocks noGrp="1"/>
+          </p:cNvSpPr>
+          <p:nvPr>
+            <p:ph type="title"/>
+          </p:nvPr>
+        </p:nvSpPr>
+        <p:spPr/>
+        <p:txBody>
+          <a:bodyPr/>
+          <a:lstStyle/>
+          <a:p>
+            <a:r>
+              <a:rPr lang="en-US" dirty="0"/>
+              <a:t>Practical formatting tricks</a:t>
+            </a:r>
+          </a:p>
+        </p:txBody>
+      </p:sp>
+      <p:sp>
+        <p:nvSpPr>
+          <p:cNvPr id="3" name="Text Placeholder 2">
+            <a:extLst>
+              <a:ext uri="{FF2B5EF4-FFF2-40B4-BE49-F238E27FC236}">
+                <a16:creationId xmlns:a16="http://schemas.microsoft.com/office/drawing/2014/main" id="{CC58DA01-D3BC-9504-0836-D49045D6C03A}"/>
+              </a:ext>
+            </a:extLst>
+          </p:cNvPr>
+          <p:cNvSpPr>
+            <a:spLocks noGrp="1"/>
+          </p:cNvSpPr>
+          <p:nvPr>
+            <p:ph type="body" idx="1"/>
+          </p:nvPr>
+        </p:nvSpPr>
+        <p:spPr/>
+        <p:txBody>
+          <a:bodyPr/>
+          <a:lstStyle/>
+          <a:p>
+            <a:endParaRPr lang="en-US"/>
+          </a:p>
+        </p:txBody>
+      </p:sp>
+    </p:spTree>
+    <p:extLst>
+      <p:ext uri="{BB962C8B-B14F-4D97-AF65-F5344CB8AC3E}">
+        <p14:creationId xmlns:p14="http://schemas.microsoft.com/office/powerpoint/2010/main" val="4002762296"/>
+      </p:ext>
+    </p:extLst>
+  </p:cSld>
+  <p:clrMapOvr>
+    <a:masterClrMapping/>
+  </p:clrMapOvr>
+</p:sld>
+</file>
+
+<file path=ppt/slides/slide3.xml><?xml version="1.0" encoding="utf-8"?>
+<p:sld xmlns:a="http://schemas.openxmlformats.org/drawingml/2006/main" xmlns:r="http://schemas.openxmlformats.org/officeDocument/2006/relationships" xmlns:p="http://schemas.openxmlformats.org/presentationml/2006/main">
+  <p:cSld>
+    <p:spTree>
+      <p:nvGrpSpPr>
+        <p:cNvPr id="1" name=""/>
+        <p:cNvGrpSpPr/>
+        <p:nvPr/>
+      </p:nvGrpSpPr>
+      <p:grpSpPr>
+        <a:xfrm>
+          <a:off x="0" y="0"/>
+          <a:ext cx="0" cy="0"/>
+          <a:chOff x="0" y="0"/>
+          <a:chExt cx="0" cy="0"/>
+        </a:xfrm>
+      </p:grpSpPr>
+      <p:sp>
+        <p:nvSpPr>
+          <p:cNvPr id="2" name="Title 1">
+            <a:extLst>
+              <a:ext uri="{FF2B5EF4-FFF2-40B4-BE49-F238E27FC236}">
+                <a16:creationId xmlns:a16="http://schemas.microsoft.com/office/drawing/2014/main" id="{74710D85-8C9D-388F-E1FC-561F624F73D8}"/>
+              </a:ext>
+            </a:extLst>
+          </p:cNvPr>
+          <p:cNvSpPr>
+            <a:spLocks noGrp="1"/>
+          </p:cNvSpPr>
+          <p:nvPr>
+            <p:ph type="ctrTitle"/>
+          </p:nvPr>
+        </p:nvSpPr>
+        <p:spPr/>
+        <p:txBody>
+          <a:bodyPr/>
+          <a:lstStyle/>
+          <a:p>
+            <a:r>
+              <a:rPr lang="en-US" dirty="0"/>
+              <a:t>Effective</a:t>
+            </a:r>
+            <a:br>
+              <a:rPr lang="en-US" dirty="0"/>
+            </a:br>
+            <a:r>
+              <a:rPr lang="en-US" dirty="0"/>
+              <a:t>Data Visualization</a:t>
+            </a:r>
+            <a:br>
+              <a:rPr lang="en-US" dirty="0"/>
+            </a:br>
+            <a:r>
+              <a:rPr lang="en-US" dirty="0"/>
+              <a:t>for Actuaries</a:t>
+            </a:r>
+          </a:p>
+        </p:txBody>
+      </p:sp>
+      <p:sp>
+        <p:nvSpPr>
+          <p:cNvPr id="3" name="Subtitle 2">
+            <a:extLst>
+              <a:ext uri="{FF2B5EF4-FFF2-40B4-BE49-F238E27FC236}">
+                <a16:creationId xmlns:a16="http://schemas.microsoft.com/office/drawing/2014/main" id="{4053B939-82C6-7883-3378-EEEF2C23A74B}"/>
+              </a:ext>
+            </a:extLst>
+          </p:cNvPr>
+          <p:cNvSpPr>
+            <a:spLocks noGrp="1"/>
+          </p:cNvSpPr>
+          <p:nvPr>
+            <p:ph type="subTitle" idx="1"/>
+          </p:nvPr>
+        </p:nvSpPr>
+        <p:spPr/>
+        <p:txBody>
+          <a:bodyPr/>
+          <a:lstStyle/>
+          <a:p>
+            <a:r>
+              <a:rPr lang="en-US" dirty="0"/>
+              <a:t>Brian Fannin</a:t>
+            </a:r>
+          </a:p>
+          <a:p>
+            <a:r>
+              <a:rPr lang="en-US" dirty="0"/>
+              <a:t>Jordan Bonner</a:t>
+            </a:r>
+          </a:p>
+        </p:txBody>
+      </p:sp>
+    </p:spTree>
+    <p:extLst>
+      <p:ext uri="{BB962C8B-B14F-4D97-AF65-F5344CB8AC3E}">
+        <p14:creationId xmlns:p14="http://schemas.microsoft.com/office/powerpoint/2010/main" val="3925388622"/>
+      </p:ext>
+    </p:extLst>
+  </p:cSld>
+  <p:clrMapOvr>
+    <a:masterClrMapping/>
+  </p:clrMapOvr>
+</p:sld>
+</file>
+
+<file path=ppt/slides/slide30.xml><?xml version="1.0" encoding="utf-8"?>
+<p:sld xmlns:a="http://schemas.openxmlformats.org/drawingml/2006/main" xmlns:r="http://schemas.openxmlformats.org/officeDocument/2006/relationships" xmlns:p="http://schemas.openxmlformats.org/presentationml/2006/main">
+  <p:cSld>
+    <p:spTree>
+      <p:nvGrpSpPr>
+        <p:cNvPr id="1" name=""/>
+        <p:cNvGrpSpPr/>
+        <p:nvPr/>
+      </p:nvGrpSpPr>
+      <p:grpSpPr>
+        <a:xfrm>
+          <a:off x="0" y="0"/>
+          <a:ext cx="0" cy="0"/>
+          <a:chOff x="0" y="0"/>
+          <a:chExt cx="0" cy="0"/>
+        </a:xfrm>
+      </p:grpSpPr>
+      <p:sp>
+        <p:nvSpPr>
+          <p:cNvPr id="2" name="Title 1">
+            <a:extLst>
+              <a:ext uri="{FF2B5EF4-FFF2-40B4-BE49-F238E27FC236}">
+                <a16:creationId xmlns:a16="http://schemas.microsoft.com/office/drawing/2014/main" id="{18969BF5-0288-FD7C-1739-0C8672F3D7F8}"/>
+              </a:ext>
+            </a:extLst>
+          </p:cNvPr>
+          <p:cNvSpPr>
+            <a:spLocks noGrp="1"/>
+          </p:cNvSpPr>
+          <p:nvPr>
+            <p:ph type="title"/>
+          </p:nvPr>
+        </p:nvSpPr>
+        <p:spPr>
+          <a:xfrm>
+            <a:off x="1066800" y="274638"/>
+            <a:ext cx="7772400" cy="1143000"/>
+          </a:xfrm>
+        </p:spPr>
+        <p:txBody>
+          <a:bodyPr/>
+          <a:lstStyle/>
+          <a:p>
+            <a:r>
+              <a:rPr lang="en-US" dirty="0"/>
+              <a:t>Initial Example: Fitted Severity</a:t>
+            </a:r>
+          </a:p>
+        </p:txBody>
+      </p:sp>
+      <p:pic>
+        <p:nvPicPr>
+          <p:cNvPr id="4" name="Picture 3">
+            <a:extLst>
+              <a:ext uri="{FF2B5EF4-FFF2-40B4-BE49-F238E27FC236}">
+                <a16:creationId xmlns:a16="http://schemas.microsoft.com/office/drawing/2014/main" id="{E725ABD2-C6D9-F502-2921-0DC1A1664FD0}"/>
+              </a:ext>
+            </a:extLst>
+          </p:cNvPr>
+          <p:cNvPicPr>
+            <a:picLocks noChangeAspect="1"/>
+          </p:cNvPicPr>
+          <p:nvPr/>
+        </p:nvPicPr>
+        <p:blipFill>
+          <a:blip r:embed="rId2" r:link="rId3">
+            <a:extLst>
+              <a:ext uri="{28A0092B-C50C-407E-A947-70E740481C1C}">
+                <a14:useLocalDpi xmlns:a14="http://schemas.microsoft.com/office/drawing/2010/main" val="0"/>
+              </a:ext>
+            </a:extLst>
+          </a:blip>
+          <a:srcRect/>
+          <a:stretch>
+            <a:fillRect/>
+          </a:stretch>
+        </p:blipFill>
+        <p:spPr>
+          <a:xfrm>
+            <a:off x="2971801" y="1447801"/>
+            <a:ext cx="5943597" cy="3962398"/>
+          </a:xfrm>
+          <a:prstGeom prst="rect">
+            <a:avLst/>
+          </a:prstGeom>
+        </p:spPr>
+      </p:pic>
+      <p:sp>
+        <p:nvSpPr>
+          <p:cNvPr id="5" name="TextBox 4">
+            <a:extLst>
+              <a:ext uri="{FF2B5EF4-FFF2-40B4-BE49-F238E27FC236}">
+                <a16:creationId xmlns:a16="http://schemas.microsoft.com/office/drawing/2014/main" id="{2CA6CE52-CDE9-6BD5-D02A-0B9CDE177F35}"/>
+              </a:ext>
+            </a:extLst>
+          </p:cNvPr>
+          <p:cNvSpPr txBox="1"/>
+          <p:nvPr/>
+        </p:nvSpPr>
+        <p:spPr>
+          <a:xfrm>
+            <a:off x="228601" y="2514600"/>
+            <a:ext cx="2431673" cy="1384995"/>
+          </a:xfrm>
+          <a:prstGeom prst="rect">
+            <a:avLst/>
+          </a:prstGeom>
+          <a:noFill/>
+        </p:spPr>
+        <p:txBody>
+          <a:bodyPr wrap="square" rtlCol="0">
+            <a:spAutoFit/>
+          </a:bodyPr>
+          <a:lstStyle/>
+          <a:p>
+            <a:pPr algn="ctr"/>
+            <a:r>
+              <a:rPr lang="en-US" sz="2800" dirty="0">
+                <a:latin typeface="Arial" panose="020B0604020202020204" pitchFamily="34" charset="0"/>
+                <a:cs typeface="Arial" panose="020B0604020202020204" pitchFamily="34" charset="0"/>
+              </a:rPr>
+              <a:t>How can we improve upon this chart?</a:t>
+            </a:r>
+          </a:p>
+        </p:txBody>
+      </p:sp>
+      <p:sp>
+        <p:nvSpPr>
+          <p:cNvPr id="3" name="TextBox 2">
+            <a:extLst>
+              <a:ext uri="{FF2B5EF4-FFF2-40B4-BE49-F238E27FC236}">
+                <a16:creationId xmlns:a16="http://schemas.microsoft.com/office/drawing/2014/main" id="{D90ECCA0-06AB-B8AB-4B22-AA383E47AE34}"/>
+              </a:ext>
+            </a:extLst>
+          </p:cNvPr>
+          <p:cNvSpPr txBox="1"/>
+          <p:nvPr/>
+        </p:nvSpPr>
+        <p:spPr>
+          <a:xfrm>
+            <a:off x="260498" y="5181600"/>
+            <a:ext cx="7588101" cy="830997"/>
+          </a:xfrm>
+          <a:prstGeom prst="rect">
+            <a:avLst/>
+          </a:prstGeom>
+          <a:noFill/>
+        </p:spPr>
+        <p:txBody>
+          <a:bodyPr wrap="square" rtlCol="0">
+            <a:spAutoFit/>
+          </a:bodyPr>
+          <a:lstStyle/>
+          <a:p>
+            <a:r>
+              <a:rPr lang="en-US" sz="1200" dirty="0">
+                <a:latin typeface="Consolas" panose="020B0609020204030204" pitchFamily="49" charset="0"/>
+              </a:rPr>
+              <a:t>P &lt;- data |&gt;</a:t>
+            </a:r>
+          </a:p>
+          <a:p>
+            <a:r>
+              <a:rPr lang="en-US" sz="1200" dirty="0">
+                <a:latin typeface="Consolas" panose="020B0609020204030204" pitchFamily="49" charset="0"/>
+              </a:rPr>
+              <a:t>  </a:t>
+            </a:r>
+            <a:r>
+              <a:rPr lang="en-US" sz="1200" dirty="0" err="1">
+                <a:latin typeface="Consolas" panose="020B0609020204030204" pitchFamily="49" charset="0"/>
+              </a:rPr>
+              <a:t>geom_histogram</a:t>
+            </a:r>
+            <a:r>
+              <a:rPr lang="en-US" sz="1200" dirty="0">
+                <a:latin typeface="Consolas" panose="020B0609020204030204" pitchFamily="49" charset="0"/>
+              </a:rPr>
+              <a:t>(</a:t>
+            </a:r>
+            <a:r>
+              <a:rPr lang="en-US" sz="1200" dirty="0" err="1">
+                <a:latin typeface="Consolas" panose="020B0609020204030204" pitchFamily="49" charset="0"/>
+              </a:rPr>
+              <a:t>aes</a:t>
+            </a:r>
+            <a:r>
+              <a:rPr lang="en-US" sz="1200" dirty="0">
+                <a:latin typeface="Consolas" panose="020B0609020204030204" pitchFamily="49" charset="0"/>
+              </a:rPr>
+              <a:t>(x = loss, </a:t>
+            </a:r>
+            <a:r>
+              <a:rPr lang="en-US" sz="1200" dirty="0" err="1">
+                <a:latin typeface="Consolas" panose="020B0609020204030204" pitchFamily="49" charset="0"/>
+              </a:rPr>
+              <a:t>after_stat</a:t>
+            </a:r>
+            <a:r>
+              <a:rPr lang="en-US" sz="1200" dirty="0">
+                <a:latin typeface="Consolas" panose="020B0609020204030204" pitchFamily="49" charset="0"/>
+              </a:rPr>
+              <a:t>(density)) +</a:t>
+            </a:r>
+          </a:p>
+          <a:p>
+            <a:r>
+              <a:rPr lang="en-US" sz="1200" dirty="0">
+                <a:latin typeface="Consolas" panose="020B0609020204030204" pitchFamily="49" charset="0"/>
+              </a:rPr>
+              <a:t>  </a:t>
+            </a:r>
+            <a:r>
+              <a:rPr lang="en-US" sz="1200" dirty="0" err="1">
+                <a:latin typeface="Consolas" panose="020B0609020204030204" pitchFamily="49" charset="0"/>
+              </a:rPr>
+              <a:t>stat_function</a:t>
+            </a:r>
+            <a:r>
+              <a:rPr lang="en-US" sz="1200" dirty="0">
+                <a:latin typeface="Consolas" panose="020B0609020204030204" pitchFamily="49" charset="0"/>
+              </a:rPr>
+              <a:t>(fun = </a:t>
+            </a:r>
+            <a:r>
+              <a:rPr lang="en-US" sz="1200" dirty="0" err="1">
+                <a:latin typeface="Consolas" panose="020B0609020204030204" pitchFamily="49" charset="0"/>
+              </a:rPr>
+              <a:t>dlnorm</a:t>
+            </a:r>
+            <a:r>
+              <a:rPr lang="en-US" sz="1200" dirty="0">
+                <a:latin typeface="Consolas" panose="020B0609020204030204" pitchFamily="49" charset="0"/>
+              </a:rPr>
+              <a:t>,</a:t>
+            </a:r>
+          </a:p>
+          <a:p>
+            <a:r>
+              <a:rPr lang="en-US" sz="1200" dirty="0">
+                <a:latin typeface="Consolas" panose="020B0609020204030204" pitchFamily="49" charset="0"/>
+              </a:rPr>
+              <a:t>                </a:t>
+            </a:r>
+            <a:r>
+              <a:rPr lang="en-US" sz="1200" dirty="0" err="1">
+                <a:latin typeface="Consolas" panose="020B0609020204030204" pitchFamily="49" charset="0"/>
+              </a:rPr>
+              <a:t>args</a:t>
+            </a:r>
+            <a:r>
+              <a:rPr lang="en-US" sz="1200" dirty="0">
+                <a:latin typeface="Consolas" panose="020B0609020204030204" pitchFamily="49" charset="0"/>
+              </a:rPr>
+              <a:t> = list(</a:t>
+            </a:r>
+            <a:r>
+              <a:rPr lang="en-US" sz="1200" dirty="0" err="1">
+                <a:latin typeface="Consolas" panose="020B0609020204030204" pitchFamily="49" charset="0"/>
+              </a:rPr>
+              <a:t>meanlog</a:t>
+            </a:r>
+            <a:r>
+              <a:rPr lang="en-US" sz="1200" dirty="0">
+                <a:latin typeface="Consolas" panose="020B0609020204030204" pitchFamily="49" charset="0"/>
+              </a:rPr>
+              <a:t> = 10, </a:t>
+            </a:r>
+            <a:r>
+              <a:rPr lang="en-US" sz="1200" dirty="0" err="1">
+                <a:latin typeface="Consolas" panose="020B0609020204030204" pitchFamily="49" charset="0"/>
+              </a:rPr>
+              <a:t>sdlog</a:t>
+            </a:r>
+            <a:r>
+              <a:rPr lang="en-US" sz="1200" dirty="0">
+                <a:latin typeface="Consolas" panose="020B0609020204030204" pitchFamily="49" charset="0"/>
+              </a:rPr>
+              <a:t> = 1.0))</a:t>
+            </a:r>
+          </a:p>
+        </p:txBody>
+      </p:sp>
+    </p:spTree>
+    <p:extLst>
+      <p:ext uri="{BB962C8B-B14F-4D97-AF65-F5344CB8AC3E}">
+        <p14:creationId xmlns:p14="http://schemas.microsoft.com/office/powerpoint/2010/main" val="1608165928"/>
+      </p:ext>
+    </p:extLst>
+  </p:cSld>
+  <p:clrMapOvr>
+    <a:masterClrMapping/>
+  </p:clrMapOvr>
+</p:sld>
+</file>
+
+<file path=ppt/slides/slide31.xml><?xml version="1.0" encoding="utf-8"?>
+<p:sld xmlns:a="http://schemas.openxmlformats.org/drawingml/2006/main" xmlns:r="http://schemas.openxmlformats.org/officeDocument/2006/relationships" xmlns:p="http://schemas.openxmlformats.org/presentationml/2006/main">
+  <p:cSld>
+    <p:spTree>
+      <p:nvGrpSpPr>
+        <p:cNvPr id="1" name=""/>
+        <p:cNvGrpSpPr/>
+        <p:nvPr/>
+      </p:nvGrpSpPr>
+      <p:grpSpPr>
+        <a:xfrm>
+          <a:off x="0" y="0"/>
+          <a:ext cx="0" cy="0"/>
+          <a:chOff x="0" y="0"/>
+          <a:chExt cx="0" cy="0"/>
+        </a:xfrm>
+      </p:grpSpPr>
+      <p:sp>
+        <p:nvSpPr>
+          <p:cNvPr id="2" name="Title 1">
+            <a:extLst>
+              <a:ext uri="{FF2B5EF4-FFF2-40B4-BE49-F238E27FC236}">
+                <a16:creationId xmlns:a16="http://schemas.microsoft.com/office/drawing/2014/main" id="{18969BF5-0288-FD7C-1739-0C8672F3D7F8}"/>
+              </a:ext>
+            </a:extLst>
+          </p:cNvPr>
+          <p:cNvSpPr>
+            <a:spLocks noGrp="1"/>
+          </p:cNvSpPr>
+          <p:nvPr>
+            <p:ph type="title"/>
+          </p:nvPr>
+        </p:nvSpPr>
+        <p:spPr/>
+        <p:txBody>
+          <a:bodyPr/>
+          <a:lstStyle/>
+          <a:p>
+            <a:r>
+              <a:rPr lang="en-US" dirty="0"/>
+              <a:t>Titles &amp; Renaming Variables</a:t>
+            </a:r>
+          </a:p>
+        </p:txBody>
+      </p:sp>
+      <p:pic>
+        <p:nvPicPr>
+          <p:cNvPr id="4" name="Picture 3">
+            <a:extLst>
+              <a:ext uri="{FF2B5EF4-FFF2-40B4-BE49-F238E27FC236}">
+                <a16:creationId xmlns:a16="http://schemas.microsoft.com/office/drawing/2014/main" id="{4A0037C9-EB90-2900-D4EC-DF813BC908A7}"/>
+              </a:ext>
+            </a:extLst>
+          </p:cNvPr>
+          <p:cNvPicPr>
+            <a:picLocks noChangeAspect="1"/>
+          </p:cNvPicPr>
+          <p:nvPr/>
+        </p:nvPicPr>
+        <p:blipFill>
+          <a:blip r:embed="rId2" r:link="rId3">
+            <a:extLst>
+              <a:ext uri="{28A0092B-C50C-407E-A947-70E740481C1C}">
+                <a14:useLocalDpi xmlns:a14="http://schemas.microsoft.com/office/drawing/2010/main" val="0"/>
+              </a:ext>
+            </a:extLst>
+          </a:blip>
+          <a:srcRect/>
+          <a:stretch>
+            <a:fillRect/>
+          </a:stretch>
+        </p:blipFill>
+        <p:spPr>
+          <a:xfrm>
+            <a:off x="2971801" y="1447801"/>
+            <a:ext cx="5943597" cy="3962397"/>
+          </a:xfrm>
+          <a:prstGeom prst="rect">
+            <a:avLst/>
+          </a:prstGeom>
+        </p:spPr>
+      </p:pic>
+      <p:sp>
+        <p:nvSpPr>
+          <p:cNvPr id="5" name="TextBox 4">
+            <a:extLst>
+              <a:ext uri="{FF2B5EF4-FFF2-40B4-BE49-F238E27FC236}">
+                <a16:creationId xmlns:a16="http://schemas.microsoft.com/office/drawing/2014/main" id="{04AF6261-B4B1-D761-810B-AACA39E89170}"/>
+              </a:ext>
+            </a:extLst>
+          </p:cNvPr>
+          <p:cNvSpPr txBox="1"/>
+          <p:nvPr/>
+        </p:nvSpPr>
+        <p:spPr>
+          <a:xfrm>
+            <a:off x="228601" y="2514600"/>
+            <a:ext cx="2431673" cy="1815882"/>
+          </a:xfrm>
+          <a:prstGeom prst="rect">
+            <a:avLst/>
+          </a:prstGeom>
+          <a:noFill/>
+        </p:spPr>
+        <p:txBody>
+          <a:bodyPr wrap="square" rtlCol="0">
+            <a:spAutoFit/>
+          </a:bodyPr>
+          <a:lstStyle/>
+          <a:p>
+            <a:pPr algn="ctr"/>
+            <a:r>
+              <a:rPr lang="en-US" sz="2800" dirty="0">
+                <a:latin typeface="Arial" panose="020B0604020202020204" pitchFamily="34" charset="0"/>
+                <a:cs typeface="Arial" panose="020B0604020202020204" pitchFamily="34" charset="0"/>
+              </a:rPr>
+              <a:t>Adding a title and variable names goes a long way.</a:t>
+            </a:r>
+          </a:p>
+        </p:txBody>
+      </p:sp>
+      <p:sp>
+        <p:nvSpPr>
+          <p:cNvPr id="3" name="TextBox 2">
+            <a:extLst>
+              <a:ext uri="{FF2B5EF4-FFF2-40B4-BE49-F238E27FC236}">
+                <a16:creationId xmlns:a16="http://schemas.microsoft.com/office/drawing/2014/main" id="{5CA26C35-36C9-ADDC-3107-CF1F9C4ABAD9}"/>
+              </a:ext>
+            </a:extLst>
+          </p:cNvPr>
+          <p:cNvSpPr txBox="1"/>
+          <p:nvPr/>
+        </p:nvSpPr>
+        <p:spPr>
+          <a:xfrm>
+            <a:off x="260498" y="5181600"/>
+            <a:ext cx="7588101" cy="1200329"/>
+          </a:xfrm>
+          <a:prstGeom prst="rect">
+            <a:avLst/>
+          </a:prstGeom>
+          <a:noFill/>
+        </p:spPr>
+        <p:txBody>
+          <a:bodyPr wrap="square" rtlCol="0">
+            <a:spAutoFit/>
+          </a:bodyPr>
+          <a:lstStyle/>
+          <a:p>
+            <a:r>
+              <a:rPr lang="en-US" sz="1200" dirty="0">
+                <a:latin typeface="Consolas" panose="020B0609020204030204" pitchFamily="49" charset="0"/>
+              </a:rPr>
+              <a:t>P &lt;- p +</a:t>
+            </a:r>
+          </a:p>
+          <a:p>
+            <a:r>
+              <a:rPr lang="en-US" sz="1200" dirty="0">
+                <a:latin typeface="Consolas" panose="020B0609020204030204" pitchFamily="49" charset="0"/>
+              </a:rPr>
+              <a:t> labs(</a:t>
+            </a:r>
+          </a:p>
+          <a:p>
+            <a:r>
+              <a:rPr lang="en-US" sz="1200" dirty="0">
+                <a:latin typeface="Consolas" panose="020B0609020204030204" pitchFamily="49" charset="0"/>
+              </a:rPr>
+              <a:t>    x = "Severity",</a:t>
+            </a:r>
+          </a:p>
+          <a:p>
+            <a:r>
+              <a:rPr lang="en-US" sz="1200" dirty="0">
+                <a:latin typeface="Consolas" panose="020B0609020204030204" pitchFamily="49" charset="0"/>
+              </a:rPr>
+              <a:t>    y = "Density",</a:t>
+            </a:r>
+          </a:p>
+          <a:p>
+            <a:r>
+              <a:rPr lang="en-US" sz="1200" dirty="0">
+                <a:latin typeface="Consolas" panose="020B0609020204030204" pitchFamily="49" charset="0"/>
+              </a:rPr>
+              <a:t>    title = "Fitted Severity Curve"</a:t>
+            </a:r>
+          </a:p>
+          <a:p>
+            <a:r>
+              <a:rPr lang="en-US" sz="1200" dirty="0">
+                <a:latin typeface="Consolas" panose="020B0609020204030204" pitchFamily="49" charset="0"/>
+              </a:rPr>
+              <a:t>  )</a:t>
+            </a:r>
+          </a:p>
+        </p:txBody>
+      </p:sp>
+    </p:spTree>
+    <p:extLst>
+      <p:ext uri="{BB962C8B-B14F-4D97-AF65-F5344CB8AC3E}">
+        <p14:creationId xmlns:p14="http://schemas.microsoft.com/office/powerpoint/2010/main" val="1443684485"/>
+      </p:ext>
+    </p:extLst>
+  </p:cSld>
+  <p:clrMapOvr>
+    <a:masterClrMapping/>
+  </p:clrMapOvr>
+</p:sld>
+</file>
+
+<file path=ppt/slides/slide32.xml><?xml version="1.0" encoding="utf-8"?>
+<p:sld xmlns:a="http://schemas.openxmlformats.org/drawingml/2006/main" xmlns:r="http://schemas.openxmlformats.org/officeDocument/2006/relationships" xmlns:p="http://schemas.openxmlformats.org/presentationml/2006/main">
+  <p:cSld>
+    <p:spTree>
+      <p:nvGrpSpPr>
+        <p:cNvPr id="1" name=""/>
+        <p:cNvGrpSpPr/>
+        <p:nvPr/>
+      </p:nvGrpSpPr>
+      <p:grpSpPr>
+        <a:xfrm>
+          <a:off x="0" y="0"/>
+          <a:ext cx="0" cy="0"/>
+          <a:chOff x="0" y="0"/>
+          <a:chExt cx="0" cy="0"/>
+        </a:xfrm>
+      </p:grpSpPr>
+      <p:sp>
+        <p:nvSpPr>
+          <p:cNvPr id="2" name="Title 1">
+            <a:extLst>
+              <a:ext uri="{FF2B5EF4-FFF2-40B4-BE49-F238E27FC236}">
                 <a16:creationId xmlns:a16="http://schemas.microsoft.com/office/drawing/2014/main" id="{6AA0D46C-160A-13B4-DED2-2C2A2470264C}"/>
               </a:ext>
             </a:extLst>
@@ -16204,7 +19140,7 @@
 </p:sld>
 </file>
 
-<file path=ppt/slides/slide24.xml><?xml version="1.0" encoding="utf-8"?>
+<file path=ppt/slides/slide33.xml><?xml version="1.0" encoding="utf-8"?>
 <p:sld xmlns:a="http://schemas.openxmlformats.org/drawingml/2006/main" xmlns:r="http://schemas.openxmlformats.org/officeDocument/2006/relationships" xmlns:p="http://schemas.openxmlformats.org/presentationml/2006/main">
   <p:cSld>
     <p:spTree>
@@ -16299,7 +19235,7 @@
 </p:sld>
 </file>
 
-<file path=ppt/slides/slide25.xml><?xml version="1.0" encoding="utf-8"?>
+<file path=ppt/slides/slide34.xml><?xml version="1.0" encoding="utf-8"?>
 <p:sld xmlns:a="http://schemas.openxmlformats.org/drawingml/2006/main" xmlns:r="http://schemas.openxmlformats.org/officeDocument/2006/relationships" xmlns:p="http://schemas.openxmlformats.org/presentationml/2006/main">
   <p:cSld>
     <p:spTree>
@@ -16394,7 +19330,7 @@
 </p:sld>
 </file>
 
-<file path=ppt/slides/slide26.xml><?xml version="1.0" encoding="utf-8"?>
+<file path=ppt/slides/slide35.xml><?xml version="1.0" encoding="utf-8"?>
 <p:sld xmlns:a="http://schemas.openxmlformats.org/drawingml/2006/main" xmlns:r="http://schemas.openxmlformats.org/officeDocument/2006/relationships" xmlns:p="http://schemas.openxmlformats.org/presentationml/2006/main">
   <p:cSld>
     <p:spTree>
@@ -16489,112 +19425,6 @@
 </p:sld>
 </file>
 
-<file path=ppt/slides/slide3.xml><?xml version="1.0" encoding="utf-8"?>
-<p:sld xmlns:a="http://schemas.openxmlformats.org/drawingml/2006/main" xmlns:r="http://schemas.openxmlformats.org/officeDocument/2006/relationships" xmlns:p="http://schemas.openxmlformats.org/presentationml/2006/main">
-  <p:cSld>
-    <p:spTree>
-      <p:nvGrpSpPr>
-        <p:cNvPr id="1" name=""/>
-        <p:cNvGrpSpPr/>
-        <p:nvPr/>
-      </p:nvGrpSpPr>
-      <p:grpSpPr>
-        <a:xfrm>
-          <a:off x="0" y="0"/>
-          <a:ext cx="0" cy="0"/>
-          <a:chOff x="0" y="0"/>
-          <a:chExt cx="0" cy="0"/>
-        </a:xfrm>
-      </p:grpSpPr>
-      <p:sp>
-        <p:nvSpPr>
-          <p:cNvPr id="2" name="Title 1">
-            <a:extLst>
-              <a:ext uri="{FF2B5EF4-FFF2-40B4-BE49-F238E27FC236}">
-                <a16:creationId xmlns:a16="http://schemas.microsoft.com/office/drawing/2014/main" id="{74710D85-8C9D-388F-E1FC-561F624F73D8}"/>
-              </a:ext>
-            </a:extLst>
-          </p:cNvPr>
-          <p:cNvSpPr>
-            <a:spLocks noGrp="1"/>
-          </p:cNvSpPr>
-          <p:nvPr>
-            <p:ph type="ctrTitle"/>
-          </p:nvPr>
-        </p:nvSpPr>
-        <p:spPr/>
-        <p:txBody>
-          <a:bodyPr/>
-          <a:lstStyle/>
-          <a:p>
-            <a:r>
-              <a:rPr lang="en-US" dirty="0"/>
-              <a:t>Effective</a:t>
-            </a:r>
-            <a:br>
-              <a:rPr lang="en-US" dirty="0"/>
-            </a:br>
-            <a:r>
-              <a:rPr lang="en-US" dirty="0"/>
-              <a:t>Data Visualization</a:t>
-            </a:r>
-            <a:br>
-              <a:rPr lang="en-US" dirty="0"/>
-            </a:br>
-            <a:r>
-              <a:rPr lang="en-US" dirty="0"/>
-              <a:t>for Actuaries</a:t>
-            </a:r>
-          </a:p>
-        </p:txBody>
-      </p:sp>
-      <p:sp>
-        <p:nvSpPr>
-          <p:cNvPr id="3" name="Subtitle 2">
-            <a:extLst>
-              <a:ext uri="{FF2B5EF4-FFF2-40B4-BE49-F238E27FC236}">
-                <a16:creationId xmlns:a16="http://schemas.microsoft.com/office/drawing/2014/main" id="{4053B939-82C6-7883-3378-EEEF2C23A74B}"/>
-              </a:ext>
-            </a:extLst>
-          </p:cNvPr>
-          <p:cNvSpPr>
-            <a:spLocks noGrp="1"/>
-          </p:cNvSpPr>
-          <p:nvPr>
-            <p:ph type="subTitle" idx="1"/>
-          </p:nvPr>
-        </p:nvSpPr>
-        <p:spPr/>
-        <p:txBody>
-          <a:bodyPr/>
-          <a:lstStyle/>
-          <a:p>
-            <a:r>
-              <a:rPr lang="en-US" dirty="0"/>
-              <a:t>Brian Fannin</a:t>
-            </a:r>
-          </a:p>
-          <a:p>
-            <a:r>
-              <a:rPr lang="en-US" dirty="0"/>
-              <a:t>Jordan Bonner</a:t>
-            </a:r>
-          </a:p>
-        </p:txBody>
-      </p:sp>
-    </p:spTree>
-    <p:extLst>
-      <p:ext uri="{BB962C8B-B14F-4D97-AF65-F5344CB8AC3E}">
-        <p14:creationId xmlns:p14="http://schemas.microsoft.com/office/powerpoint/2010/main" val="3925388622"/>
-      </p:ext>
-    </p:extLst>
-  </p:cSld>
-  <p:clrMapOvr>
-    <a:masterClrMapping/>
-  </p:clrMapOvr>
-</p:sld>
-</file>
-
 <file path=ppt/slides/slide4.xml><?xml version="1.0" encoding="utf-8"?>
 <p:sld xmlns:a="http://schemas.openxmlformats.org/drawingml/2006/main" xmlns:r="http://schemas.openxmlformats.org/officeDocument/2006/relationships" xmlns:p="http://schemas.openxmlformats.org/presentationml/2006/main">
   <p:cSld>
@@ -16866,7 +19696,7 @@
           <a:p>
             <a:r>
               <a:rPr lang="en-US" dirty="0"/>
-              <a:t>Icebreaker Examples</a:t>
+              <a:t>Agenda</a:t>
             </a:r>
           </a:p>
         </p:txBody>
@@ -16892,20 +19722,41 @@
           <a:bodyPr/>
           <a:lstStyle/>
           <a:p>
-            <a:pPr marL="0" indent="0">
-              <a:buNone/>
-            </a:pPr>
-            <a:r>
-              <a:rPr lang="en-US" dirty="0"/>
-              <a:t>A slide or two that are difficult to interpret, then a slide or two that are easy to interpret?</a:t>
-            </a:r>
+            <a:endParaRPr lang="en-US" sz="1600" b="1" dirty="0"/>
+          </a:p>
+          <a:p>
+            <a:r>
+              <a:rPr lang="en-US" sz="3600" b="1" dirty="0"/>
+              <a:t>Data Storytelling</a:t>
+            </a:r>
+          </a:p>
+          <a:p>
+            <a:endParaRPr lang="en-US" sz="2800" b="1" dirty="0"/>
+          </a:p>
+          <a:p>
+            <a:r>
+              <a:rPr lang="en-US" sz="3600" b="1" dirty="0"/>
+              <a:t>Actuarial Visualization</a:t>
+            </a:r>
+          </a:p>
+          <a:p>
+            <a:endParaRPr lang="en-US" sz="2800" b="1" dirty="0"/>
+          </a:p>
+          <a:p>
+            <a:r>
+              <a:rPr lang="en-US" sz="3600" b="1" dirty="0"/>
+              <a:t>Automating Actuarial Exhibits</a:t>
+            </a:r>
+          </a:p>
+          <a:p>
+            <a:endParaRPr lang="en-US" sz="3600" b="1" dirty="0"/>
           </a:p>
         </p:txBody>
       </p:sp>
     </p:spTree>
     <p:extLst>
       <p:ext uri="{BB962C8B-B14F-4D97-AF65-F5344CB8AC3E}">
-        <p14:creationId xmlns:p14="http://schemas.microsoft.com/office/powerpoint/2010/main" val="330312104"/>
+        <p14:creationId xmlns:p14="http://schemas.microsoft.com/office/powerpoint/2010/main" val="1338125014"/>
       </p:ext>
     </p:extLst>
   </p:cSld>
@@ -16937,7 +19788,7 @@
           <p:cNvPr id="2" name="Title 1">
             <a:extLst>
               <a:ext uri="{FF2B5EF4-FFF2-40B4-BE49-F238E27FC236}">
-                <a16:creationId xmlns:a16="http://schemas.microsoft.com/office/drawing/2014/main" id="{FB164A08-7CBF-A761-E02D-33DAFF697330}"/>
+                <a16:creationId xmlns:a16="http://schemas.microsoft.com/office/drawing/2014/main" id="{10B17ABD-BE88-D042-5997-22F660D5947A}"/>
               </a:ext>
             </a:extLst>
           </p:cNvPr>
@@ -16955,17 +19806,17 @@
           <a:p>
             <a:r>
               <a:rPr lang="en-US" dirty="0"/>
-              <a:t>Revisiting common Actuarial Exhibits</a:t>
-            </a:r>
-          </a:p>
-        </p:txBody>
-      </p:sp>
-      <p:sp>
-        <p:nvSpPr>
-          <p:cNvPr id="3" name="Text Placeholder 2">
+              <a:t>Icebreaker Examples</a:t>
+            </a:r>
+          </a:p>
+        </p:txBody>
+      </p:sp>
+      <p:sp>
+        <p:nvSpPr>
+          <p:cNvPr id="3" name="Content Placeholder 2">
             <a:extLst>
               <a:ext uri="{FF2B5EF4-FFF2-40B4-BE49-F238E27FC236}">
-                <a16:creationId xmlns:a16="http://schemas.microsoft.com/office/drawing/2014/main" id="{4B1F8AE9-444E-BC75-AA22-A6E4BADDFFA8}"/>
+                <a16:creationId xmlns:a16="http://schemas.microsoft.com/office/drawing/2014/main" id="{F33662A3-4DD5-0500-C0E1-EA5CF57A5ABC}"/>
               </a:ext>
             </a:extLst>
           </p:cNvPr>
@@ -16973,7 +19824,7 @@
             <a:spLocks noGrp="1"/>
           </p:cNvSpPr>
           <p:nvPr>
-            <p:ph type="body" idx="1"/>
+            <p:ph idx="1"/>
           </p:nvPr>
         </p:nvSpPr>
         <p:spPr/>
@@ -16981,14 +19832,20 @@
           <a:bodyPr/>
           <a:lstStyle/>
           <a:p>
-            <a:endParaRPr lang="en-US"/>
+            <a:pPr marL="0" indent="0">
+              <a:buNone/>
+            </a:pPr>
+            <a:r>
+              <a:rPr lang="en-US" dirty="0"/>
+              <a:t>A slide or two that are difficult to interpret, then a slide or two that are easy to interpret?</a:t>
+            </a:r>
           </a:p>
         </p:txBody>
       </p:sp>
     </p:spTree>
     <p:extLst>
       <p:ext uri="{BB962C8B-B14F-4D97-AF65-F5344CB8AC3E}">
-        <p14:creationId xmlns:p14="http://schemas.microsoft.com/office/powerpoint/2010/main" val="755335451"/>
+        <p14:creationId xmlns:p14="http://schemas.microsoft.com/office/powerpoint/2010/main" val="330312104"/>
       </p:ext>
     </p:extLst>
   </p:cSld>
@@ -17020,7 +19877,7 @@
           <p:cNvPr id="2" name="Title 1">
             <a:extLst>
               <a:ext uri="{FF2B5EF4-FFF2-40B4-BE49-F238E27FC236}">
-                <a16:creationId xmlns:a16="http://schemas.microsoft.com/office/drawing/2014/main" id="{18969BF5-0288-FD7C-1739-0C8672F3D7F8}"/>
+                <a16:creationId xmlns:a16="http://schemas.microsoft.com/office/drawing/2014/main" id="{FB164A08-7CBF-A761-E02D-33DAFF697330}"/>
               </a:ext>
             </a:extLst>
           </p:cNvPr>
@@ -17038,17 +19895,17 @@
           <a:p>
             <a:r>
               <a:rPr lang="en-US" dirty="0"/>
-              <a:t>Common Actuarial Exhibits</a:t>
-            </a:r>
-          </a:p>
-        </p:txBody>
-      </p:sp>
-      <p:sp>
-        <p:nvSpPr>
-          <p:cNvPr id="3" name="Content Placeholder 2">
+              <a:t>Revisiting common Actuarial Exhibits</a:t>
+            </a:r>
+          </a:p>
+        </p:txBody>
+      </p:sp>
+      <p:sp>
+        <p:nvSpPr>
+          <p:cNvPr id="3" name="Text Placeholder 2">
             <a:extLst>
               <a:ext uri="{FF2B5EF4-FFF2-40B4-BE49-F238E27FC236}">
-                <a16:creationId xmlns:a16="http://schemas.microsoft.com/office/drawing/2014/main" id="{39176E43-0115-E50B-D268-5E00760022A7}"/>
+                <a16:creationId xmlns:a16="http://schemas.microsoft.com/office/drawing/2014/main" id="{4B1F8AE9-444E-BC75-AA22-A6E4BADDFFA8}"/>
               </a:ext>
             </a:extLst>
           </p:cNvPr>
@@ -17056,7 +19913,7 @@
             <a:spLocks noGrp="1"/>
           </p:cNvSpPr>
           <p:nvPr>
-            <p:ph idx="1"/>
+            <p:ph type="body" idx="1"/>
           </p:nvPr>
         </p:nvSpPr>
         <p:spPr/>
@@ -17064,41 +19921,14 @@
           <a:bodyPr/>
           <a:lstStyle/>
           <a:p>
-            <a:r>
-              <a:rPr lang="en-US" dirty="0"/>
-              <a:t>Loss Development Triangles</a:t>
-            </a:r>
-          </a:p>
-          <a:p>
-            <a:r>
-              <a:rPr lang="en-US" dirty="0"/>
-              <a:t>Trend Selection</a:t>
-            </a:r>
-          </a:p>
-          <a:p>
-            <a:r>
-              <a:rPr lang="en-US" dirty="0"/>
-              <a:t>Rate Indications</a:t>
-            </a:r>
-          </a:p>
-          <a:p>
-            <a:r>
-              <a:rPr lang="en-US" dirty="0"/>
-              <a:t>Mix Shift Exhibits</a:t>
-            </a:r>
-          </a:p>
-          <a:p>
-            <a:r>
-              <a:rPr lang="en-US" dirty="0"/>
-              <a:t>Model Diagnostics</a:t>
-            </a:r>
+            <a:endParaRPr lang="en-US"/>
           </a:p>
         </p:txBody>
       </p:sp>
     </p:spTree>
     <p:extLst>
       <p:ext uri="{BB962C8B-B14F-4D97-AF65-F5344CB8AC3E}">
-        <p14:creationId xmlns:p14="http://schemas.microsoft.com/office/powerpoint/2010/main" val="1365436568"/>
+        <p14:creationId xmlns:p14="http://schemas.microsoft.com/office/powerpoint/2010/main" val="755335451"/>
       </p:ext>
     </p:extLst>
   </p:cSld>
@@ -17148,7 +19978,7 @@
           <a:p>
             <a:r>
               <a:rPr lang="en-US" dirty="0"/>
-              <a:t>Loss Development Triangles</a:t>
+              <a:t>Common Actuarial Exhibits</a:t>
             </a:r>
           </a:p>
         </p:txBody>
@@ -17174,14 +20004,41 @@
           <a:bodyPr/>
           <a:lstStyle/>
           <a:p>
-            <a:endParaRPr lang="en-US" dirty="0"/>
+            <a:r>
+              <a:rPr lang="en-US" dirty="0"/>
+              <a:t>Loss Development Triangles</a:t>
+            </a:r>
+          </a:p>
+          <a:p>
+            <a:r>
+              <a:rPr lang="en-US" dirty="0"/>
+              <a:t>Trend Selection</a:t>
+            </a:r>
+          </a:p>
+          <a:p>
+            <a:r>
+              <a:rPr lang="en-US" dirty="0"/>
+              <a:t>Rate Indications</a:t>
+            </a:r>
+          </a:p>
+          <a:p>
+            <a:r>
+              <a:rPr lang="en-US" dirty="0"/>
+              <a:t>Mix Shift Exhibits</a:t>
+            </a:r>
+          </a:p>
+          <a:p>
+            <a:r>
+              <a:rPr lang="en-US" dirty="0"/>
+              <a:t>Model Diagnostics</a:t>
+            </a:r>
           </a:p>
         </p:txBody>
       </p:sp>
     </p:spTree>
     <p:extLst>
       <p:ext uri="{BB962C8B-B14F-4D97-AF65-F5344CB8AC3E}">
-        <p14:creationId xmlns:p14="http://schemas.microsoft.com/office/powerpoint/2010/main" val="48610386"/>
+        <p14:creationId xmlns:p14="http://schemas.microsoft.com/office/powerpoint/2010/main" val="1365436568"/>
       </p:ext>
     </p:extLst>
   </p:cSld>

</xml_diff>